<commit_message>
Committed changes to Presentation 4.
</commit_message>
<xml_diff>
--- a/Presentations/4. Creating your first webpage using HTML.pptx
+++ b/Presentations/4. Creating your first webpage using HTML.pptx
@@ -12,6 +12,10 @@
     <p:sldId id="262" r:id="rId6"/>
     <p:sldId id="263" r:id="rId7"/>
     <p:sldId id="264" r:id="rId8"/>
+    <p:sldId id="265" r:id="rId9"/>
+    <p:sldId id="266" r:id="rId10"/>
+    <p:sldId id="268" r:id="rId11"/>
+    <p:sldId id="267" r:id="rId12"/>
   </p:sldIdLst>
   <p:sldSz cx="12192000" cy="6858000"/>
   <p:notesSz cx="6858000" cy="9144000"/>
@@ -112,7 +116,7 @@
   </p:defaultTextStyle>
   <p:extLst>
     <p:ext uri="{EFAFB233-063F-42B5-8137-9DF3F51BA10A}">
-      <p15:sldGuideLst xmlns:p15="http://schemas.microsoft.com/office/powerpoint/2012/main"/>
+      <p15:sldGuideLst xmlns:p15="http://schemas.microsoft.com/office/powerpoint/2012/main" xmlns=""/>
     </p:ext>
   </p:extLst>
 </p:presentation>
@@ -303,7 +307,8 @@
           <a:p>
             <a:fld id="{88D38747-4367-4BD2-8D51-C97E202738E2}" type="datetime1">
               <a:rPr lang="en-US" smtClean="0"/>
-              <a:t>3/14/2021</a:t>
+              <a:pPr/>
+              <a:t>3/24/2021</a:t>
             </a:fld>
             <a:endParaRPr lang="en-US" dirty="0"/>
           </a:p>
@@ -355,7 +360,7 @@
     </p:spTree>
     <p:extLst>
       <p:ext uri="{BB962C8B-B14F-4D97-AF65-F5344CB8AC3E}">
-        <p14:creationId xmlns:p14="http://schemas.microsoft.com/office/powerpoint/2010/main" val="3852525471"/>
+        <p14:creationId xmlns:p14="http://schemas.microsoft.com/office/powerpoint/2010/main" xmlns="" val="3852525471"/>
       </p:ext>
     </p:extLst>
   </p:cSld>
@@ -387,7 +392,7 @@
           <p:cNvPr id="16" name="Picture 15" descr="Slate-V2-HD-panoPhotoInset.png">
             <a:extLst>
               <a:ext uri="{FF2B5EF4-FFF2-40B4-BE49-F238E27FC236}">
-                <a16:creationId xmlns:a16="http://schemas.microsoft.com/office/drawing/2014/main" id="{CE39118B-B3AD-4BD4-BA22-DEFF4E76CE9A}"/>
+                <a16:creationId xmlns:a16="http://schemas.microsoft.com/office/drawing/2014/main" xmlns="" id="{CE39118B-B3AD-4BD4-BA22-DEFF4E76CE9A}"/>
               </a:ext>
             </a:extLst>
           </p:cNvPr>
@@ -400,7 +405,7 @@
           <a:blip r:embed="rId2">
             <a:extLst>
               <a:ext uri="{28A0092B-C50C-407E-A947-70E740481C1C}">
-                <a14:useLocalDpi xmlns:a14="http://schemas.microsoft.com/office/drawing/2010/main" val="0"/>
+                <a14:useLocalDpi xmlns:a14="http://schemas.microsoft.com/office/drawing/2010/main" xmlns="" val="0"/>
               </a:ext>
             </a:extLst>
           </a:blip>
@@ -608,7 +613,8 @@
           <a:p>
             <a:fld id="{11F1B079-7EF0-44EE-B798-BCC497C9F3B2}" type="datetime1">
               <a:rPr lang="en-US" smtClean="0"/>
-              <a:t>3/14/2021</a:t>
+              <a:pPr/>
+              <a:t>3/24/2021</a:t>
             </a:fld>
             <a:endParaRPr lang="en-US" dirty="0"/>
           </a:p>
@@ -650,6 +656,7 @@
           <a:p>
             <a:fld id="{3A98EE3D-8CD1-4C3F-BD1C-C98C9596463C}" type="slidenum">
               <a:rPr lang="en-US" smtClean="0"/>
+              <a:pPr/>
               <a:t>‹#›</a:t>
             </a:fld>
             <a:endParaRPr lang="en-US" dirty="0"/>
@@ -659,7 +666,7 @@
     </p:spTree>
     <p:extLst>
       <p:ext uri="{BB962C8B-B14F-4D97-AF65-F5344CB8AC3E}">
-        <p14:creationId xmlns:p14="http://schemas.microsoft.com/office/powerpoint/2010/main" val="2214665590"/>
+        <p14:creationId xmlns:p14="http://schemas.microsoft.com/office/powerpoint/2010/main" xmlns="" val="2214665590"/>
       </p:ext>
     </p:extLst>
   </p:cSld>
@@ -802,7 +809,8 @@
           <a:p>
             <a:fld id="{28FF70A8-1D13-4657-95F0-A9EA54967B8D}" type="datetime1">
               <a:rPr lang="en-US" smtClean="0"/>
-              <a:t>3/14/2021</a:t>
+              <a:pPr/>
+              <a:t>3/24/2021</a:t>
             </a:fld>
             <a:endParaRPr lang="en-US" dirty="0"/>
           </a:p>
@@ -844,6 +852,7 @@
           <a:p>
             <a:fld id="{3A98EE3D-8CD1-4C3F-BD1C-C98C9596463C}" type="slidenum">
               <a:rPr lang="en-US" smtClean="0"/>
+              <a:pPr/>
               <a:t>‹#›</a:t>
             </a:fld>
             <a:endParaRPr lang="en-US" dirty="0"/>
@@ -853,7 +862,7 @@
     </p:spTree>
     <p:extLst>
       <p:ext uri="{BB962C8B-B14F-4D97-AF65-F5344CB8AC3E}">
-        <p14:creationId xmlns:p14="http://schemas.microsoft.com/office/powerpoint/2010/main" val="581205565"/>
+        <p14:creationId xmlns:p14="http://schemas.microsoft.com/office/powerpoint/2010/main" xmlns="" val="581205565"/>
       </p:ext>
     </p:extLst>
   </p:cSld>
@@ -1065,7 +1074,8 @@
           <a:p>
             <a:fld id="{21EB90AC-71BD-4C7F-8ACA-7B3F18292E63}" type="datetime1">
               <a:rPr lang="en-US" smtClean="0"/>
-              <a:t>3/14/2021</a:t>
+              <a:pPr/>
+              <a:t>3/24/2021</a:t>
             </a:fld>
             <a:endParaRPr lang="en-US" dirty="0"/>
           </a:p>
@@ -1107,6 +1117,7 @@
           <a:p>
             <a:fld id="{3A98EE3D-8CD1-4C3F-BD1C-C98C9596463C}" type="slidenum">
               <a:rPr lang="en-US" smtClean="0"/>
+              <a:pPr/>
               <a:t>‹#›</a:t>
             </a:fld>
             <a:endParaRPr lang="en-US" dirty="0"/>
@@ -1118,7 +1129,7 @@
           <p:cNvPr id="11" name="TextBox 10">
             <a:extLst>
               <a:ext uri="{FF2B5EF4-FFF2-40B4-BE49-F238E27FC236}">
-                <a16:creationId xmlns:a16="http://schemas.microsoft.com/office/drawing/2014/main" id="{223F0D53-0705-41B7-8554-09D21E7807F9}"/>
+                <a16:creationId xmlns:a16="http://schemas.microsoft.com/office/drawing/2014/main" xmlns="" id="{223F0D53-0705-41B7-8554-09D21E7807F9}"/>
               </a:ext>
             </a:extLst>
           </p:cNvPr>
@@ -1240,7 +1251,7 @@
           <p:cNvPr id="13" name="TextBox 12">
             <a:extLst>
               <a:ext uri="{FF2B5EF4-FFF2-40B4-BE49-F238E27FC236}">
-                <a16:creationId xmlns:a16="http://schemas.microsoft.com/office/drawing/2014/main" id="{C7F647CD-0F1A-4BB3-89E0-A74F1E1B098D}"/>
+                <a16:creationId xmlns:a16="http://schemas.microsoft.com/office/drawing/2014/main" xmlns="" id="{C7F647CD-0F1A-4BB3-89E0-A74F1E1B098D}"/>
               </a:ext>
             </a:extLst>
           </p:cNvPr>
@@ -1360,7 +1371,7 @@
     </p:spTree>
     <p:extLst>
       <p:ext uri="{BB962C8B-B14F-4D97-AF65-F5344CB8AC3E}">
-        <p14:creationId xmlns:p14="http://schemas.microsoft.com/office/powerpoint/2010/main" val="1480594345"/>
+        <p14:creationId xmlns:p14="http://schemas.microsoft.com/office/powerpoint/2010/main" xmlns="" val="1480594345"/>
       </p:ext>
     </p:extLst>
   </p:cSld>
@@ -1501,7 +1512,8 @@
           <a:p>
             <a:fld id="{4E6EFC2C-8905-46F0-B443-CE905B76BA01}" type="datetime1">
               <a:rPr lang="en-US" smtClean="0"/>
-              <a:t>3/14/2021</a:t>
+              <a:pPr/>
+              <a:t>3/24/2021</a:t>
             </a:fld>
             <a:endParaRPr lang="en-US" dirty="0"/>
           </a:p>
@@ -1543,6 +1555,7 @@
           <a:p>
             <a:fld id="{3A98EE3D-8CD1-4C3F-BD1C-C98C9596463C}" type="slidenum">
               <a:rPr lang="en-US" smtClean="0"/>
+              <a:pPr/>
               <a:t>‹#›</a:t>
             </a:fld>
             <a:endParaRPr lang="en-US" dirty="0"/>
@@ -1552,7 +1565,7 @@
     </p:spTree>
     <p:extLst>
       <p:ext uri="{BB962C8B-B14F-4D97-AF65-F5344CB8AC3E}">
-        <p14:creationId xmlns:p14="http://schemas.microsoft.com/office/powerpoint/2010/main" val="3158836233"/>
+        <p14:creationId xmlns:p14="http://schemas.microsoft.com/office/powerpoint/2010/main" xmlns="" val="3158836233"/>
       </p:ext>
     </p:extLst>
   </p:cSld>
@@ -2038,7 +2051,8 @@
           <a:p>
             <a:fld id="{D9079DC3-C9B5-499E-9140-0DC28B7074E2}" type="datetime1">
               <a:rPr lang="en-US" smtClean="0"/>
-              <a:t>3/14/2021</a:t>
+              <a:pPr/>
+              <a:t>3/24/2021</a:t>
             </a:fld>
             <a:endParaRPr lang="en-US" dirty="0"/>
           </a:p>
@@ -2080,6 +2094,7 @@
           <a:p>
             <a:fld id="{3A98EE3D-8CD1-4C3F-BD1C-C98C9596463C}" type="slidenum">
               <a:rPr lang="en-US" smtClean="0"/>
+              <a:pPr/>
               <a:t>‹#›</a:t>
             </a:fld>
             <a:endParaRPr lang="en-US" dirty="0"/>
@@ -2089,7 +2104,7 @@
     </p:spTree>
     <p:extLst>
       <p:ext uri="{BB962C8B-B14F-4D97-AF65-F5344CB8AC3E}">
-        <p14:creationId xmlns:p14="http://schemas.microsoft.com/office/powerpoint/2010/main" val="2387406900"/>
+        <p14:creationId xmlns:p14="http://schemas.microsoft.com/office/powerpoint/2010/main" xmlns="" val="2387406900"/>
       </p:ext>
     </p:extLst>
   </p:cSld>
@@ -2121,7 +2136,7 @@
           <p:cNvPr id="2" name="Picture 1" descr="Slate-V2-HD-3colPhotoInset.png">
             <a:extLst>
               <a:ext uri="{FF2B5EF4-FFF2-40B4-BE49-F238E27FC236}">
-                <a16:creationId xmlns:a16="http://schemas.microsoft.com/office/drawing/2014/main" id="{7E87C569-D426-4615-ADA7-B370EA98340A}"/>
+                <a16:creationId xmlns:a16="http://schemas.microsoft.com/office/drawing/2014/main" xmlns="" id="{7E87C569-D426-4615-ADA7-B370EA98340A}"/>
               </a:ext>
             </a:extLst>
           </p:cNvPr>
@@ -2134,7 +2149,7 @@
           <a:blip r:embed="rId2">
             <a:extLst>
               <a:ext uri="{28A0092B-C50C-407E-A947-70E740481C1C}">
-                <a14:useLocalDpi xmlns:a14="http://schemas.microsoft.com/office/drawing/2010/main" val="0"/>
+                <a14:useLocalDpi xmlns:a14="http://schemas.microsoft.com/office/drawing/2010/main" xmlns="" val="0"/>
               </a:ext>
             </a:extLst>
           </a:blip>
@@ -2157,7 +2172,7 @@
           <p:cNvPr id="36" name="Picture 35" descr="Slate-V2-HD-3colPhotoInset.png">
             <a:extLst>
               <a:ext uri="{FF2B5EF4-FFF2-40B4-BE49-F238E27FC236}">
-                <a16:creationId xmlns:a16="http://schemas.microsoft.com/office/drawing/2014/main" id="{7B353ED4-7AD0-46C9-88ED-1A16B1433AF7}"/>
+                <a16:creationId xmlns:a16="http://schemas.microsoft.com/office/drawing/2014/main" xmlns="" id="{7B353ED4-7AD0-46C9-88ED-1A16B1433AF7}"/>
               </a:ext>
             </a:extLst>
           </p:cNvPr>
@@ -2170,7 +2185,7 @@
           <a:blip r:embed="rId2">
             <a:extLst>
               <a:ext uri="{28A0092B-C50C-407E-A947-70E740481C1C}">
-                <a14:useLocalDpi xmlns:a14="http://schemas.microsoft.com/office/drawing/2010/main" val="0"/>
+                <a14:useLocalDpi xmlns:a14="http://schemas.microsoft.com/office/drawing/2010/main" xmlns="" val="0"/>
               </a:ext>
             </a:extLst>
           </a:blip>
@@ -2193,7 +2208,7 @@
           <p:cNvPr id="37" name="Picture 36" descr="Slate-V2-HD-3colPhotoInset.png">
             <a:extLst>
               <a:ext uri="{FF2B5EF4-FFF2-40B4-BE49-F238E27FC236}">
-                <a16:creationId xmlns:a16="http://schemas.microsoft.com/office/drawing/2014/main" id="{F561D985-AD57-459A-B3A6-EBF296039766}"/>
+                <a16:creationId xmlns:a16="http://schemas.microsoft.com/office/drawing/2014/main" xmlns="" id="{F561D985-AD57-459A-B3A6-EBF296039766}"/>
               </a:ext>
             </a:extLst>
           </p:cNvPr>
@@ -2206,7 +2221,7 @@
           <a:blip r:embed="rId2">
             <a:extLst>
               <a:ext uri="{28A0092B-C50C-407E-A947-70E740481C1C}">
-                <a14:useLocalDpi xmlns:a14="http://schemas.microsoft.com/office/drawing/2010/main" val="0"/>
+                <a14:useLocalDpi xmlns:a14="http://schemas.microsoft.com/office/drawing/2010/main" xmlns="" val="0"/>
               </a:ext>
             </a:extLst>
           </a:blip>
@@ -2920,7 +2935,8 @@
           <a:p>
             <a:fld id="{30BB33EA-E472-4D22-9C03-A9C14AA21CED}" type="datetime1">
               <a:rPr lang="en-US" smtClean="0"/>
-              <a:t>3/14/2021</a:t>
+              <a:pPr/>
+              <a:t>3/24/2021</a:t>
             </a:fld>
             <a:endParaRPr lang="en-US" dirty="0"/>
           </a:p>
@@ -2962,6 +2978,7 @@
           <a:p>
             <a:fld id="{3A98EE3D-8CD1-4C3F-BD1C-C98C9596463C}" type="slidenum">
               <a:rPr lang="en-US" smtClean="0"/>
+              <a:pPr/>
               <a:t>‹#›</a:t>
             </a:fld>
             <a:endParaRPr lang="en-US" dirty="0"/>
@@ -2971,7 +2988,7 @@
     </p:spTree>
     <p:extLst>
       <p:ext uri="{BB962C8B-B14F-4D97-AF65-F5344CB8AC3E}">
-        <p14:creationId xmlns:p14="http://schemas.microsoft.com/office/powerpoint/2010/main" val="1462302683"/>
+        <p14:creationId xmlns:p14="http://schemas.microsoft.com/office/powerpoint/2010/main" xmlns="" val="1462302683"/>
       </p:ext>
     </p:extLst>
   </p:cSld>
@@ -3090,7 +3107,8 @@
           <a:p>
             <a:fld id="{217E833E-1B6D-415F-AD29-75AE8C43BD0D}" type="datetime1">
               <a:rPr lang="en-US" smtClean="0"/>
-              <a:t>3/14/2021</a:t>
+              <a:pPr/>
+              <a:t>3/24/2021</a:t>
             </a:fld>
             <a:endParaRPr lang="en-US" dirty="0"/>
           </a:p>
@@ -3132,6 +3150,7 @@
           <a:p>
             <a:fld id="{3A98EE3D-8CD1-4C3F-BD1C-C98C9596463C}" type="slidenum">
               <a:rPr lang="en-US" smtClean="0"/>
+              <a:pPr/>
               <a:t>‹#›</a:t>
             </a:fld>
             <a:endParaRPr lang="en-US" dirty="0"/>
@@ -3141,7 +3160,7 @@
     </p:spTree>
     <p:extLst>
       <p:ext uri="{BB962C8B-B14F-4D97-AF65-F5344CB8AC3E}">
-        <p14:creationId xmlns:p14="http://schemas.microsoft.com/office/powerpoint/2010/main" val="4094158688"/>
+        <p14:creationId xmlns:p14="http://schemas.microsoft.com/office/powerpoint/2010/main" xmlns="" val="4094158688"/>
       </p:ext>
     </p:extLst>
   </p:cSld>
@@ -3274,7 +3293,8 @@
           <a:p>
             <a:fld id="{8452596F-08A7-4B70-989A-F2B1CF31E66B}" type="datetime1">
               <a:rPr lang="en-US" smtClean="0"/>
-              <a:t>3/14/2021</a:t>
+              <a:pPr/>
+              <a:t>3/24/2021</a:t>
             </a:fld>
             <a:endParaRPr lang="en-US" dirty="0"/>
           </a:p>
@@ -3316,6 +3336,7 @@
           <a:p>
             <a:fld id="{3A98EE3D-8CD1-4C3F-BD1C-C98C9596463C}" type="slidenum">
               <a:rPr lang="en-US" smtClean="0"/>
+              <a:pPr/>
               <a:t>‹#›</a:t>
             </a:fld>
             <a:endParaRPr lang="en-US" dirty="0"/>
@@ -3325,7 +3346,7 @@
     </p:spTree>
     <p:extLst>
       <p:ext uri="{BB962C8B-B14F-4D97-AF65-F5344CB8AC3E}">
-        <p14:creationId xmlns:p14="http://schemas.microsoft.com/office/powerpoint/2010/main" val="1534527743"/>
+        <p14:creationId xmlns:p14="http://schemas.microsoft.com/office/powerpoint/2010/main" xmlns="" val="1534527743"/>
       </p:ext>
     </p:extLst>
   </p:cSld>
@@ -3444,7 +3465,8 @@
           <a:p>
             <a:fld id="{73C55A3C-5767-4844-A0A3-83778C2E5409}" type="datetime1">
               <a:rPr lang="en-US" smtClean="0"/>
-              <a:t>3/14/2021</a:t>
+              <a:pPr/>
+              <a:t>3/24/2021</a:t>
             </a:fld>
             <a:endParaRPr lang="en-US" dirty="0"/>
           </a:p>
@@ -3486,6 +3508,7 @@
           <a:p>
             <a:fld id="{3A98EE3D-8CD1-4C3F-BD1C-C98C9596463C}" type="slidenum">
               <a:rPr lang="en-US" smtClean="0"/>
+              <a:pPr/>
               <a:t>‹#›</a:t>
             </a:fld>
             <a:endParaRPr lang="en-US" dirty="0"/>
@@ -3495,7 +3518,7 @@
     </p:spTree>
     <p:extLst>
       <p:ext uri="{BB962C8B-B14F-4D97-AF65-F5344CB8AC3E}">
-        <p14:creationId xmlns:p14="http://schemas.microsoft.com/office/powerpoint/2010/main" val="2785865172"/>
+        <p14:creationId xmlns:p14="http://schemas.microsoft.com/office/powerpoint/2010/main" xmlns="" val="2785865172"/>
       </p:ext>
     </p:extLst>
   </p:cSld>
@@ -3688,7 +3711,8 @@
           <a:p>
             <a:fld id="{CAE507A8-A5CF-4D38-AB86-7EDDA87A85D4}" type="datetime1">
               <a:rPr lang="en-US" smtClean="0"/>
-              <a:t>3/14/2021</a:t>
+              <a:pPr/>
+              <a:t>3/24/2021</a:t>
             </a:fld>
             <a:endParaRPr lang="en-US" dirty="0"/>
           </a:p>
@@ -3740,7 +3764,7 @@
     </p:spTree>
     <p:extLst>
       <p:ext uri="{BB962C8B-B14F-4D97-AF65-F5344CB8AC3E}">
-        <p14:creationId xmlns:p14="http://schemas.microsoft.com/office/powerpoint/2010/main" val="1226486879"/>
+        <p14:creationId xmlns:p14="http://schemas.microsoft.com/office/powerpoint/2010/main" xmlns="" val="1226486879"/>
       </p:ext>
     </p:extLst>
   </p:cSld>
@@ -3930,7 +3954,8 @@
           <a:p>
             <a:fld id="{BDFCD27C-8599-43EF-BA1D-14DDC1946E06}" type="datetime1">
               <a:rPr lang="en-US" smtClean="0"/>
-              <a:t>3/14/2021</a:t>
+              <a:pPr/>
+              <a:t>3/24/2021</a:t>
             </a:fld>
             <a:endParaRPr lang="en-US" dirty="0"/>
           </a:p>
@@ -3972,6 +3997,7 @@
           <a:p>
             <a:fld id="{3A98EE3D-8CD1-4C3F-BD1C-C98C9596463C}" type="slidenum">
               <a:rPr lang="en-US" smtClean="0"/>
+              <a:pPr/>
               <a:t>‹#›</a:t>
             </a:fld>
             <a:endParaRPr lang="en-US" dirty="0"/>
@@ -3981,7 +4007,7 @@
     </p:spTree>
     <p:extLst>
       <p:ext uri="{BB962C8B-B14F-4D97-AF65-F5344CB8AC3E}">
-        <p14:creationId xmlns:p14="http://schemas.microsoft.com/office/powerpoint/2010/main" val="3175175660"/>
+        <p14:creationId xmlns:p14="http://schemas.microsoft.com/office/powerpoint/2010/main" xmlns="" val="3175175660"/>
       </p:ext>
     </p:extLst>
   </p:cSld>
@@ -4013,7 +4039,7 @@
           <p:cNvPr id="20" name="Picture 19" descr="Slate-V2-HD-compPhotoInset.png">
             <a:extLst>
               <a:ext uri="{FF2B5EF4-FFF2-40B4-BE49-F238E27FC236}">
-                <a16:creationId xmlns:a16="http://schemas.microsoft.com/office/drawing/2014/main" id="{37B721FF-D609-4D98-9D19-CF75AA8A54FC}"/>
+                <a16:creationId xmlns:a16="http://schemas.microsoft.com/office/drawing/2014/main" xmlns="" id="{37B721FF-D609-4D98-9D19-CF75AA8A54FC}"/>
               </a:ext>
             </a:extLst>
           </p:cNvPr>
@@ -4026,7 +4052,7 @@
           <a:blip r:embed="rId2">
             <a:extLst>
               <a:ext uri="{28A0092B-C50C-407E-A947-70E740481C1C}">
-                <a14:useLocalDpi xmlns:a14="http://schemas.microsoft.com/office/drawing/2010/main" val="0"/>
+                <a14:useLocalDpi xmlns:a14="http://schemas.microsoft.com/office/drawing/2010/main" xmlns="" val="0"/>
               </a:ext>
             </a:extLst>
           </a:blip>
@@ -4049,7 +4075,7 @@
           <p:cNvPr id="21" name="Picture 20" descr="Slate-V2-HD-compPhotoInset.png">
             <a:extLst>
               <a:ext uri="{FF2B5EF4-FFF2-40B4-BE49-F238E27FC236}">
-                <a16:creationId xmlns:a16="http://schemas.microsoft.com/office/drawing/2014/main" id="{073936BD-C868-433F-8E84-D6DD8E640E3E}"/>
+                <a16:creationId xmlns:a16="http://schemas.microsoft.com/office/drawing/2014/main" xmlns="" id="{073936BD-C868-433F-8E84-D6DD8E640E3E}"/>
               </a:ext>
             </a:extLst>
           </p:cNvPr>
@@ -4062,7 +4088,7 @@
           <a:blip r:embed="rId2">
             <a:extLst>
               <a:ext uri="{28A0092B-C50C-407E-A947-70E740481C1C}">
-                <a14:useLocalDpi xmlns:a14="http://schemas.microsoft.com/office/drawing/2010/main" val="0"/>
+                <a14:useLocalDpi xmlns:a14="http://schemas.microsoft.com/office/drawing/2010/main" xmlns="" val="0"/>
               </a:ext>
             </a:extLst>
           </a:blip>
@@ -4413,7 +4439,8 @@
           <a:p>
             <a:fld id="{49343D99-809A-49C0-96E5-4250D0B498EE}" type="datetime1">
               <a:rPr lang="en-US" smtClean="0"/>
-              <a:t>3/14/2021</a:t>
+              <a:pPr/>
+              <a:t>3/24/2021</a:t>
             </a:fld>
             <a:endParaRPr lang="en-US" dirty="0"/>
           </a:p>
@@ -4455,6 +4482,7 @@
           <a:p>
             <a:fld id="{3A98EE3D-8CD1-4C3F-BD1C-C98C9596463C}" type="slidenum">
               <a:rPr lang="en-US" smtClean="0"/>
+              <a:pPr/>
               <a:t>‹#›</a:t>
             </a:fld>
             <a:endParaRPr lang="en-US" dirty="0"/>
@@ -4464,7 +4492,7 @@
     </p:spTree>
     <p:extLst>
       <p:ext uri="{BB962C8B-B14F-4D97-AF65-F5344CB8AC3E}">
-        <p14:creationId xmlns:p14="http://schemas.microsoft.com/office/powerpoint/2010/main" val="2608887001"/>
+        <p14:creationId xmlns:p14="http://schemas.microsoft.com/office/powerpoint/2010/main" xmlns="" val="2608887001"/>
       </p:ext>
     </p:extLst>
   </p:cSld>
@@ -4531,7 +4559,8 @@
           <a:p>
             <a:fld id="{A143DE9B-B678-4EFB-BB7D-A4370204A0B0}" type="datetime1">
               <a:rPr lang="en-US" smtClean="0"/>
-              <a:t>3/14/2021</a:t>
+              <a:pPr/>
+              <a:t>3/24/2021</a:t>
             </a:fld>
             <a:endParaRPr lang="en-US" dirty="0"/>
           </a:p>
@@ -4573,6 +4602,7 @@
           <a:p>
             <a:fld id="{3A98EE3D-8CD1-4C3F-BD1C-C98C9596463C}" type="slidenum">
               <a:rPr lang="en-US" smtClean="0"/>
+              <a:pPr/>
               <a:t>‹#›</a:t>
             </a:fld>
             <a:endParaRPr lang="en-US" dirty="0"/>
@@ -4582,7 +4612,7 @@
     </p:spTree>
     <p:extLst>
       <p:ext uri="{BB962C8B-B14F-4D97-AF65-F5344CB8AC3E}">
-        <p14:creationId xmlns:p14="http://schemas.microsoft.com/office/powerpoint/2010/main" val="2164888601"/>
+        <p14:creationId xmlns:p14="http://schemas.microsoft.com/office/powerpoint/2010/main" xmlns="" val="2164888601"/>
       </p:ext>
     </p:extLst>
   </p:cSld>
@@ -4626,7 +4656,8 @@
           <a:p>
             <a:fld id="{E68812DA-F765-4142-A6A3-A8ED7235E082}" type="datetime1">
               <a:rPr lang="en-US" smtClean="0"/>
-              <a:t>3/14/2021</a:t>
+              <a:pPr/>
+              <a:t>3/24/2021</a:t>
             </a:fld>
             <a:endParaRPr lang="en-US" dirty="0"/>
           </a:p>
@@ -4668,6 +4699,7 @@
           <a:p>
             <a:fld id="{3A98EE3D-8CD1-4C3F-BD1C-C98C9596463C}" type="slidenum">
               <a:rPr lang="en-US" smtClean="0"/>
+              <a:pPr/>
               <a:t>‹#›</a:t>
             </a:fld>
             <a:endParaRPr lang="en-US" dirty="0"/>
@@ -4677,7 +4709,7 @@
     </p:spTree>
     <p:extLst>
       <p:ext uri="{BB962C8B-B14F-4D97-AF65-F5344CB8AC3E}">
-        <p14:creationId xmlns:p14="http://schemas.microsoft.com/office/powerpoint/2010/main" val="765916630"/>
+        <p14:creationId xmlns:p14="http://schemas.microsoft.com/office/powerpoint/2010/main" xmlns="" val="765916630"/>
       </p:ext>
     </p:extLst>
   </p:cSld>
@@ -4881,7 +4913,8 @@
           <a:p>
             <a:fld id="{3E0277FD-7DE6-41D4-930D-AC99F5AFE54E}" type="datetime1">
               <a:rPr lang="en-US" smtClean="0"/>
-              <a:t>3/14/2021</a:t>
+              <a:pPr/>
+              <a:t>3/24/2021</a:t>
             </a:fld>
             <a:endParaRPr lang="en-US" dirty="0"/>
           </a:p>
@@ -4933,7 +4966,7 @@
     </p:spTree>
     <p:extLst>
       <p:ext uri="{BB962C8B-B14F-4D97-AF65-F5344CB8AC3E}">
-        <p14:creationId xmlns:p14="http://schemas.microsoft.com/office/powerpoint/2010/main" val="596479147"/>
+        <p14:creationId xmlns:p14="http://schemas.microsoft.com/office/powerpoint/2010/main" xmlns="" val="596479147"/>
       </p:ext>
     </p:extLst>
   </p:cSld>
@@ -4965,7 +4998,7 @@
           <p:cNvPr id="22" name="Picture 21" descr="Slate-V2-HD-vertPhotoInset.png">
             <a:extLst>
               <a:ext uri="{FF2B5EF4-FFF2-40B4-BE49-F238E27FC236}">
-                <a16:creationId xmlns:a16="http://schemas.microsoft.com/office/drawing/2014/main" id="{4D06E496-ACBA-4063-B4A1-C5C484EE5A77}"/>
+                <a16:creationId xmlns:a16="http://schemas.microsoft.com/office/drawing/2014/main" xmlns="" id="{4D06E496-ACBA-4063-B4A1-C5C484EE5A77}"/>
               </a:ext>
             </a:extLst>
           </p:cNvPr>
@@ -4978,7 +5011,7 @@
           <a:blip r:embed="rId2">
             <a:extLst>
               <a:ext uri="{28A0092B-C50C-407E-A947-70E740481C1C}">
-                <a14:useLocalDpi xmlns:a14="http://schemas.microsoft.com/office/drawing/2010/main" val="0"/>
+                <a14:useLocalDpi xmlns:a14="http://schemas.microsoft.com/office/drawing/2010/main" xmlns="" val="0"/>
               </a:ext>
             </a:extLst>
           </a:blip>
@@ -5188,7 +5221,8 @@
           <a:p>
             <a:fld id="{9EA15526-7079-4B7B-987C-1B5FAE11A0FF}" type="datetime1">
               <a:rPr lang="en-US" smtClean="0"/>
-              <a:t>3/14/2021</a:t>
+              <a:pPr/>
+              <a:t>3/24/2021</a:t>
             </a:fld>
             <a:endParaRPr lang="en-US" dirty="0"/>
           </a:p>
@@ -5231,6 +5265,7 @@
           <a:p>
             <a:fld id="{3A98EE3D-8CD1-4C3F-BD1C-C98C9596463C}" type="slidenum">
               <a:rPr lang="en-US" smtClean="0"/>
+              <a:pPr/>
               <a:t>‹#›</a:t>
             </a:fld>
             <a:endParaRPr lang="en-US" dirty="0"/>
@@ -5240,7 +5275,7 @@
     </p:spTree>
     <p:extLst>
       <p:ext uri="{BB962C8B-B14F-4D97-AF65-F5344CB8AC3E}">
-        <p14:creationId xmlns:p14="http://schemas.microsoft.com/office/powerpoint/2010/main" val="1426378702"/>
+        <p14:creationId xmlns:p14="http://schemas.microsoft.com/office/powerpoint/2010/main" xmlns="" val="1426378702"/>
       </p:ext>
     </p:extLst>
   </p:cSld>
@@ -5423,7 +5458,8 @@
           <a:p>
             <a:fld id="{073ED0CC-082F-4160-86E5-0D6041F12778}" type="datetime1">
               <a:rPr lang="en-US" smtClean="0"/>
-              <a:t>3/14/2021</a:t>
+              <a:pPr/>
+              <a:t>3/24/2021</a:t>
             </a:fld>
             <a:endParaRPr lang="en-US" dirty="0"/>
           </a:p>
@@ -5515,6 +5551,7 @@
           <a:p>
             <a:fld id="{3A98EE3D-8CD1-4C3F-BD1C-C98C9596463C}" type="slidenum">
               <a:rPr lang="en-US" smtClean="0"/>
+              <a:pPr/>
               <a:t>‹#›</a:t>
             </a:fld>
             <a:endParaRPr lang="en-US" dirty="0"/>
@@ -5524,7 +5561,7 @@
     </p:spTree>
     <p:extLst>
       <p:ext uri="{BB962C8B-B14F-4D97-AF65-F5344CB8AC3E}">
-        <p14:creationId xmlns:p14="http://schemas.microsoft.com/office/powerpoint/2010/main" val="1069802776"/>
+        <p14:creationId xmlns:p14="http://schemas.microsoft.com/office/powerpoint/2010/main" xmlns="" val="1069802776"/>
       </p:ext>
     </p:extLst>
   </p:cSld>
@@ -6128,7 +6165,7 @@
           <p:cNvPr id="5" name="Picture 4" descr="A picture containing cup, coffee, food, beverage&#10;&#10;Description automatically generated">
             <a:extLst>
               <a:ext uri="{FF2B5EF4-FFF2-40B4-BE49-F238E27FC236}">
-                <a16:creationId xmlns:a16="http://schemas.microsoft.com/office/drawing/2014/main" id="{91BC5572-FC33-4C1C-8DEE-C2CF75A75641}"/>
+                <a16:creationId xmlns:a16="http://schemas.microsoft.com/office/drawing/2014/main" xmlns="" id="{91BC5572-FC33-4C1C-8DEE-C2CF75A75641}"/>
               </a:ext>
             </a:extLst>
           </p:cNvPr>
@@ -6142,7 +6179,7 @@
             <a:alphaModFix amt="35000"/>
             <a:extLst>
               <a:ext uri="{28A0092B-C50C-407E-A947-70E740481C1C}">
-                <a14:useLocalDpi xmlns:a14="http://schemas.microsoft.com/office/drawing/2010/main" val="0"/>
+                <a14:useLocalDpi xmlns:a14="http://schemas.microsoft.com/office/drawing/2010/main" xmlns="" val="0"/>
               </a:ext>
             </a:extLst>
           </a:blip>
@@ -6164,7 +6201,7 @@
           <p:cNvPr id="2" name="Title 1">
             <a:extLst>
               <a:ext uri="{FF2B5EF4-FFF2-40B4-BE49-F238E27FC236}">
-                <a16:creationId xmlns:a16="http://schemas.microsoft.com/office/drawing/2014/main" id="{0D1F047C-C727-42A7-85C5-68C5AA1B1A93}"/>
+                <a16:creationId xmlns:a16="http://schemas.microsoft.com/office/drawing/2014/main" xmlns="" id="{0D1F047C-C727-42A7-85C5-68C5AA1B1A93}"/>
               </a:ext>
             </a:extLst>
           </p:cNvPr>
@@ -6199,7 +6236,7 @@
           <p:cNvPr id="3" name="Subtitle 2">
             <a:extLst>
               <a:ext uri="{FF2B5EF4-FFF2-40B4-BE49-F238E27FC236}">
-                <a16:creationId xmlns:a16="http://schemas.microsoft.com/office/drawing/2014/main" id="{DB93FB3F-A8D4-46D3-A1C6-C79C64563729}"/>
+                <a16:creationId xmlns:a16="http://schemas.microsoft.com/office/drawing/2014/main" xmlns="" id="{DB93FB3F-A8D4-46D3-A1C6-C79C64563729}"/>
               </a:ext>
             </a:extLst>
           </p:cNvPr>
@@ -6232,9 +6269,502 @@
     </p:spTree>
     <p:extLst>
       <p:ext uri="{BB962C8B-B14F-4D97-AF65-F5344CB8AC3E}">
-        <p14:creationId xmlns:p14="http://schemas.microsoft.com/office/powerpoint/2010/main" val="633738316"/>
+        <p14:creationId xmlns:p14="http://schemas.microsoft.com/office/powerpoint/2010/main" xmlns="" val="633738316"/>
       </p:ext>
     </p:extLst>
+  </p:cSld>
+  <p:clrMapOvr>
+    <a:masterClrMapping/>
+  </p:clrMapOvr>
+</p:sld>
+</file>
+
+<file path=ppt/slides/slide10.xml><?xml version="1.0" encoding="utf-8"?>
+<p:sld xmlns:a="http://schemas.openxmlformats.org/drawingml/2006/main" xmlns:r="http://schemas.openxmlformats.org/officeDocument/2006/relationships" xmlns:p="http://schemas.openxmlformats.org/presentationml/2006/main">
+  <p:cSld>
+    <p:spTree>
+      <p:nvGrpSpPr>
+        <p:cNvPr id="1" name=""/>
+        <p:cNvGrpSpPr/>
+        <p:nvPr/>
+      </p:nvGrpSpPr>
+      <p:grpSpPr>
+        <a:xfrm>
+          <a:off x="0" y="0"/>
+          <a:ext cx="0" cy="0"/>
+          <a:chOff x="0" y="0"/>
+          <a:chExt cx="0" cy="0"/>
+        </a:xfrm>
+      </p:grpSpPr>
+      <p:sp>
+        <p:nvSpPr>
+          <p:cNvPr id="2" name="Title 1">
+            <a:extLst>
+              <a:ext uri="{FF2B5EF4-FFF2-40B4-BE49-F238E27FC236}">
+                <a16:creationId xmlns:a16="http://schemas.microsoft.com/office/drawing/2014/main" xmlns="" id="{36AFE36C-17C6-4686-896D-F89A7C633E12}"/>
+              </a:ext>
+            </a:extLst>
+          </p:cNvPr>
+          <p:cNvSpPr>
+            <a:spLocks noGrp="1"/>
+          </p:cNvSpPr>
+          <p:nvPr>
+            <p:ph type="title"/>
+          </p:nvPr>
+        </p:nvSpPr>
+        <p:spPr/>
+        <p:txBody>
+          <a:bodyPr>
+            <a:normAutofit/>
+          </a:bodyPr>
+          <a:lstStyle/>
+          <a:p>
+            <a:r>
+              <a:rPr lang="en-GB" dirty="0" smtClean="0"/>
+              <a:t>PHP</a:t>
+            </a:r>
+            <a:r>
+              <a:rPr lang="en-GB" dirty="0" smtClean="0"/>
+              <a:t> </a:t>
+            </a:r>
+            <a:r>
+              <a:rPr lang="en-GB" dirty="0"/>
+              <a:t>- Examples of programming languages</a:t>
+            </a:r>
+            <a:endParaRPr lang="en-MT" dirty="0"/>
+          </a:p>
+        </p:txBody>
+      </p:sp>
+      <p:graphicFrame>
+        <p:nvGraphicFramePr>
+          <p:cNvPr id="4" name="Table 4">
+            <a:extLst>
+              <a:ext uri="{FF2B5EF4-FFF2-40B4-BE49-F238E27FC236}">
+                <a16:creationId xmlns:a16="http://schemas.microsoft.com/office/drawing/2014/main" xmlns="" id="{8338BB71-8843-4743-8B87-58B20D4C4A6F}"/>
+              </a:ext>
+            </a:extLst>
+          </p:cNvPr>
+          <p:cNvGraphicFramePr>
+            <a:graphicFrameLocks noGrp="1"/>
+          </p:cNvGraphicFramePr>
+          <p:nvPr>
+            <p:ph idx="1"/>
+            <p:extLst>
+              <p:ext uri="{D42A27DB-BD31-4B8C-83A1-F6EECF244321}">
+                <p14:modId xmlns:p14="http://schemas.microsoft.com/office/powerpoint/2010/main" xmlns="" val="1056110357"/>
+              </p:ext>
+            </p:extLst>
+          </p:nvPr>
+        </p:nvGraphicFramePr>
+        <p:xfrm>
+          <a:off x="914400" y="1866900"/>
+          <a:ext cx="10353157" cy="4660852"/>
+        </p:xfrm>
+        <a:graphic>
+          <a:graphicData uri="http://schemas.openxmlformats.org/drawingml/2006/table">
+            <a:tbl>
+              <a:tblPr firstRow="1" bandRow="1">
+                <a:tableStyleId>{69CF1AB2-1976-4502-BF36-3FF5EA218861}</a:tableStyleId>
+              </a:tblPr>
+              <a:tblGrid>
+                <a:gridCol w="2785403">
+                  <a:extLst>
+                    <a:ext uri="{9D8B030D-6E8A-4147-A177-3AD203B41FA5}">
+                      <a16:colId xmlns:a16="http://schemas.microsoft.com/office/drawing/2014/main" xmlns="" val="2977297550"/>
+                    </a:ext>
+                  </a:extLst>
+                </a:gridCol>
+                <a:gridCol w="3010486">
+                  <a:extLst>
+                    <a:ext uri="{9D8B030D-6E8A-4147-A177-3AD203B41FA5}">
+                      <a16:colId xmlns:a16="http://schemas.microsoft.com/office/drawing/2014/main" xmlns="" val="1906464382"/>
+                    </a:ext>
+                  </a:extLst>
+                </a:gridCol>
+                <a:gridCol w="4557268">
+                  <a:extLst>
+                    <a:ext uri="{9D8B030D-6E8A-4147-A177-3AD203B41FA5}">
+                      <a16:colId xmlns:a16="http://schemas.microsoft.com/office/drawing/2014/main" xmlns="" val="565535634"/>
+                    </a:ext>
+                  </a:extLst>
+                </a:gridCol>
+              </a:tblGrid>
+              <a:tr h="514944">
+                <a:tc rowSpan="4">
+                  <a:txBody>
+                    <a:bodyPr/>
+                    <a:lstStyle/>
+                    <a:p>
+                      <a:endParaRPr lang="en-MT" dirty="0"/>
+                    </a:p>
+                  </a:txBody>
+                  <a:tcPr/>
+                </a:tc>
+                <a:tc>
+                  <a:txBody>
+                    <a:bodyPr/>
+                    <a:lstStyle/>
+                    <a:p>
+                      <a:pPr algn="ctr"/>
+                      <a:r>
+                        <a:rPr lang="en-GB" sz="2000" b="1" dirty="0"/>
+                        <a:t>Compiled or Interpreted?</a:t>
+                      </a:r>
+                    </a:p>
+                  </a:txBody>
+                  <a:tcPr anchor="ctr"/>
+                </a:tc>
+                <a:tc>
+                  <a:txBody>
+                    <a:bodyPr/>
+                    <a:lstStyle/>
+                    <a:p>
+                      <a:r>
+                        <a:rPr lang="en-GB" b="0" dirty="0" smtClean="0"/>
+                        <a:t>Both</a:t>
+                      </a:r>
+                      <a:r>
+                        <a:rPr lang="en-GB" b="0" baseline="0" dirty="0" smtClean="0"/>
+                        <a:t> (.java source code is compiled to binary (0’s and 1’s) and then the Java Virtual Machine, an interpreter, is required to execute the binary)</a:t>
+                      </a:r>
+                      <a:endParaRPr lang="en-MT" b="0" dirty="0"/>
+                    </a:p>
+                  </a:txBody>
+                  <a:tcPr anchor="ctr"/>
+                </a:tc>
+                <a:extLst>
+                  <a:ext uri="{0D108BD9-81ED-4DB2-BD59-A6C34878D82A}">
+                    <a16:rowId xmlns:a16="http://schemas.microsoft.com/office/drawing/2014/main" xmlns="" val="3447666898"/>
+                  </a:ext>
+                </a:extLst>
+              </a:tr>
+              <a:tr h="1572318">
+                <a:tc vMerge="1">
+                  <a:txBody>
+                    <a:bodyPr/>
+                    <a:lstStyle/>
+                    <a:p>
+                      <a:endParaRPr lang="en-MT" dirty="0"/>
+                    </a:p>
+                  </a:txBody>
+                  <a:tcPr/>
+                </a:tc>
+                <a:tc>
+                  <a:txBody>
+                    <a:bodyPr/>
+                    <a:lstStyle/>
+                    <a:p>
+                      <a:pPr algn="ctr"/>
+                      <a:r>
+                        <a:rPr lang="en-GB" sz="2000" b="1" dirty="0"/>
+                        <a:t>Common uses</a:t>
+                      </a:r>
+                      <a:endParaRPr lang="en-MT" sz="2000" b="1" dirty="0"/>
+                    </a:p>
+                  </a:txBody>
+                  <a:tcPr anchor="ctr"/>
+                </a:tc>
+                <a:tc>
+                  <a:txBody>
+                    <a:bodyPr/>
+                    <a:lstStyle/>
+                    <a:p>
+                      <a:pPr marL="285750" indent="-285750" algn="l">
+                        <a:buFont typeface="Arial" panose="020B0604020202020204" pitchFamily="34" charset="0"/>
+                        <a:buChar char="•"/>
+                      </a:pPr>
+                      <a:r>
+                        <a:rPr lang="en-GB" baseline="0" dirty="0" smtClean="0"/>
+                        <a:t>Native mobile/tablet applications development via Android Studio, although </a:t>
+                      </a:r>
+                      <a:r>
+                        <a:rPr lang="en-GB" baseline="0" dirty="0" err="1" smtClean="0"/>
+                        <a:t>Kotlin</a:t>
+                      </a:r>
+                      <a:r>
+                        <a:rPr lang="en-GB" baseline="0" dirty="0" smtClean="0"/>
+                        <a:t> is more preferred nowadays for Android development.</a:t>
+                      </a:r>
+                    </a:p>
+                    <a:p>
+                      <a:pPr marL="285750" indent="-285750" algn="l">
+                        <a:buFont typeface="Arial" panose="020B0604020202020204" pitchFamily="34" charset="0"/>
+                        <a:buChar char="•"/>
+                      </a:pPr>
+                      <a:r>
+                        <a:rPr lang="en-GB" baseline="0" dirty="0" smtClean="0"/>
+                        <a:t>Web scraping via Selenium</a:t>
+                      </a:r>
+                    </a:p>
+                    <a:p>
+                      <a:pPr marL="285750" indent="-285750" algn="l">
+                        <a:buFont typeface="Arial" panose="020B0604020202020204" pitchFamily="34" charset="0"/>
+                        <a:buChar char="•"/>
+                      </a:pPr>
+                      <a:r>
+                        <a:rPr lang="en-GB" baseline="0" dirty="0" smtClean="0"/>
+                        <a:t>Web development via JSP</a:t>
+                      </a:r>
+                    </a:p>
+                    <a:p>
+                      <a:pPr marL="285750" indent="-285750" algn="l">
+                        <a:buFont typeface="Arial" panose="020B0604020202020204" pitchFamily="34" charset="0"/>
+                        <a:buChar char="•"/>
+                      </a:pPr>
+                      <a:r>
+                        <a:rPr lang="en-GB" baseline="0" dirty="0" smtClean="0"/>
+                        <a:t>Developing GUI applications with a look and feel of the Windows operating system.</a:t>
+                      </a:r>
+                    </a:p>
+                    <a:p>
+                      <a:pPr marL="285750" indent="-285750" algn="l">
+                        <a:buFont typeface="Arial" panose="020B0604020202020204" pitchFamily="34" charset="0"/>
+                        <a:buChar char="•"/>
+                      </a:pPr>
+                      <a:r>
+                        <a:rPr lang="en-GB" baseline="0" dirty="0" smtClean="0"/>
+                        <a:t>Game development</a:t>
+                      </a:r>
+                    </a:p>
+                  </a:txBody>
+                  <a:tcPr anchor="ctr"/>
+                </a:tc>
+                <a:extLst>
+                  <a:ext uri="{0D108BD9-81ED-4DB2-BD59-A6C34878D82A}">
+                    <a16:rowId xmlns:a16="http://schemas.microsoft.com/office/drawing/2014/main" xmlns="" val="221003645"/>
+                  </a:ext>
+                </a:extLst>
+              </a:tr>
+              <a:tr h="576532">
+                <a:tc vMerge="1">
+                  <a:txBody>
+                    <a:bodyPr/>
+                    <a:lstStyle/>
+                    <a:p>
+                      <a:endParaRPr lang="en-MT" dirty="0"/>
+                    </a:p>
+                  </a:txBody>
+                  <a:tcPr/>
+                </a:tc>
+                <a:tc>
+                  <a:txBody>
+                    <a:bodyPr/>
+                    <a:lstStyle/>
+                    <a:p>
+                      <a:pPr algn="ctr"/>
+                      <a:r>
+                        <a:rPr lang="en-GB" sz="2000" b="1" dirty="0"/>
+                        <a:t>Developer</a:t>
+                      </a:r>
+                      <a:endParaRPr lang="en-MT" sz="2000" b="1" dirty="0"/>
+                    </a:p>
+                  </a:txBody>
+                  <a:tcPr anchor="ctr"/>
+                </a:tc>
+                <a:tc>
+                  <a:txBody>
+                    <a:bodyPr/>
+                    <a:lstStyle/>
+                    <a:p>
+                      <a:r>
+                        <a:rPr lang="en-US" sz="1800" b="0" i="0" kern="1200" dirty="0" err="1" smtClean="0">
+                          <a:solidFill>
+                            <a:schemeClr val="dk1"/>
+                          </a:solidFill>
+                          <a:latin typeface="+mn-lt"/>
+                          <a:ea typeface="+mn-ea"/>
+                          <a:cs typeface="+mn-cs"/>
+                        </a:rPr>
+                        <a:t>Rasmus</a:t>
+                      </a:r>
+                      <a:r>
+                        <a:rPr lang="en-US" sz="1800" b="0" i="0" kern="1200" dirty="0" smtClean="0">
+                          <a:solidFill>
+                            <a:schemeClr val="dk1"/>
+                          </a:solidFill>
+                          <a:latin typeface="+mn-lt"/>
+                          <a:ea typeface="+mn-ea"/>
+                          <a:cs typeface="+mn-cs"/>
+                        </a:rPr>
+                        <a:t> </a:t>
+                      </a:r>
+                      <a:r>
+                        <a:rPr lang="en-US" sz="1800" b="0" i="0" kern="1200" dirty="0" err="1" smtClean="0">
+                          <a:solidFill>
+                            <a:schemeClr val="dk1"/>
+                          </a:solidFill>
+                          <a:latin typeface="+mn-lt"/>
+                          <a:ea typeface="+mn-ea"/>
+                          <a:cs typeface="+mn-cs"/>
+                        </a:rPr>
+                        <a:t>Lerdorf</a:t>
+                      </a:r>
+                      <a:endParaRPr lang="en-MT" dirty="0"/>
+                    </a:p>
+                  </a:txBody>
+                  <a:tcPr anchor="ctr"/>
+                </a:tc>
+                <a:extLst>
+                  <a:ext uri="{0D108BD9-81ED-4DB2-BD59-A6C34878D82A}">
+                    <a16:rowId xmlns:a16="http://schemas.microsoft.com/office/drawing/2014/main" xmlns="" val="792754675"/>
+                  </a:ext>
+                </a:extLst>
+              </a:tr>
+              <a:tr h="514944">
+                <a:tc vMerge="1">
+                  <a:txBody>
+                    <a:bodyPr/>
+                    <a:lstStyle/>
+                    <a:p>
+                      <a:endParaRPr lang="en-MT" dirty="0"/>
+                    </a:p>
+                  </a:txBody>
+                  <a:tcPr/>
+                </a:tc>
+                <a:tc>
+                  <a:txBody>
+                    <a:bodyPr/>
+                    <a:lstStyle/>
+                    <a:p>
+                      <a:pPr algn="ctr"/>
+                      <a:r>
+                        <a:rPr lang="en-GB" sz="2000" b="1" dirty="0"/>
+                        <a:t>First appeared</a:t>
+                      </a:r>
+                      <a:endParaRPr lang="en-MT" sz="2000" b="1" dirty="0"/>
+                    </a:p>
+                  </a:txBody>
+                  <a:tcPr anchor="ctr"/>
+                </a:tc>
+                <a:tc>
+                  <a:txBody>
+                    <a:bodyPr/>
+                    <a:lstStyle/>
+                    <a:p>
+                      <a:r>
+                        <a:rPr lang="en-GB" dirty="0" smtClean="0"/>
+                        <a:t>20 February</a:t>
+                      </a:r>
+                      <a:r>
+                        <a:rPr lang="en-GB" baseline="0" dirty="0" smtClean="0"/>
+                        <a:t> 1991 </a:t>
+                      </a:r>
+                    </a:p>
+                    <a:p>
+                      <a:r>
+                        <a:rPr lang="en-GB" sz="1600" baseline="0" dirty="0" smtClean="0"/>
+                        <a:t>(development first started in December 1989)</a:t>
+                      </a:r>
+                      <a:endParaRPr lang="en-MT" dirty="0"/>
+                    </a:p>
+                  </a:txBody>
+                  <a:tcPr anchor="ctr"/>
+                </a:tc>
+                <a:extLst>
+                  <a:ext uri="{0D108BD9-81ED-4DB2-BD59-A6C34878D82A}">
+                    <a16:rowId xmlns:a16="http://schemas.microsoft.com/office/drawing/2014/main" xmlns="" val="3790524959"/>
+                  </a:ext>
+                </a:extLst>
+              </a:tr>
+            </a:tbl>
+          </a:graphicData>
+        </a:graphic>
+      </p:graphicFrame>
+      <p:pic>
+        <p:nvPicPr>
+          <p:cNvPr id="29698" name="Picture 2" descr="See the source image"/>
+          <p:cNvPicPr>
+            <a:picLocks noChangeAspect="1" noChangeArrowheads="1"/>
+          </p:cNvPicPr>
+          <p:nvPr/>
+        </p:nvPicPr>
+        <p:blipFill>
+          <a:blip r:embed="rId2"/>
+          <a:srcRect/>
+          <a:stretch>
+            <a:fillRect/>
+          </a:stretch>
+        </p:blipFill>
+        <p:spPr bwMode="auto">
+          <a:xfrm>
+            <a:off x="983479" y="3423852"/>
+            <a:ext cx="2607185" cy="1790700"/>
+          </a:xfrm>
+          <a:prstGeom prst="rect">
+            <a:avLst/>
+          </a:prstGeom>
+          <a:noFill/>
+        </p:spPr>
+      </p:pic>
+    </p:spTree>
+    <p:extLst>
+      <p:ext uri="{BB962C8B-B14F-4D97-AF65-F5344CB8AC3E}">
+        <p14:creationId xmlns:p14="http://schemas.microsoft.com/office/powerpoint/2010/main" xmlns="" val="3120296696"/>
+      </p:ext>
+    </p:extLst>
+  </p:cSld>
+  <p:clrMapOvr>
+    <a:masterClrMapping/>
+  </p:clrMapOvr>
+</p:sld>
+</file>
+
+<file path=ppt/slides/slide11.xml><?xml version="1.0" encoding="utf-8"?>
+<p:sld xmlns:a="http://schemas.openxmlformats.org/drawingml/2006/main" xmlns:r="http://schemas.openxmlformats.org/officeDocument/2006/relationships" xmlns:p="http://schemas.openxmlformats.org/presentationml/2006/main">
+  <p:cSld>
+    <p:spTree>
+      <p:nvGrpSpPr>
+        <p:cNvPr id="1" name=""/>
+        <p:cNvGrpSpPr/>
+        <p:nvPr/>
+      </p:nvGrpSpPr>
+      <p:grpSpPr>
+        <a:xfrm>
+          <a:off x="0" y="0"/>
+          <a:ext cx="0" cy="0"/>
+          <a:chOff x="0" y="0"/>
+          <a:chExt cx="0" cy="0"/>
+        </a:xfrm>
+      </p:grpSpPr>
+      <p:sp>
+        <p:nvSpPr>
+          <p:cNvPr id="2" name="Title 1"/>
+          <p:cNvSpPr>
+            <a:spLocks noGrp="1"/>
+          </p:cNvSpPr>
+          <p:nvPr>
+            <p:ph type="title"/>
+          </p:nvPr>
+        </p:nvSpPr>
+        <p:spPr/>
+        <p:txBody>
+          <a:bodyPr/>
+          <a:lstStyle/>
+          <a:p>
+            <a:endParaRPr lang="en-US"/>
+          </a:p>
+        </p:txBody>
+      </p:sp>
+      <p:sp>
+        <p:nvSpPr>
+          <p:cNvPr id="3" name="Content Placeholder 2"/>
+          <p:cNvSpPr>
+            <a:spLocks noGrp="1"/>
+          </p:cNvSpPr>
+          <p:nvPr>
+            <p:ph idx="1"/>
+          </p:nvPr>
+        </p:nvSpPr>
+        <p:spPr/>
+        <p:txBody>
+          <a:bodyPr/>
+          <a:lstStyle/>
+          <a:p>
+            <a:endParaRPr lang="en-US" dirty="0"/>
+          </a:p>
+        </p:txBody>
+      </p:sp>
+    </p:spTree>
   </p:cSld>
   <p:clrMapOvr>
     <a:masterClrMapping/>
@@ -6287,7 +6817,7 @@
           <p:cNvPr id="2" name="Title 1">
             <a:extLst>
               <a:ext uri="{FF2B5EF4-FFF2-40B4-BE49-F238E27FC236}">
-                <a16:creationId xmlns:a16="http://schemas.microsoft.com/office/drawing/2014/main" id="{9D6A748D-BEEC-43A4-BFF3-B31C0275A5D9}"/>
+                <a16:creationId xmlns:a16="http://schemas.microsoft.com/office/drawing/2014/main" xmlns="" id="{9D6A748D-BEEC-43A4-BFF3-B31C0275A5D9}"/>
               </a:ext>
             </a:extLst>
           </p:cNvPr>
@@ -6322,7 +6852,7 @@
           <p:cNvPr id="1028" name="Picture 4" descr="See the source image">
             <a:extLst>
               <a:ext uri="{FF2B5EF4-FFF2-40B4-BE49-F238E27FC236}">
-                <a16:creationId xmlns:a16="http://schemas.microsoft.com/office/drawing/2014/main" id="{AAAD645A-4FF5-4E7B-9DAF-C5C3BD71A431}"/>
+                <a16:creationId xmlns:a16="http://schemas.microsoft.com/office/drawing/2014/main" xmlns="" id="{AAAD645A-4FF5-4E7B-9DAF-C5C3BD71A431}"/>
               </a:ext>
             </a:extLst>
           </p:cNvPr>
@@ -6335,7 +6865,7 @@
           <a:blip r:embed="rId3">
             <a:extLst>
               <a:ext uri="{28A0092B-C50C-407E-A947-70E740481C1C}">
-                <a14:useLocalDpi xmlns:a14="http://schemas.microsoft.com/office/drawing/2010/main" val="0"/>
+                <a14:useLocalDpi xmlns:a14="http://schemas.microsoft.com/office/drawing/2010/main" xmlns="" val="0"/>
               </a:ext>
             </a:extLst>
           </a:blip>
@@ -6367,7 +6897,7 @@
     </p:spTree>
     <p:extLst>
       <p:ext uri="{BB962C8B-B14F-4D97-AF65-F5344CB8AC3E}">
-        <p14:creationId xmlns:p14="http://schemas.microsoft.com/office/powerpoint/2010/main" val="2689089790"/>
+        <p14:creationId xmlns:p14="http://schemas.microsoft.com/office/powerpoint/2010/main" xmlns="" val="2689089790"/>
       </p:ext>
     </p:extLst>
   </p:cSld>
@@ -6399,7 +6929,7 @@
           <p:cNvPr id="2" name="Title 1">
             <a:extLst>
               <a:ext uri="{FF2B5EF4-FFF2-40B4-BE49-F238E27FC236}">
-                <a16:creationId xmlns:a16="http://schemas.microsoft.com/office/drawing/2014/main" id="{42311324-F288-40E8-9538-6F18604F7721}"/>
+                <a16:creationId xmlns:a16="http://schemas.microsoft.com/office/drawing/2014/main" xmlns="" id="{42311324-F288-40E8-9538-6F18604F7721}"/>
               </a:ext>
             </a:extLst>
           </p:cNvPr>
@@ -6424,7 +6954,7 @@
           <p:cNvPr id="3" name="Content Placeholder 2">
             <a:extLst>
               <a:ext uri="{FF2B5EF4-FFF2-40B4-BE49-F238E27FC236}">
-                <a16:creationId xmlns:a16="http://schemas.microsoft.com/office/drawing/2014/main" id="{8327F3BE-2C78-46C3-AB0A-2494636B74A4}"/>
+                <a16:creationId xmlns:a16="http://schemas.microsoft.com/office/drawing/2014/main" xmlns="" id="{8327F3BE-2C78-46C3-AB0A-2494636B74A4}"/>
               </a:ext>
             </a:extLst>
           </p:cNvPr>
@@ -6447,7 +6977,7 @@
     </p:spTree>
     <p:extLst>
       <p:ext uri="{BB962C8B-B14F-4D97-AF65-F5344CB8AC3E}">
-        <p14:creationId xmlns:p14="http://schemas.microsoft.com/office/powerpoint/2010/main" val="1752723345"/>
+        <p14:creationId xmlns:p14="http://schemas.microsoft.com/office/powerpoint/2010/main" xmlns="" val="1752723345"/>
       </p:ext>
     </p:extLst>
   </p:cSld>
@@ -6479,7 +7009,7 @@
           <p:cNvPr id="2" name="Title 1">
             <a:extLst>
               <a:ext uri="{FF2B5EF4-FFF2-40B4-BE49-F238E27FC236}">
-                <a16:creationId xmlns:a16="http://schemas.microsoft.com/office/drawing/2014/main" id="{AD55911D-DF46-4E79-8A08-9B5D293FFC9C}"/>
+                <a16:creationId xmlns:a16="http://schemas.microsoft.com/office/drawing/2014/main" xmlns="" id="{AD55911D-DF46-4E79-8A08-9B5D293FFC9C}"/>
               </a:ext>
             </a:extLst>
           </p:cNvPr>
@@ -6508,7 +7038,7 @@
           <p:cNvPr id="6" name="Table 6">
             <a:extLst>
               <a:ext uri="{FF2B5EF4-FFF2-40B4-BE49-F238E27FC236}">
-                <a16:creationId xmlns:a16="http://schemas.microsoft.com/office/drawing/2014/main" id="{4F74DE83-E58F-432C-AE79-298183B224E6}"/>
+                <a16:creationId xmlns:a16="http://schemas.microsoft.com/office/drawing/2014/main" xmlns="" id="{4F74DE83-E58F-432C-AE79-298183B224E6}"/>
               </a:ext>
             </a:extLst>
           </p:cNvPr>
@@ -6519,7 +7049,7 @@
             <p:ph idx="1"/>
             <p:extLst>
               <p:ext uri="{D42A27DB-BD31-4B8C-83A1-F6EECF244321}">
-                <p14:modId xmlns:p14="http://schemas.microsoft.com/office/powerpoint/2010/main" val="1686340914"/>
+                <p14:modId xmlns:p14="http://schemas.microsoft.com/office/powerpoint/2010/main" xmlns="" val="1686340914"/>
               </p:ext>
             </p:extLst>
           </p:nvPr>
@@ -6538,14 +7068,14 @@
                 <a:gridCol w="5176837">
                   <a:extLst>
                     <a:ext uri="{9D8B030D-6E8A-4147-A177-3AD203B41FA5}">
-                      <a16:colId xmlns:a16="http://schemas.microsoft.com/office/drawing/2014/main" val="2019709806"/>
+                      <a16:colId xmlns:a16="http://schemas.microsoft.com/office/drawing/2014/main" xmlns="" val="2019709806"/>
                     </a:ext>
                   </a:extLst>
                 </a:gridCol>
                 <a:gridCol w="5176837">
                   <a:extLst>
                     <a:ext uri="{9D8B030D-6E8A-4147-A177-3AD203B41FA5}">
-                      <a16:colId xmlns:a16="http://schemas.microsoft.com/office/drawing/2014/main" val="1379652834"/>
+                      <a16:colId xmlns:a16="http://schemas.microsoft.com/office/drawing/2014/main" xmlns="" val="1379652834"/>
                     </a:ext>
                   </a:extLst>
                 </a:gridCol>
@@ -6581,7 +7111,7 @@
                 </a:tc>
                 <a:extLst>
                   <a:ext uri="{0D108BD9-81ED-4DB2-BD59-A6C34878D82A}">
-                    <a16:rowId xmlns:a16="http://schemas.microsoft.com/office/drawing/2014/main" val="2877460864"/>
+                    <a16:rowId xmlns:a16="http://schemas.microsoft.com/office/drawing/2014/main" xmlns="" val="2877460864"/>
                   </a:ext>
                 </a:extLst>
               </a:tr>
@@ -6616,7 +7146,7 @@
                 </a:tc>
                 <a:extLst>
                   <a:ext uri="{0D108BD9-81ED-4DB2-BD59-A6C34878D82A}">
-                    <a16:rowId xmlns:a16="http://schemas.microsoft.com/office/drawing/2014/main" val="2033030258"/>
+                    <a16:rowId xmlns:a16="http://schemas.microsoft.com/office/drawing/2014/main" xmlns="" val="2033030258"/>
                   </a:ext>
                 </a:extLst>
               </a:tr>
@@ -6651,7 +7181,7 @@
                 </a:tc>
                 <a:extLst>
                   <a:ext uri="{0D108BD9-81ED-4DB2-BD59-A6C34878D82A}">
-                    <a16:rowId xmlns:a16="http://schemas.microsoft.com/office/drawing/2014/main" val="296500758"/>
+                    <a16:rowId xmlns:a16="http://schemas.microsoft.com/office/drawing/2014/main" xmlns="" val="296500758"/>
                   </a:ext>
                 </a:extLst>
               </a:tr>
@@ -6688,7 +7218,7 @@
                 </a:tc>
                 <a:extLst>
                   <a:ext uri="{0D108BD9-81ED-4DB2-BD59-A6C34878D82A}">
-                    <a16:rowId xmlns:a16="http://schemas.microsoft.com/office/drawing/2014/main" val="2071053643"/>
+                    <a16:rowId xmlns:a16="http://schemas.microsoft.com/office/drawing/2014/main" xmlns="" val="2071053643"/>
                   </a:ext>
                 </a:extLst>
               </a:tr>
@@ -6701,7 +7231,7 @@
           <p:cNvPr id="7" name="TextBox 6">
             <a:extLst>
               <a:ext uri="{FF2B5EF4-FFF2-40B4-BE49-F238E27FC236}">
-                <a16:creationId xmlns:a16="http://schemas.microsoft.com/office/drawing/2014/main" id="{01426A6E-F687-4BC2-A3FD-66DF91C17443}"/>
+                <a16:creationId xmlns:a16="http://schemas.microsoft.com/office/drawing/2014/main" xmlns="" id="{01426A6E-F687-4BC2-A3FD-66DF91C17443}"/>
               </a:ext>
             </a:extLst>
           </p:cNvPr>
@@ -6810,7 +7340,7 @@
     </p:spTree>
     <p:extLst>
       <p:ext uri="{BB962C8B-B14F-4D97-AF65-F5344CB8AC3E}">
-        <p14:creationId xmlns:p14="http://schemas.microsoft.com/office/powerpoint/2010/main" val="2451703769"/>
+        <p14:creationId xmlns:p14="http://schemas.microsoft.com/office/powerpoint/2010/main" xmlns="" val="2451703769"/>
       </p:ext>
     </p:extLst>
   </p:cSld>
@@ -6842,7 +7372,7 @@
           <p:cNvPr id="2" name="Title 1">
             <a:extLst>
               <a:ext uri="{FF2B5EF4-FFF2-40B4-BE49-F238E27FC236}">
-                <a16:creationId xmlns:a16="http://schemas.microsoft.com/office/drawing/2014/main" id="{598ED202-CD41-4ED5-A091-31E214EE742C}"/>
+                <a16:creationId xmlns:a16="http://schemas.microsoft.com/office/drawing/2014/main" xmlns="" id="{598ED202-CD41-4ED5-A091-31E214EE742C}"/>
               </a:ext>
             </a:extLst>
           </p:cNvPr>
@@ -6879,7 +7409,7 @@
           <p:cNvPr id="3" name="Content Placeholder 2">
             <a:extLst>
               <a:ext uri="{FF2B5EF4-FFF2-40B4-BE49-F238E27FC236}">
-                <a16:creationId xmlns:a16="http://schemas.microsoft.com/office/drawing/2014/main" id="{34F20B3B-2E27-4D85-9AB5-1271CA328E3D}"/>
+                <a16:creationId xmlns:a16="http://schemas.microsoft.com/office/drawing/2014/main" xmlns="" id="{34F20B3B-2E27-4D85-9AB5-1271CA328E3D}"/>
               </a:ext>
             </a:extLst>
           </p:cNvPr>
@@ -6929,7 +7459,7 @@
     </p:spTree>
     <p:extLst>
       <p:ext uri="{BB962C8B-B14F-4D97-AF65-F5344CB8AC3E}">
-        <p14:creationId xmlns:p14="http://schemas.microsoft.com/office/powerpoint/2010/main" val="1166937009"/>
+        <p14:creationId xmlns:p14="http://schemas.microsoft.com/office/powerpoint/2010/main" xmlns="" val="1166937009"/>
       </p:ext>
     </p:extLst>
   </p:cSld>
@@ -6961,7 +7491,7 @@
           <p:cNvPr id="2" name="Title 1">
             <a:extLst>
               <a:ext uri="{FF2B5EF4-FFF2-40B4-BE49-F238E27FC236}">
-                <a16:creationId xmlns:a16="http://schemas.microsoft.com/office/drawing/2014/main" id="{36AFE36C-17C6-4686-896D-F89A7C633E12}"/>
+                <a16:creationId xmlns:a16="http://schemas.microsoft.com/office/drawing/2014/main" xmlns="" id="{36AFE36C-17C6-4686-896D-F89A7C633E12}"/>
               </a:ext>
             </a:extLst>
           </p:cNvPr>
@@ -6990,7 +7520,7 @@
           <p:cNvPr id="4" name="Table 4">
             <a:extLst>
               <a:ext uri="{FF2B5EF4-FFF2-40B4-BE49-F238E27FC236}">
-                <a16:creationId xmlns:a16="http://schemas.microsoft.com/office/drawing/2014/main" id="{8338BB71-8843-4743-8B87-58B20D4C4A6F}"/>
+                <a16:creationId xmlns:a16="http://schemas.microsoft.com/office/drawing/2014/main" xmlns="" id="{8338BB71-8843-4743-8B87-58B20D4C4A6F}"/>
               </a:ext>
             </a:extLst>
           </p:cNvPr>
@@ -7001,7 +7531,7 @@
             <p:ph idx="1"/>
             <p:extLst>
               <p:ext uri="{D42A27DB-BD31-4B8C-83A1-F6EECF244321}">
-                <p14:modId xmlns:p14="http://schemas.microsoft.com/office/powerpoint/2010/main" val="885222824"/>
+                <p14:modId xmlns:p14="http://schemas.microsoft.com/office/powerpoint/2010/main" xmlns="" val="885222824"/>
               </p:ext>
             </p:extLst>
           </p:nvPr>
@@ -7020,21 +7550,21 @@
                 <a:gridCol w="2785403">
                   <a:extLst>
                     <a:ext uri="{9D8B030D-6E8A-4147-A177-3AD203B41FA5}">
-                      <a16:colId xmlns:a16="http://schemas.microsoft.com/office/drawing/2014/main" val="2977297550"/>
+                      <a16:colId xmlns:a16="http://schemas.microsoft.com/office/drawing/2014/main" xmlns="" val="2977297550"/>
                     </a:ext>
                   </a:extLst>
                 </a:gridCol>
                 <a:gridCol w="3010486">
                   <a:extLst>
                     <a:ext uri="{9D8B030D-6E8A-4147-A177-3AD203B41FA5}">
-                      <a16:colId xmlns:a16="http://schemas.microsoft.com/office/drawing/2014/main" val="1906464382"/>
+                      <a16:colId xmlns:a16="http://schemas.microsoft.com/office/drawing/2014/main" xmlns="" val="1906464382"/>
                     </a:ext>
                   </a:extLst>
                 </a:gridCol>
                 <a:gridCol w="4557268">
                   <a:extLst>
                     <a:ext uri="{9D8B030D-6E8A-4147-A177-3AD203B41FA5}">
-                      <a16:colId xmlns:a16="http://schemas.microsoft.com/office/drawing/2014/main" val="565535634"/>
+                      <a16:colId xmlns:a16="http://schemas.microsoft.com/office/drawing/2014/main" xmlns="" val="565535634"/>
                     </a:ext>
                   </a:extLst>
                 </a:gridCol>
@@ -7070,17 +7600,17 @@
                     <a:lstStyle/>
                     <a:p>
                       <a:r>
-                        <a:rPr lang="en-GB" dirty="0"/>
+                        <a:rPr lang="en-GB" b="0" dirty="0"/>
                         <a:t>Compiled</a:t>
                       </a:r>
-                      <a:endParaRPr lang="en-MT" dirty="0"/>
+                      <a:endParaRPr lang="en-MT" b="0" dirty="0"/>
                     </a:p>
                   </a:txBody>
                   <a:tcPr anchor="ctr"/>
                 </a:tc>
                 <a:extLst>
                   <a:ext uri="{0D108BD9-81ED-4DB2-BD59-A6C34878D82A}">
-                    <a16:rowId xmlns:a16="http://schemas.microsoft.com/office/drawing/2014/main" val="3447666898"/>
+                    <a16:rowId xmlns:a16="http://schemas.microsoft.com/office/drawing/2014/main" xmlns="" val="3447666898"/>
                   </a:ext>
                 </a:extLst>
               </a:tr>
@@ -7165,7 +7695,7 @@
                 </a:tc>
                 <a:extLst>
                   <a:ext uri="{0D108BD9-81ED-4DB2-BD59-A6C34878D82A}">
-                    <a16:rowId xmlns:a16="http://schemas.microsoft.com/office/drawing/2014/main" val="221003645"/>
+                    <a16:rowId xmlns:a16="http://schemas.microsoft.com/office/drawing/2014/main" xmlns="" val="221003645"/>
                   </a:ext>
                 </a:extLst>
               </a:tr>
@@ -7211,7 +7741,7 @@
                 </a:tc>
                 <a:extLst>
                   <a:ext uri="{0D108BD9-81ED-4DB2-BD59-A6C34878D82A}">
-                    <a16:rowId xmlns:a16="http://schemas.microsoft.com/office/drawing/2014/main" val="792754675"/>
+                    <a16:rowId xmlns:a16="http://schemas.microsoft.com/office/drawing/2014/main" xmlns="" val="792754675"/>
                   </a:ext>
                 </a:extLst>
               </a:tr>
@@ -7257,7 +7787,7 @@
                 </a:tc>
                 <a:extLst>
                   <a:ext uri="{0D108BD9-81ED-4DB2-BD59-A6C34878D82A}">
-                    <a16:rowId xmlns:a16="http://schemas.microsoft.com/office/drawing/2014/main" val="3790524959"/>
+                    <a16:rowId xmlns:a16="http://schemas.microsoft.com/office/drawing/2014/main" xmlns="" val="3790524959"/>
                   </a:ext>
                 </a:extLst>
               </a:tr>
@@ -7270,7 +7800,7 @@
           <p:cNvPr id="2050" name="Picture 2" descr="See the source image">
             <a:extLst>
               <a:ext uri="{FF2B5EF4-FFF2-40B4-BE49-F238E27FC236}">
-                <a16:creationId xmlns:a16="http://schemas.microsoft.com/office/drawing/2014/main" id="{90886094-F37B-4454-A3CA-EFD470065265}"/>
+                <a16:creationId xmlns:a16="http://schemas.microsoft.com/office/drawing/2014/main" xmlns="" id="{90886094-F37B-4454-A3CA-EFD470065265}"/>
               </a:ext>
             </a:extLst>
           </p:cNvPr>
@@ -7283,7 +7813,7 @@
           <a:blip r:embed="rId2">
             <a:extLst>
               <a:ext uri="{28A0092B-C50C-407E-A947-70E740481C1C}">
-                <a14:useLocalDpi xmlns:a14="http://schemas.microsoft.com/office/drawing/2010/main" val="0"/>
+                <a14:useLocalDpi xmlns:a14="http://schemas.microsoft.com/office/drawing/2010/main" xmlns="" val="0"/>
               </a:ext>
             </a:extLst>
           </a:blip>
@@ -7303,7 +7833,7 @@
           <a:noFill/>
           <a:extLst>
             <a:ext uri="{909E8E84-426E-40DD-AFC4-6F175D3DCCD1}">
-              <a14:hiddenFill xmlns:a14="http://schemas.microsoft.com/office/drawing/2010/main">
+              <a14:hiddenFill xmlns:a14="http://schemas.microsoft.com/office/drawing/2010/main" xmlns="">
                 <a:solidFill>
                   <a:srgbClr val="FFFFFF"/>
                 </a:solidFill>
@@ -7315,7 +7845,7 @@
     </p:spTree>
     <p:extLst>
       <p:ext uri="{BB962C8B-B14F-4D97-AF65-F5344CB8AC3E}">
-        <p14:creationId xmlns:p14="http://schemas.microsoft.com/office/powerpoint/2010/main" val="164580881"/>
+        <p14:creationId xmlns:p14="http://schemas.microsoft.com/office/powerpoint/2010/main" xmlns="" val="164580881"/>
       </p:ext>
     </p:extLst>
   </p:cSld>
@@ -7347,7 +7877,7 @@
           <p:cNvPr id="2" name="Title 1">
             <a:extLst>
               <a:ext uri="{FF2B5EF4-FFF2-40B4-BE49-F238E27FC236}">
-                <a16:creationId xmlns:a16="http://schemas.microsoft.com/office/drawing/2014/main" id="{36AFE36C-17C6-4686-896D-F89A7C633E12}"/>
+                <a16:creationId xmlns:a16="http://schemas.microsoft.com/office/drawing/2014/main" xmlns="" id="{36AFE36C-17C6-4686-896D-F89A7C633E12}"/>
               </a:ext>
             </a:extLst>
           </p:cNvPr>
@@ -7378,7 +7908,7 @@
           <p:cNvPr id="4" name="Table 4">
             <a:extLst>
               <a:ext uri="{FF2B5EF4-FFF2-40B4-BE49-F238E27FC236}">
-                <a16:creationId xmlns:a16="http://schemas.microsoft.com/office/drawing/2014/main" id="{8338BB71-8843-4743-8B87-58B20D4C4A6F}"/>
+                <a16:creationId xmlns:a16="http://schemas.microsoft.com/office/drawing/2014/main" xmlns="" id="{8338BB71-8843-4743-8B87-58B20D4C4A6F}"/>
               </a:ext>
             </a:extLst>
           </p:cNvPr>
@@ -7389,14 +7919,14 @@
             <p:ph idx="1"/>
             <p:extLst>
               <p:ext uri="{D42A27DB-BD31-4B8C-83A1-F6EECF244321}">
-                <p14:modId xmlns:p14="http://schemas.microsoft.com/office/powerpoint/2010/main" val="1056110357"/>
+                <p14:modId xmlns:p14="http://schemas.microsoft.com/office/powerpoint/2010/main" xmlns="" val="1056110357"/>
               </p:ext>
             </p:extLst>
           </p:nvPr>
         </p:nvGraphicFramePr>
         <p:xfrm>
           <a:off x="914400" y="1866900"/>
-          <a:ext cx="10353157" cy="4504608"/>
+          <a:ext cx="10353157" cy="3944857"/>
         </p:xfrm>
         <a:graphic>
           <a:graphicData uri="http://schemas.openxmlformats.org/drawingml/2006/table">
@@ -7408,21 +7938,21 @@
                 <a:gridCol w="2785403">
                   <a:extLst>
                     <a:ext uri="{9D8B030D-6E8A-4147-A177-3AD203B41FA5}">
-                      <a16:colId xmlns:a16="http://schemas.microsoft.com/office/drawing/2014/main" val="2977297550"/>
+                      <a16:colId xmlns:a16="http://schemas.microsoft.com/office/drawing/2014/main" xmlns="" val="2977297550"/>
                     </a:ext>
                   </a:extLst>
                 </a:gridCol>
                 <a:gridCol w="3010486">
                   <a:extLst>
                     <a:ext uri="{9D8B030D-6E8A-4147-A177-3AD203B41FA5}">
-                      <a16:colId xmlns:a16="http://schemas.microsoft.com/office/drawing/2014/main" val="1906464382"/>
+                      <a16:colId xmlns:a16="http://schemas.microsoft.com/office/drawing/2014/main" xmlns="" val="1906464382"/>
                     </a:ext>
                   </a:extLst>
                 </a:gridCol>
                 <a:gridCol w="4557268">
                   <a:extLst>
                     <a:ext uri="{9D8B030D-6E8A-4147-A177-3AD203B41FA5}">
-                      <a16:colId xmlns:a16="http://schemas.microsoft.com/office/drawing/2014/main" val="565535634"/>
+                      <a16:colId xmlns:a16="http://schemas.microsoft.com/office/drawing/2014/main" xmlns="" val="565535634"/>
                     </a:ext>
                   </a:extLst>
                 </a:gridCol>
@@ -7458,21 +7988,21 @@
                     <a:lstStyle/>
                     <a:p>
                       <a:r>
-                        <a:rPr lang="en-GB" dirty="0"/>
-                        <a:t>Compiled</a:t>
+                        <a:rPr lang="en-GB" b="0" dirty="0" smtClean="0"/>
+                        <a:t>Interpreted</a:t>
                       </a:r>
-                      <a:endParaRPr lang="en-MT" dirty="0"/>
+                      <a:endParaRPr lang="en-MT" b="0" dirty="0"/>
                     </a:p>
                   </a:txBody>
                   <a:tcPr anchor="ctr"/>
                 </a:tc>
                 <a:extLst>
                   <a:ext uri="{0D108BD9-81ED-4DB2-BD59-A6C34878D82A}">
-                    <a16:rowId xmlns:a16="http://schemas.microsoft.com/office/drawing/2014/main" val="3447666898"/>
+                    <a16:rowId xmlns:a16="http://schemas.microsoft.com/office/drawing/2014/main" xmlns="" val="3447666898"/>
                   </a:ext>
                 </a:extLst>
               </a:tr>
-              <a:tr h="2553214">
+              <a:tr h="2338437">
                 <a:tc vMerge="1">
                   <a:txBody>
                     <a:bodyPr/>
@@ -7508,23 +8038,12 @@
                         <a:buChar char="•"/>
                       </a:pPr>
                       <a:r>
-                        <a:rPr lang="en-GB" dirty="0"/>
-                        <a:t>Server-side web development via ASP.NET/Razor/</a:t>
+                        <a:rPr lang="en-GB" dirty="0" smtClean="0"/>
+                        <a:t>Hybrid mobile</a:t>
                       </a:r>
                       <a:r>
-                        <a:rPr lang="en-GB" dirty="0" err="1"/>
-                        <a:t>Blazor</a:t>
-                      </a:r>
-                      <a:endParaRPr lang="en-GB" dirty="0"/>
-                    </a:p>
-                    <a:p>
-                      <a:pPr marL="285750" indent="-285750" algn="l">
-                        <a:buFont typeface="Arial" panose="020B0604020202020204" pitchFamily="34" charset="0"/>
-                        <a:buChar char="•"/>
-                      </a:pPr>
-                      <a:r>
-                        <a:rPr lang="en-GB" dirty="0"/>
-                        <a:t>Game development via Unity/Godot/Stride</a:t>
+                        <a:rPr lang="en-GB" baseline="0" dirty="0" smtClean="0"/>
+                        <a:t> applications development, assisting HTML alongside CSS and mobile-first frameworks such as Ionic/Bootstrap. </a:t>
                       </a:r>
                     </a:p>
                     <a:p>
@@ -7533,8 +8052,8 @@
                         <a:buChar char="•"/>
                       </a:pPr>
                       <a:r>
-                        <a:rPr lang="en-GB" dirty="0"/>
-                        <a:t>Developing applications with a look and feel of the Microsoft Windows/Windows Phone operating system using Windows Forms, Windows Presentation Foundation (WPF), Universal Windows Platform (UWP)</a:t>
+                        <a:rPr lang="en-GB" baseline="0" dirty="0" smtClean="0"/>
+                        <a:t>Online game development</a:t>
                       </a:r>
                     </a:p>
                     <a:p>
@@ -7543,17 +8062,26 @@
                         <a:buChar char="•"/>
                       </a:pPr>
                       <a:r>
-                        <a:rPr lang="en-GB" dirty="0"/>
-                        <a:t>Creating a database managed system via Microsoft SQL Server/MySQL</a:t>
+                        <a:rPr lang="en-GB" baseline="0" dirty="0" smtClean="0"/>
+                        <a:t>Developing desktop applications alongside HTML and CSS.</a:t>
                       </a:r>
-                      <a:endParaRPr lang="en-MT" dirty="0"/>
+                    </a:p>
+                    <a:p>
+                      <a:pPr marL="285750" indent="-285750" algn="l">
+                        <a:buFont typeface="Arial" panose="020B0604020202020204" pitchFamily="34" charset="0"/>
+                        <a:buChar char="•"/>
+                      </a:pPr>
+                      <a:r>
+                        <a:rPr lang="en-GB" baseline="0" dirty="0" smtClean="0"/>
+                        <a:t>Modifying/adding/removing HTML elements.</a:t>
+                      </a:r>
                     </a:p>
                   </a:txBody>
                   <a:tcPr anchor="ctr"/>
                 </a:tc>
                 <a:extLst>
                   <a:ext uri="{0D108BD9-81ED-4DB2-BD59-A6C34878D82A}">
-                    <a16:rowId xmlns:a16="http://schemas.microsoft.com/office/drawing/2014/main" val="221003645"/>
+                    <a16:rowId xmlns:a16="http://schemas.microsoft.com/office/drawing/2014/main" xmlns="" val="221003645"/>
                   </a:ext>
                 </a:extLst>
               </a:tr>
@@ -7589,8 +8117,16 @@
                     <a:lstStyle/>
                     <a:p>
                       <a:r>
-                        <a:rPr lang="en-GB" dirty="0"/>
-                        <a:t>Microsoft (as part of the .NET framework initiative)</a:t>
+                        <a:rPr lang="en-GB" dirty="0" smtClean="0"/>
+                        <a:t>Brendan</a:t>
+                      </a:r>
+                      <a:r>
+                        <a:rPr lang="en-GB" baseline="0" dirty="0" smtClean="0"/>
+                        <a:t> </a:t>
+                      </a:r>
+                      <a:r>
+                        <a:rPr lang="en-GB" baseline="0" dirty="0" err="1" smtClean="0"/>
+                        <a:t>Eich</a:t>
                       </a:r>
                       <a:endParaRPr lang="en-MT" dirty="0"/>
                     </a:p>
@@ -7599,7 +8135,7 @@
                 </a:tc>
                 <a:extLst>
                   <a:ext uri="{0D108BD9-81ED-4DB2-BD59-A6C34878D82A}">
-                    <a16:rowId xmlns:a16="http://schemas.microsoft.com/office/drawing/2014/main" val="792754675"/>
+                    <a16:rowId xmlns:a16="http://schemas.microsoft.com/office/drawing/2014/main" xmlns="" val="792754675"/>
                   </a:ext>
                 </a:extLst>
               </a:tr>
@@ -7645,7 +8181,7 @@
                 </a:tc>
                 <a:extLst>
                   <a:ext uri="{0D108BD9-81ED-4DB2-BD59-A6C34878D82A}">
-                    <a16:rowId xmlns:a16="http://schemas.microsoft.com/office/drawing/2014/main" val="3790524959"/>
+                    <a16:rowId xmlns:a16="http://schemas.microsoft.com/office/drawing/2014/main" xmlns="" val="3790524959"/>
                   </a:ext>
                 </a:extLst>
               </a:tr>
@@ -7658,7 +8194,7 @@
           <p:cNvPr id="3076" name="Picture 4" descr="Javascript Logo PNG Transparent &amp; SVG Vector - Freebie Supply">
             <a:extLst>
               <a:ext uri="{FF2B5EF4-FFF2-40B4-BE49-F238E27FC236}">
-                <a16:creationId xmlns:a16="http://schemas.microsoft.com/office/drawing/2014/main" id="{97EC9761-E1D0-4F8A-8B19-38C40ED50E3E}"/>
+                <a16:creationId xmlns:a16="http://schemas.microsoft.com/office/drawing/2014/main" xmlns="" id="{97EC9761-E1D0-4F8A-8B19-38C40ED50E3E}"/>
               </a:ext>
             </a:extLst>
           </p:cNvPr>
@@ -7668,10 +8204,10 @@
           <p:nvPr/>
         </p:nvPicPr>
         <p:blipFill>
-          <a:blip r:embed="rId2">
+          <a:blip r:embed="rId2" cstate="print">
             <a:extLst>
               <a:ext uri="{28A0092B-C50C-407E-A947-70E740481C1C}">
-                <a14:useLocalDpi xmlns:a14="http://schemas.microsoft.com/office/drawing/2010/main" val="0"/>
+                <a14:useLocalDpi xmlns:a14="http://schemas.microsoft.com/office/drawing/2010/main" xmlns="" val="0"/>
               </a:ext>
             </a:extLst>
           </a:blip>
@@ -7691,7 +8227,7 @@
           <a:noFill/>
           <a:extLst>
             <a:ext uri="{909E8E84-426E-40DD-AFC4-6F175D3DCCD1}">
-              <a14:hiddenFill xmlns:a14="http://schemas.microsoft.com/office/drawing/2010/main">
+              <a14:hiddenFill xmlns:a14="http://schemas.microsoft.com/office/drawing/2010/main" xmlns="">
                 <a:solidFill>
                   <a:srgbClr val="FFFFFF"/>
                 </a:solidFill>
@@ -7703,7 +8239,838 @@
     </p:spTree>
     <p:extLst>
       <p:ext uri="{BB962C8B-B14F-4D97-AF65-F5344CB8AC3E}">
-        <p14:creationId xmlns:p14="http://schemas.microsoft.com/office/powerpoint/2010/main" val="3120296696"/>
+        <p14:creationId xmlns:p14="http://schemas.microsoft.com/office/powerpoint/2010/main" xmlns="" val="3120296696"/>
+      </p:ext>
+    </p:extLst>
+  </p:cSld>
+  <p:clrMapOvr>
+    <a:masterClrMapping/>
+  </p:clrMapOvr>
+</p:sld>
+</file>
+
+<file path=ppt/slides/slide8.xml><?xml version="1.0" encoding="utf-8"?>
+<p:sld xmlns:a="http://schemas.openxmlformats.org/drawingml/2006/main" xmlns:r="http://schemas.openxmlformats.org/officeDocument/2006/relationships" xmlns:p="http://schemas.openxmlformats.org/presentationml/2006/main">
+  <p:cSld>
+    <p:spTree>
+      <p:nvGrpSpPr>
+        <p:cNvPr id="1" name=""/>
+        <p:cNvGrpSpPr/>
+        <p:nvPr/>
+      </p:nvGrpSpPr>
+      <p:grpSpPr>
+        <a:xfrm>
+          <a:off x="0" y="0"/>
+          <a:ext cx="0" cy="0"/>
+          <a:chOff x="0" y="0"/>
+          <a:chExt cx="0" cy="0"/>
+        </a:xfrm>
+      </p:grpSpPr>
+      <p:sp>
+        <p:nvSpPr>
+          <p:cNvPr id="2" name="Title 1">
+            <a:extLst>
+              <a:ext uri="{FF2B5EF4-FFF2-40B4-BE49-F238E27FC236}">
+                <a16:creationId xmlns:a16="http://schemas.microsoft.com/office/drawing/2014/main" xmlns="" id="{36AFE36C-17C6-4686-896D-F89A7C633E12}"/>
+              </a:ext>
+            </a:extLst>
+          </p:cNvPr>
+          <p:cNvSpPr>
+            <a:spLocks noGrp="1"/>
+          </p:cNvSpPr>
+          <p:nvPr>
+            <p:ph type="title"/>
+          </p:nvPr>
+        </p:nvSpPr>
+        <p:spPr/>
+        <p:txBody>
+          <a:bodyPr>
+            <a:normAutofit fontScale="90000"/>
+          </a:bodyPr>
+          <a:lstStyle/>
+          <a:p>
+            <a:r>
+              <a:rPr lang="en-GB" dirty="0" smtClean="0"/>
+              <a:t>Python</a:t>
+            </a:r>
+            <a:r>
+              <a:rPr lang="en-GB" dirty="0" smtClean="0"/>
+              <a:t> </a:t>
+            </a:r>
+            <a:r>
+              <a:rPr lang="en-GB" dirty="0"/>
+              <a:t>- Examples of programming languages</a:t>
+            </a:r>
+            <a:endParaRPr lang="en-MT" dirty="0"/>
+          </a:p>
+        </p:txBody>
+      </p:sp>
+      <p:graphicFrame>
+        <p:nvGraphicFramePr>
+          <p:cNvPr id="4" name="Table 4">
+            <a:extLst>
+              <a:ext uri="{FF2B5EF4-FFF2-40B4-BE49-F238E27FC236}">
+                <a16:creationId xmlns:a16="http://schemas.microsoft.com/office/drawing/2014/main" xmlns="" id="{8338BB71-8843-4743-8B87-58B20D4C4A6F}"/>
+              </a:ext>
+            </a:extLst>
+          </p:cNvPr>
+          <p:cNvGraphicFramePr>
+            <a:graphicFrameLocks noGrp="1"/>
+          </p:cNvGraphicFramePr>
+          <p:nvPr>
+            <p:ph idx="1"/>
+            <p:extLst>
+              <p:ext uri="{D42A27DB-BD31-4B8C-83A1-F6EECF244321}">
+                <p14:modId xmlns:p14="http://schemas.microsoft.com/office/powerpoint/2010/main" xmlns="" val="1056110357"/>
+              </p:ext>
+            </p:extLst>
+          </p:nvPr>
+        </p:nvGraphicFramePr>
+        <p:xfrm>
+          <a:off x="914400" y="1866900"/>
+          <a:ext cx="10353157" cy="3438436"/>
+        </p:xfrm>
+        <a:graphic>
+          <a:graphicData uri="http://schemas.openxmlformats.org/drawingml/2006/table">
+            <a:tbl>
+              <a:tblPr firstRow="1" bandRow="1">
+                <a:tableStyleId>{69CF1AB2-1976-4502-BF36-3FF5EA218861}</a:tableStyleId>
+              </a:tblPr>
+              <a:tblGrid>
+                <a:gridCol w="2785403">
+                  <a:extLst>
+                    <a:ext uri="{9D8B030D-6E8A-4147-A177-3AD203B41FA5}">
+                      <a16:colId xmlns:a16="http://schemas.microsoft.com/office/drawing/2014/main" xmlns="" val="2977297550"/>
+                    </a:ext>
+                  </a:extLst>
+                </a:gridCol>
+                <a:gridCol w="3010486">
+                  <a:extLst>
+                    <a:ext uri="{9D8B030D-6E8A-4147-A177-3AD203B41FA5}">
+                      <a16:colId xmlns:a16="http://schemas.microsoft.com/office/drawing/2014/main" xmlns="" val="1906464382"/>
+                    </a:ext>
+                  </a:extLst>
+                </a:gridCol>
+                <a:gridCol w="4557268">
+                  <a:extLst>
+                    <a:ext uri="{9D8B030D-6E8A-4147-A177-3AD203B41FA5}">
+                      <a16:colId xmlns:a16="http://schemas.microsoft.com/office/drawing/2014/main" xmlns="" val="565535634"/>
+                    </a:ext>
+                  </a:extLst>
+                </a:gridCol>
+              </a:tblGrid>
+              <a:tr h="514944">
+                <a:tc rowSpan="4">
+                  <a:txBody>
+                    <a:bodyPr/>
+                    <a:lstStyle/>
+                    <a:p>
+                      <a:endParaRPr lang="en-MT" dirty="0"/>
+                    </a:p>
+                  </a:txBody>
+                  <a:tcPr/>
+                </a:tc>
+                <a:tc>
+                  <a:txBody>
+                    <a:bodyPr/>
+                    <a:lstStyle/>
+                    <a:p>
+                      <a:pPr algn="ctr"/>
+                      <a:r>
+                        <a:rPr lang="en-GB" sz="2000" b="1" dirty="0"/>
+                        <a:t>Compiled or Interpreted?</a:t>
+                      </a:r>
+                    </a:p>
+                  </a:txBody>
+                  <a:tcPr anchor="ctr"/>
+                </a:tc>
+                <a:tc>
+                  <a:txBody>
+                    <a:bodyPr/>
+                    <a:lstStyle/>
+                    <a:p>
+                      <a:r>
+                        <a:rPr lang="en-GB" b="0" dirty="0" smtClean="0"/>
+                        <a:t>Interpreted</a:t>
+                      </a:r>
+                      <a:endParaRPr lang="en-MT" b="0" dirty="0"/>
+                    </a:p>
+                  </a:txBody>
+                  <a:tcPr anchor="ctr"/>
+                </a:tc>
+                <a:extLst>
+                  <a:ext uri="{0D108BD9-81ED-4DB2-BD59-A6C34878D82A}">
+                    <a16:rowId xmlns:a16="http://schemas.microsoft.com/office/drawing/2014/main" xmlns="" val="3447666898"/>
+                  </a:ext>
+                </a:extLst>
+              </a:tr>
+              <a:tr h="1572318">
+                <a:tc vMerge="1">
+                  <a:txBody>
+                    <a:bodyPr/>
+                    <a:lstStyle/>
+                    <a:p>
+                      <a:endParaRPr lang="en-MT" dirty="0"/>
+                    </a:p>
+                  </a:txBody>
+                  <a:tcPr/>
+                </a:tc>
+                <a:tc>
+                  <a:txBody>
+                    <a:bodyPr/>
+                    <a:lstStyle/>
+                    <a:p>
+                      <a:pPr algn="ctr"/>
+                      <a:r>
+                        <a:rPr lang="en-GB" sz="2000" b="1" dirty="0"/>
+                        <a:t>Common uses</a:t>
+                      </a:r>
+                      <a:endParaRPr lang="en-MT" sz="2000" b="1" dirty="0"/>
+                    </a:p>
+                  </a:txBody>
+                  <a:tcPr anchor="ctr"/>
+                </a:tc>
+                <a:tc>
+                  <a:txBody>
+                    <a:bodyPr/>
+                    <a:lstStyle/>
+                    <a:p>
+                      <a:pPr marL="285750" indent="-285750" algn="l">
+                        <a:buFont typeface="Arial" panose="020B0604020202020204" pitchFamily="34" charset="0"/>
+                        <a:buChar char="•"/>
+                      </a:pPr>
+                      <a:r>
+                        <a:rPr lang="en-GB" baseline="0" dirty="0" smtClean="0"/>
+                        <a:t>Task automation</a:t>
+                      </a:r>
+                    </a:p>
+                    <a:p>
+                      <a:pPr marL="285750" indent="-285750" algn="l">
+                        <a:buFont typeface="Arial" panose="020B0604020202020204" pitchFamily="34" charset="0"/>
+                        <a:buChar char="•"/>
+                      </a:pPr>
+                      <a:r>
+                        <a:rPr lang="en-GB" baseline="0" dirty="0" smtClean="0"/>
+                        <a:t>Web-scraping via Beautiful Soup</a:t>
+                      </a:r>
+                    </a:p>
+                    <a:p>
+                      <a:pPr marL="285750" indent="-285750" algn="l">
+                        <a:buFont typeface="Arial" panose="020B0604020202020204" pitchFamily="34" charset="0"/>
+                        <a:buChar char="•"/>
+                      </a:pPr>
+                      <a:r>
+                        <a:rPr lang="en-GB" baseline="0" dirty="0" smtClean="0"/>
+                        <a:t>Web development using Flask</a:t>
+                      </a:r>
+                    </a:p>
+                    <a:p>
+                      <a:pPr marL="285750" indent="-285750" algn="l">
+                        <a:buFont typeface="Arial" panose="020B0604020202020204" pitchFamily="34" charset="0"/>
+                        <a:buChar char="•"/>
+                      </a:pPr>
+                      <a:r>
+                        <a:rPr lang="en-GB" baseline="0" dirty="0" smtClean="0"/>
+                        <a:t>Machine learning</a:t>
+                      </a:r>
+                    </a:p>
+                    <a:p>
+                      <a:pPr marL="285750" indent="-285750" algn="l">
+                        <a:buFont typeface="Arial" panose="020B0604020202020204" pitchFamily="34" charset="0"/>
+                        <a:buChar char="•"/>
+                      </a:pPr>
+                      <a:r>
+                        <a:rPr lang="en-GB" baseline="0" dirty="0" smtClean="0"/>
+                        <a:t>Scientific and mathematical computing</a:t>
+                      </a:r>
+                    </a:p>
+                    <a:p>
+                      <a:pPr marL="285750" indent="-285750" algn="l">
+                        <a:buFont typeface="Arial" panose="020B0604020202020204" pitchFamily="34" charset="0"/>
+                        <a:buChar char="•"/>
+                      </a:pPr>
+                      <a:r>
+                        <a:rPr lang="en-GB" baseline="0" dirty="0" smtClean="0"/>
+                        <a:t>Embedded systems via Raspberry Pi/</a:t>
+                      </a:r>
+                      <a:r>
+                        <a:rPr lang="en-GB" baseline="0" dirty="0" err="1" smtClean="0"/>
+                        <a:t>Arduino</a:t>
+                      </a:r>
+                      <a:endParaRPr lang="en-GB" baseline="0" dirty="0" smtClean="0"/>
+                    </a:p>
+                  </a:txBody>
+                  <a:tcPr anchor="ctr"/>
+                </a:tc>
+                <a:extLst>
+                  <a:ext uri="{0D108BD9-81ED-4DB2-BD59-A6C34878D82A}">
+                    <a16:rowId xmlns:a16="http://schemas.microsoft.com/office/drawing/2014/main" xmlns="" val="221003645"/>
+                  </a:ext>
+                </a:extLst>
+              </a:tr>
+              <a:tr h="576532">
+                <a:tc vMerge="1">
+                  <a:txBody>
+                    <a:bodyPr/>
+                    <a:lstStyle/>
+                    <a:p>
+                      <a:endParaRPr lang="en-MT" dirty="0"/>
+                    </a:p>
+                  </a:txBody>
+                  <a:tcPr/>
+                </a:tc>
+                <a:tc>
+                  <a:txBody>
+                    <a:bodyPr/>
+                    <a:lstStyle/>
+                    <a:p>
+                      <a:pPr algn="ctr"/>
+                      <a:r>
+                        <a:rPr lang="en-GB" sz="2000" b="1" dirty="0"/>
+                        <a:t>Developer</a:t>
+                      </a:r>
+                      <a:endParaRPr lang="en-MT" sz="2000" b="1" dirty="0"/>
+                    </a:p>
+                  </a:txBody>
+                  <a:tcPr anchor="ctr"/>
+                </a:tc>
+                <a:tc>
+                  <a:txBody>
+                    <a:bodyPr/>
+                    <a:lstStyle/>
+                    <a:p>
+                      <a:r>
+                        <a:rPr lang="en-US" sz="1800" b="0" i="0" kern="1200" dirty="0" smtClean="0">
+                          <a:solidFill>
+                            <a:schemeClr val="dk1"/>
+                          </a:solidFill>
+                          <a:latin typeface="+mn-lt"/>
+                          <a:ea typeface="+mn-ea"/>
+                          <a:cs typeface="+mn-cs"/>
+                        </a:rPr>
+                        <a:t>Guido van </a:t>
+                      </a:r>
+                      <a:r>
+                        <a:rPr lang="en-US" sz="1800" b="0" i="0" kern="1200" dirty="0" err="1" smtClean="0">
+                          <a:solidFill>
+                            <a:schemeClr val="dk1"/>
+                          </a:solidFill>
+                          <a:latin typeface="+mn-lt"/>
+                          <a:ea typeface="+mn-ea"/>
+                          <a:cs typeface="+mn-cs"/>
+                        </a:rPr>
+                        <a:t>Rossum</a:t>
+                      </a:r>
+                      <a:endParaRPr lang="en-MT" dirty="0"/>
+                    </a:p>
+                  </a:txBody>
+                  <a:tcPr anchor="ctr"/>
+                </a:tc>
+                <a:extLst>
+                  <a:ext uri="{0D108BD9-81ED-4DB2-BD59-A6C34878D82A}">
+                    <a16:rowId xmlns:a16="http://schemas.microsoft.com/office/drawing/2014/main" xmlns="" val="792754675"/>
+                  </a:ext>
+                </a:extLst>
+              </a:tr>
+              <a:tr h="514944">
+                <a:tc vMerge="1">
+                  <a:txBody>
+                    <a:bodyPr/>
+                    <a:lstStyle/>
+                    <a:p>
+                      <a:endParaRPr lang="en-MT" dirty="0"/>
+                    </a:p>
+                  </a:txBody>
+                  <a:tcPr/>
+                </a:tc>
+                <a:tc>
+                  <a:txBody>
+                    <a:bodyPr/>
+                    <a:lstStyle/>
+                    <a:p>
+                      <a:pPr algn="ctr"/>
+                      <a:r>
+                        <a:rPr lang="en-GB" sz="2000" b="1" dirty="0"/>
+                        <a:t>First appeared</a:t>
+                      </a:r>
+                      <a:endParaRPr lang="en-MT" sz="2000" b="1" dirty="0"/>
+                    </a:p>
+                  </a:txBody>
+                  <a:tcPr anchor="ctr"/>
+                </a:tc>
+                <a:tc>
+                  <a:txBody>
+                    <a:bodyPr/>
+                    <a:lstStyle/>
+                    <a:p>
+                      <a:r>
+                        <a:rPr lang="en-GB" dirty="0" smtClean="0"/>
+                        <a:t>20 February</a:t>
+                      </a:r>
+                      <a:r>
+                        <a:rPr lang="en-GB" baseline="0" dirty="0" smtClean="0"/>
+                        <a:t> 1991 </a:t>
+                      </a:r>
+                    </a:p>
+                    <a:p>
+                      <a:r>
+                        <a:rPr lang="en-GB" sz="1600" baseline="0" dirty="0" smtClean="0"/>
+                        <a:t>(development first started in December 1989)</a:t>
+                      </a:r>
+                      <a:endParaRPr lang="en-MT" dirty="0"/>
+                    </a:p>
+                  </a:txBody>
+                  <a:tcPr anchor="ctr"/>
+                </a:tc>
+                <a:extLst>
+                  <a:ext uri="{0D108BD9-81ED-4DB2-BD59-A6C34878D82A}">
+                    <a16:rowId xmlns:a16="http://schemas.microsoft.com/office/drawing/2014/main" xmlns="" val="3790524959"/>
+                  </a:ext>
+                </a:extLst>
+              </a:tr>
+            </a:tbl>
+          </a:graphicData>
+        </a:graphic>
+      </p:graphicFrame>
+      <p:pic>
+        <p:nvPicPr>
+          <p:cNvPr id="1032" name="Picture 8" descr="See the source image"/>
+          <p:cNvPicPr>
+            <a:picLocks noChangeAspect="1" noChangeArrowheads="1"/>
+          </p:cNvPicPr>
+          <p:nvPr/>
+        </p:nvPicPr>
+        <p:blipFill>
+          <a:blip r:embed="rId2"/>
+          <a:srcRect/>
+          <a:stretch>
+            <a:fillRect/>
+          </a:stretch>
+        </p:blipFill>
+        <p:spPr bwMode="auto">
+          <a:xfrm>
+            <a:off x="946408" y="2337486"/>
+            <a:ext cx="2689868" cy="2481648"/>
+          </a:xfrm>
+          <a:prstGeom prst="rect">
+            <a:avLst/>
+          </a:prstGeom>
+          <a:noFill/>
+        </p:spPr>
+      </p:pic>
+    </p:spTree>
+    <p:extLst>
+      <p:ext uri="{BB962C8B-B14F-4D97-AF65-F5344CB8AC3E}">
+        <p14:creationId xmlns:p14="http://schemas.microsoft.com/office/powerpoint/2010/main" xmlns="" val="3120296696"/>
+      </p:ext>
+    </p:extLst>
+  </p:cSld>
+  <p:clrMapOvr>
+    <a:masterClrMapping/>
+  </p:clrMapOvr>
+</p:sld>
+</file>
+
+<file path=ppt/slides/slide9.xml><?xml version="1.0" encoding="utf-8"?>
+<p:sld xmlns:a="http://schemas.openxmlformats.org/drawingml/2006/main" xmlns:r="http://schemas.openxmlformats.org/officeDocument/2006/relationships" xmlns:p="http://schemas.openxmlformats.org/presentationml/2006/main">
+  <p:cSld>
+    <p:spTree>
+      <p:nvGrpSpPr>
+        <p:cNvPr id="1" name=""/>
+        <p:cNvGrpSpPr/>
+        <p:nvPr/>
+      </p:nvGrpSpPr>
+      <p:grpSpPr>
+        <a:xfrm>
+          <a:off x="0" y="0"/>
+          <a:ext cx="0" cy="0"/>
+          <a:chOff x="0" y="0"/>
+          <a:chExt cx="0" cy="0"/>
+        </a:xfrm>
+      </p:grpSpPr>
+      <p:sp>
+        <p:nvSpPr>
+          <p:cNvPr id="2" name="Title 1">
+            <a:extLst>
+              <a:ext uri="{FF2B5EF4-FFF2-40B4-BE49-F238E27FC236}">
+                <a16:creationId xmlns:a16="http://schemas.microsoft.com/office/drawing/2014/main" xmlns="" id="{36AFE36C-17C6-4686-896D-F89A7C633E12}"/>
+              </a:ext>
+            </a:extLst>
+          </p:cNvPr>
+          <p:cNvSpPr>
+            <a:spLocks noGrp="1"/>
+          </p:cNvSpPr>
+          <p:nvPr>
+            <p:ph type="title"/>
+          </p:nvPr>
+        </p:nvSpPr>
+        <p:spPr/>
+        <p:txBody>
+          <a:bodyPr>
+            <a:normAutofit/>
+          </a:bodyPr>
+          <a:lstStyle/>
+          <a:p>
+            <a:r>
+              <a:rPr lang="en-GB" dirty="0" smtClean="0"/>
+              <a:t>Java</a:t>
+            </a:r>
+            <a:r>
+              <a:rPr lang="en-GB" dirty="0" smtClean="0"/>
+              <a:t> </a:t>
+            </a:r>
+            <a:r>
+              <a:rPr lang="en-GB" dirty="0"/>
+              <a:t>- Examples of programming languages</a:t>
+            </a:r>
+            <a:endParaRPr lang="en-MT" dirty="0"/>
+          </a:p>
+        </p:txBody>
+      </p:sp>
+      <p:graphicFrame>
+        <p:nvGraphicFramePr>
+          <p:cNvPr id="4" name="Table 4">
+            <a:extLst>
+              <a:ext uri="{FF2B5EF4-FFF2-40B4-BE49-F238E27FC236}">
+                <a16:creationId xmlns:a16="http://schemas.microsoft.com/office/drawing/2014/main" xmlns="" id="{8338BB71-8843-4743-8B87-58B20D4C4A6F}"/>
+              </a:ext>
+            </a:extLst>
+          </p:cNvPr>
+          <p:cNvGraphicFramePr>
+            <a:graphicFrameLocks noGrp="1"/>
+          </p:cNvGraphicFramePr>
+          <p:nvPr>
+            <p:ph idx="1"/>
+            <p:extLst>
+              <p:ext uri="{D42A27DB-BD31-4B8C-83A1-F6EECF244321}">
+                <p14:modId xmlns:p14="http://schemas.microsoft.com/office/powerpoint/2010/main" xmlns="" val="1056110357"/>
+              </p:ext>
+            </p:extLst>
+          </p:nvPr>
+        </p:nvGraphicFramePr>
+        <p:xfrm>
+          <a:off x="914400" y="1866900"/>
+          <a:ext cx="10353157" cy="4660852"/>
+        </p:xfrm>
+        <a:graphic>
+          <a:graphicData uri="http://schemas.openxmlformats.org/drawingml/2006/table">
+            <a:tbl>
+              <a:tblPr firstRow="1" bandRow="1">
+                <a:tableStyleId>{69CF1AB2-1976-4502-BF36-3FF5EA218861}</a:tableStyleId>
+              </a:tblPr>
+              <a:tblGrid>
+                <a:gridCol w="2785403">
+                  <a:extLst>
+                    <a:ext uri="{9D8B030D-6E8A-4147-A177-3AD203B41FA5}">
+                      <a16:colId xmlns:a16="http://schemas.microsoft.com/office/drawing/2014/main" xmlns="" val="2977297550"/>
+                    </a:ext>
+                  </a:extLst>
+                </a:gridCol>
+                <a:gridCol w="3010486">
+                  <a:extLst>
+                    <a:ext uri="{9D8B030D-6E8A-4147-A177-3AD203B41FA5}">
+                      <a16:colId xmlns:a16="http://schemas.microsoft.com/office/drawing/2014/main" xmlns="" val="1906464382"/>
+                    </a:ext>
+                  </a:extLst>
+                </a:gridCol>
+                <a:gridCol w="4557268">
+                  <a:extLst>
+                    <a:ext uri="{9D8B030D-6E8A-4147-A177-3AD203B41FA5}">
+                      <a16:colId xmlns:a16="http://schemas.microsoft.com/office/drawing/2014/main" xmlns="" val="565535634"/>
+                    </a:ext>
+                  </a:extLst>
+                </a:gridCol>
+              </a:tblGrid>
+              <a:tr h="514944">
+                <a:tc rowSpan="4">
+                  <a:txBody>
+                    <a:bodyPr/>
+                    <a:lstStyle/>
+                    <a:p>
+                      <a:endParaRPr lang="en-MT" dirty="0"/>
+                    </a:p>
+                  </a:txBody>
+                  <a:tcPr/>
+                </a:tc>
+                <a:tc>
+                  <a:txBody>
+                    <a:bodyPr/>
+                    <a:lstStyle/>
+                    <a:p>
+                      <a:pPr algn="ctr"/>
+                      <a:r>
+                        <a:rPr lang="en-GB" sz="2000" b="1" dirty="0"/>
+                        <a:t>Compiled or Interpreted?</a:t>
+                      </a:r>
+                    </a:p>
+                  </a:txBody>
+                  <a:tcPr anchor="ctr"/>
+                </a:tc>
+                <a:tc>
+                  <a:txBody>
+                    <a:bodyPr/>
+                    <a:lstStyle/>
+                    <a:p>
+                      <a:r>
+                        <a:rPr lang="en-GB" b="0" dirty="0" smtClean="0"/>
+                        <a:t>Both</a:t>
+                      </a:r>
+                      <a:r>
+                        <a:rPr lang="en-GB" b="0" baseline="0" dirty="0" smtClean="0"/>
+                        <a:t> (.java source code is compiled to binary (0’s and 1’s) and then the Java Virtual Machine, an interpreter, is required to execute the binary)</a:t>
+                      </a:r>
+                      <a:endParaRPr lang="en-MT" b="0" dirty="0"/>
+                    </a:p>
+                  </a:txBody>
+                  <a:tcPr anchor="ctr"/>
+                </a:tc>
+                <a:extLst>
+                  <a:ext uri="{0D108BD9-81ED-4DB2-BD59-A6C34878D82A}">
+                    <a16:rowId xmlns:a16="http://schemas.microsoft.com/office/drawing/2014/main" xmlns="" val="3447666898"/>
+                  </a:ext>
+                </a:extLst>
+              </a:tr>
+              <a:tr h="1572318">
+                <a:tc vMerge="1">
+                  <a:txBody>
+                    <a:bodyPr/>
+                    <a:lstStyle/>
+                    <a:p>
+                      <a:endParaRPr lang="en-MT" dirty="0"/>
+                    </a:p>
+                  </a:txBody>
+                  <a:tcPr/>
+                </a:tc>
+                <a:tc>
+                  <a:txBody>
+                    <a:bodyPr/>
+                    <a:lstStyle/>
+                    <a:p>
+                      <a:pPr algn="ctr"/>
+                      <a:r>
+                        <a:rPr lang="en-GB" sz="2000" b="1" dirty="0"/>
+                        <a:t>Common uses</a:t>
+                      </a:r>
+                      <a:endParaRPr lang="en-MT" sz="2000" b="1" dirty="0"/>
+                    </a:p>
+                  </a:txBody>
+                  <a:tcPr anchor="ctr"/>
+                </a:tc>
+                <a:tc>
+                  <a:txBody>
+                    <a:bodyPr/>
+                    <a:lstStyle/>
+                    <a:p>
+                      <a:pPr marL="285750" indent="-285750" algn="l">
+                        <a:buFont typeface="Arial" panose="020B0604020202020204" pitchFamily="34" charset="0"/>
+                        <a:buChar char="•"/>
+                      </a:pPr>
+                      <a:r>
+                        <a:rPr lang="en-GB" baseline="0" dirty="0" smtClean="0"/>
+                        <a:t>Native mobile/tablet applications development via Android Studio, although </a:t>
+                      </a:r>
+                      <a:r>
+                        <a:rPr lang="en-GB" baseline="0" dirty="0" err="1" smtClean="0"/>
+                        <a:t>Kotlin</a:t>
+                      </a:r>
+                      <a:r>
+                        <a:rPr lang="en-GB" baseline="0" dirty="0" smtClean="0"/>
+                        <a:t> is more preferred nowadays for Android development.</a:t>
+                      </a:r>
+                    </a:p>
+                    <a:p>
+                      <a:pPr marL="285750" indent="-285750" algn="l">
+                        <a:buFont typeface="Arial" panose="020B0604020202020204" pitchFamily="34" charset="0"/>
+                        <a:buChar char="•"/>
+                      </a:pPr>
+                      <a:r>
+                        <a:rPr lang="en-GB" baseline="0" dirty="0" smtClean="0"/>
+                        <a:t>Web scraping via Selenium</a:t>
+                      </a:r>
+                    </a:p>
+                    <a:p>
+                      <a:pPr marL="285750" indent="-285750" algn="l">
+                        <a:buFont typeface="Arial" panose="020B0604020202020204" pitchFamily="34" charset="0"/>
+                        <a:buChar char="•"/>
+                      </a:pPr>
+                      <a:r>
+                        <a:rPr lang="en-GB" baseline="0" dirty="0" smtClean="0"/>
+                        <a:t>Web development via JSP</a:t>
+                      </a:r>
+                    </a:p>
+                    <a:p>
+                      <a:pPr marL="285750" indent="-285750" algn="l">
+                        <a:buFont typeface="Arial" panose="020B0604020202020204" pitchFamily="34" charset="0"/>
+                        <a:buChar char="•"/>
+                      </a:pPr>
+                      <a:r>
+                        <a:rPr lang="en-GB" baseline="0" dirty="0" smtClean="0"/>
+                        <a:t>Developing GUI applications with a look and feel of the Windows operating system.</a:t>
+                      </a:r>
+                    </a:p>
+                    <a:p>
+                      <a:pPr marL="285750" indent="-285750" algn="l">
+                        <a:buFont typeface="Arial" panose="020B0604020202020204" pitchFamily="34" charset="0"/>
+                        <a:buChar char="•"/>
+                      </a:pPr>
+                      <a:r>
+                        <a:rPr lang="en-GB" baseline="0" dirty="0" smtClean="0"/>
+                        <a:t>Game development</a:t>
+                      </a:r>
+                    </a:p>
+                  </a:txBody>
+                  <a:tcPr anchor="ctr"/>
+                </a:tc>
+                <a:extLst>
+                  <a:ext uri="{0D108BD9-81ED-4DB2-BD59-A6C34878D82A}">
+                    <a16:rowId xmlns:a16="http://schemas.microsoft.com/office/drawing/2014/main" xmlns="" val="221003645"/>
+                  </a:ext>
+                </a:extLst>
+              </a:tr>
+              <a:tr h="576532">
+                <a:tc vMerge="1">
+                  <a:txBody>
+                    <a:bodyPr/>
+                    <a:lstStyle/>
+                    <a:p>
+                      <a:endParaRPr lang="en-MT" dirty="0"/>
+                    </a:p>
+                  </a:txBody>
+                  <a:tcPr/>
+                </a:tc>
+                <a:tc>
+                  <a:txBody>
+                    <a:bodyPr/>
+                    <a:lstStyle/>
+                    <a:p>
+                      <a:pPr algn="ctr"/>
+                      <a:r>
+                        <a:rPr lang="en-GB" sz="2000" b="1" dirty="0"/>
+                        <a:t>Developer</a:t>
+                      </a:r>
+                      <a:endParaRPr lang="en-MT" sz="2000" b="1" dirty="0"/>
+                    </a:p>
+                  </a:txBody>
+                  <a:tcPr anchor="ctr"/>
+                </a:tc>
+                <a:tc>
+                  <a:txBody>
+                    <a:bodyPr/>
+                    <a:lstStyle/>
+                    <a:p>
+                      <a:r>
+                        <a:rPr lang="en-US" sz="1800" b="0" i="0" kern="1200" dirty="0" smtClean="0">
+                          <a:solidFill>
+                            <a:schemeClr val="dk1"/>
+                          </a:solidFill>
+                          <a:latin typeface="+mn-lt"/>
+                          <a:ea typeface="+mn-ea"/>
+                          <a:cs typeface="+mn-cs"/>
+                        </a:rPr>
+                        <a:t>James Gosling</a:t>
+                      </a:r>
+                      <a:endParaRPr lang="en-MT" dirty="0"/>
+                    </a:p>
+                  </a:txBody>
+                  <a:tcPr anchor="ctr"/>
+                </a:tc>
+                <a:extLst>
+                  <a:ext uri="{0D108BD9-81ED-4DB2-BD59-A6C34878D82A}">
+                    <a16:rowId xmlns:a16="http://schemas.microsoft.com/office/drawing/2014/main" xmlns="" val="792754675"/>
+                  </a:ext>
+                </a:extLst>
+              </a:tr>
+              <a:tr h="514944">
+                <a:tc vMerge="1">
+                  <a:txBody>
+                    <a:bodyPr/>
+                    <a:lstStyle/>
+                    <a:p>
+                      <a:endParaRPr lang="en-MT" dirty="0"/>
+                    </a:p>
+                  </a:txBody>
+                  <a:tcPr/>
+                </a:tc>
+                <a:tc>
+                  <a:txBody>
+                    <a:bodyPr/>
+                    <a:lstStyle/>
+                    <a:p>
+                      <a:pPr algn="ctr"/>
+                      <a:r>
+                        <a:rPr lang="en-GB" sz="2000" b="1" dirty="0"/>
+                        <a:t>First appeared</a:t>
+                      </a:r>
+                      <a:endParaRPr lang="en-MT" sz="2000" b="1" dirty="0"/>
+                    </a:p>
+                  </a:txBody>
+                  <a:tcPr anchor="ctr"/>
+                </a:tc>
+                <a:tc>
+                  <a:txBody>
+                    <a:bodyPr/>
+                    <a:lstStyle/>
+                    <a:p>
+                      <a:r>
+                        <a:rPr lang="en-GB" dirty="0" smtClean="0"/>
+                        <a:t>23 May 1995</a:t>
+                      </a:r>
+                      <a:endParaRPr lang="en-GB" baseline="0" dirty="0" smtClean="0"/>
+                    </a:p>
+                    <a:p>
+                      <a:r>
+                        <a:rPr lang="en-GB" sz="1600" baseline="0" dirty="0" smtClean="0"/>
+                        <a:t>(development first started </a:t>
+                      </a:r>
+                      <a:r>
+                        <a:rPr lang="en-GB" sz="1600" baseline="0" smtClean="0"/>
+                        <a:t>in June 1991)</a:t>
+                      </a:r>
+                      <a:endParaRPr lang="en-MT" dirty="0"/>
+                    </a:p>
+                  </a:txBody>
+                  <a:tcPr anchor="ctr"/>
+                </a:tc>
+                <a:extLst>
+                  <a:ext uri="{0D108BD9-81ED-4DB2-BD59-A6C34878D82A}">
+                    <a16:rowId xmlns:a16="http://schemas.microsoft.com/office/drawing/2014/main" xmlns="" val="3790524959"/>
+                  </a:ext>
+                </a:extLst>
+              </a:tr>
+            </a:tbl>
+          </a:graphicData>
+        </a:graphic>
+      </p:graphicFrame>
+      <p:pic>
+        <p:nvPicPr>
+          <p:cNvPr id="27652" name="Picture 4" descr="See the source image"/>
+          <p:cNvPicPr>
+            <a:picLocks noChangeAspect="1" noChangeArrowheads="1"/>
+          </p:cNvPicPr>
+          <p:nvPr/>
+        </p:nvPicPr>
+        <p:blipFill>
+          <a:blip r:embed="rId2" cstate="print"/>
+          <a:srcRect/>
+          <a:stretch>
+            <a:fillRect/>
+          </a:stretch>
+        </p:blipFill>
+        <p:spPr bwMode="auto">
+          <a:xfrm>
+            <a:off x="1456036" y="2780269"/>
+            <a:ext cx="1620000" cy="2736486"/>
+          </a:xfrm>
+          <a:prstGeom prst="rect">
+            <a:avLst/>
+          </a:prstGeom>
+          <a:noFill/>
+        </p:spPr>
+      </p:pic>
+    </p:spTree>
+    <p:extLst>
+      <p:ext uri="{BB962C8B-B14F-4D97-AF65-F5344CB8AC3E}">
+        <p14:creationId xmlns:p14="http://schemas.microsoft.com/office/powerpoint/2010/main" xmlns="" val="3120296696"/>
       </p:ext>
     </p:extLst>
   </p:cSld>
@@ -7889,7 +9256,7 @@
   <a:extraClrSchemeLst/>
   <a:extLst>
     <a:ext uri="{05A4C25C-085E-4340-85A3-A5531E510DB2}">
-      <thm15:themeFamily xmlns:thm15="http://schemas.microsoft.com/office/thememl/2012/main" name="THREE.pptx" id="{E781C72B-3D65-4B8D-9071-33B66AF0EF30}" vid="{3A5A58F2-9BE1-435C-B12D-88FD9BF70179}"/>
+      <thm15:themeFamily xmlns:thm15="http://schemas.microsoft.com/office/thememl/2012/main" xmlns="" name="THREE.pptx" id="{E781C72B-3D65-4B8D-9071-33B66AF0EF30}" vid="{3A5A58F2-9BE1-435C-B12D-88FD9BF70179}"/>
     </a:ext>
   </a:extLst>
 </a:theme>

</xml_diff>

<commit_message>
Update 4. Creating your first webpage using HTML.pptx
</commit_message>
<xml_diff>
--- a/Presentations/4. Creating your first webpage using HTML.pptx
+++ b/Presentations/4. Creating your first webpage using HTML.pptx
@@ -8648,15 +8648,17 @@
             </a:r>
             <a:r>
               <a:rPr lang="en-US" dirty="0" smtClean="0"/>
-              <a:t> December 1990, after two months of development, by Tim Berners-Lee</a:t>
-            </a:r>
-            <a:r>
-              <a:rPr lang="en-US" smtClean="0"/>
-              <a:t>, whilst working </a:t>
+              <a:t> December 1990, after two months of development, by Tim Berners-Lee, whilst working for the European nuclear research entity CERN.</a:t>
+            </a:r>
+          </a:p>
+          <a:p>
+            <a:r>
+              <a:rPr lang="en-US" dirty="0" err="1" smtClean="0"/>
+              <a:t>WorldWideWeb</a:t>
             </a:r>
             <a:r>
               <a:rPr lang="en-US" dirty="0" smtClean="0"/>
-              <a:t>for the European nuclear research entity CERN.</a:t>
+              <a:t> was released to the public in August 1991.</a:t>
             </a:r>
           </a:p>
           <a:p>

</xml_diff>

<commit_message>
Started the guide on how to prepare our first HTML project.
</commit_message>
<xml_diff>
--- a/Presentations/4. Creating your first webpage using HTML.pptx
+++ b/Presentations/4. Creating your first webpage using HTML.pptx
@@ -19,6 +19,7 @@
     <p:sldId id="266" r:id="rId13"/>
     <p:sldId id="268" r:id="rId14"/>
     <p:sldId id="267" r:id="rId15"/>
+    <p:sldId id="272" r:id="rId16"/>
   </p:sldIdLst>
   <p:sldSz cx="12192000" cy="6858000"/>
   <p:notesSz cx="6858000" cy="9144000"/>
@@ -119,10 +120,29 @@
   </p:defaultTextStyle>
   <p:extLst>
     <p:ext uri="{EFAFB233-063F-42B5-8137-9DF3F51BA10A}">
-      <p15:sldGuideLst xmlns:p15="http://schemas.microsoft.com/office/powerpoint/2012/main" xmlns=""/>
+      <p15:sldGuideLst xmlns:p15="http://schemas.microsoft.com/office/powerpoint/2012/main">
+        <p15:guide id="1" orient="horz" pos="2160">
+          <p15:clr>
+            <a:srgbClr val="A4A3A4"/>
+          </p15:clr>
+        </p15:guide>
+        <p15:guide id="2" pos="3840">
+          <p15:clr>
+            <a:srgbClr val="A4A3A4"/>
+          </p15:clr>
+        </p15:guide>
+      </p15:sldGuideLst>
     </p:ext>
   </p:extLst>
 </p:presentation>
+</file>
+
+<file path=ppt/revisionInfo.xml><?xml version="1.0" encoding="utf-8"?>
+<p1510:revInfo xmlns:a="http://schemas.openxmlformats.org/drawingml/2006/main" xmlns:r="http://schemas.openxmlformats.org/officeDocument/2006/relationships" xmlns:p1510="http://schemas.microsoft.com/office/powerpoint/2015/10/main">
+  <p1510:revLst>
+    <p1510:client id="{F180C23C-8E27-706D-2112-D1E84D099240}" v="1306" dt="2021-04-08T12:56:47.022"/>
+  </p1510:revLst>
+</p1510:revInfo>
 </file>
 
 <file path=ppt/slideLayouts/slideLayout1.xml><?xml version="1.0" encoding="utf-8"?>
@@ -311,7 +331,7 @@
             <a:fld id="{88D38747-4367-4BD2-8D51-C97E202738E2}" type="datetime1">
               <a:rPr lang="en-US" smtClean="0"/>
               <a:pPr/>
-              <a:t>3/25/2021</a:t>
+              <a:t>4/8/2021</a:t>
             </a:fld>
             <a:endParaRPr lang="en-US" dirty="0"/>
           </a:p>
@@ -363,7 +383,7 @@
     </p:spTree>
     <p:extLst>
       <p:ext uri="{BB962C8B-B14F-4D97-AF65-F5344CB8AC3E}">
-        <p14:creationId xmlns:p14="http://schemas.microsoft.com/office/powerpoint/2010/main" xmlns="" val="3852525471"/>
+        <p14:creationId xmlns:p14="http://schemas.microsoft.com/office/powerpoint/2010/main" val="3852525471"/>
       </p:ext>
     </p:extLst>
   </p:cSld>
@@ -395,7 +415,7 @@
           <p:cNvPr id="16" name="Picture 15" descr="Slate-V2-HD-panoPhotoInset.png">
             <a:extLst>
               <a:ext uri="{FF2B5EF4-FFF2-40B4-BE49-F238E27FC236}">
-                <a16:creationId xmlns:a16="http://schemas.microsoft.com/office/drawing/2014/main" xmlns="" id="{CE39118B-B3AD-4BD4-BA22-DEFF4E76CE9A}"/>
+                <a16:creationId xmlns:a16="http://schemas.microsoft.com/office/drawing/2014/main" id="{CE39118B-B3AD-4BD4-BA22-DEFF4E76CE9A}"/>
               </a:ext>
             </a:extLst>
           </p:cNvPr>
@@ -408,7 +428,7 @@
           <a:blip r:embed="rId2">
             <a:extLst>
               <a:ext uri="{28A0092B-C50C-407E-A947-70E740481C1C}">
-                <a14:useLocalDpi xmlns:a14="http://schemas.microsoft.com/office/drawing/2010/main" xmlns="" val="0"/>
+                <a14:useLocalDpi xmlns:a14="http://schemas.microsoft.com/office/drawing/2010/main" val="0"/>
               </a:ext>
             </a:extLst>
           </a:blip>
@@ -617,7 +637,7 @@
             <a:fld id="{11F1B079-7EF0-44EE-B798-BCC497C9F3B2}" type="datetime1">
               <a:rPr lang="en-US" smtClean="0"/>
               <a:pPr/>
-              <a:t>3/25/2021</a:t>
+              <a:t>4/8/2021</a:t>
             </a:fld>
             <a:endParaRPr lang="en-US" dirty="0"/>
           </a:p>
@@ -669,7 +689,7 @@
     </p:spTree>
     <p:extLst>
       <p:ext uri="{BB962C8B-B14F-4D97-AF65-F5344CB8AC3E}">
-        <p14:creationId xmlns:p14="http://schemas.microsoft.com/office/powerpoint/2010/main" xmlns="" val="2214665590"/>
+        <p14:creationId xmlns:p14="http://schemas.microsoft.com/office/powerpoint/2010/main" val="2214665590"/>
       </p:ext>
     </p:extLst>
   </p:cSld>
@@ -813,7 +833,7 @@
             <a:fld id="{28FF70A8-1D13-4657-95F0-A9EA54967B8D}" type="datetime1">
               <a:rPr lang="en-US" smtClean="0"/>
               <a:pPr/>
-              <a:t>3/25/2021</a:t>
+              <a:t>4/8/2021</a:t>
             </a:fld>
             <a:endParaRPr lang="en-US" dirty="0"/>
           </a:p>
@@ -865,7 +885,7 @@
     </p:spTree>
     <p:extLst>
       <p:ext uri="{BB962C8B-B14F-4D97-AF65-F5344CB8AC3E}">
-        <p14:creationId xmlns:p14="http://schemas.microsoft.com/office/powerpoint/2010/main" xmlns="" val="581205565"/>
+        <p14:creationId xmlns:p14="http://schemas.microsoft.com/office/powerpoint/2010/main" val="581205565"/>
       </p:ext>
     </p:extLst>
   </p:cSld>
@@ -1078,7 +1098,7 @@
             <a:fld id="{21EB90AC-71BD-4C7F-8ACA-7B3F18292E63}" type="datetime1">
               <a:rPr lang="en-US" smtClean="0"/>
               <a:pPr/>
-              <a:t>3/25/2021</a:t>
+              <a:t>4/8/2021</a:t>
             </a:fld>
             <a:endParaRPr lang="en-US" dirty="0"/>
           </a:p>
@@ -1132,7 +1152,7 @@
           <p:cNvPr id="11" name="TextBox 10">
             <a:extLst>
               <a:ext uri="{FF2B5EF4-FFF2-40B4-BE49-F238E27FC236}">
-                <a16:creationId xmlns:a16="http://schemas.microsoft.com/office/drawing/2014/main" xmlns="" id="{223F0D53-0705-41B7-8554-09D21E7807F9}"/>
+                <a16:creationId xmlns:a16="http://schemas.microsoft.com/office/drawing/2014/main" id="{223F0D53-0705-41B7-8554-09D21E7807F9}"/>
               </a:ext>
             </a:extLst>
           </p:cNvPr>
@@ -1254,7 +1274,7 @@
           <p:cNvPr id="13" name="TextBox 12">
             <a:extLst>
               <a:ext uri="{FF2B5EF4-FFF2-40B4-BE49-F238E27FC236}">
-                <a16:creationId xmlns:a16="http://schemas.microsoft.com/office/drawing/2014/main" xmlns="" id="{C7F647CD-0F1A-4BB3-89E0-A74F1E1B098D}"/>
+                <a16:creationId xmlns:a16="http://schemas.microsoft.com/office/drawing/2014/main" id="{C7F647CD-0F1A-4BB3-89E0-A74F1E1B098D}"/>
               </a:ext>
             </a:extLst>
           </p:cNvPr>
@@ -1374,7 +1394,7 @@
     </p:spTree>
     <p:extLst>
       <p:ext uri="{BB962C8B-B14F-4D97-AF65-F5344CB8AC3E}">
-        <p14:creationId xmlns:p14="http://schemas.microsoft.com/office/powerpoint/2010/main" xmlns="" val="1480594345"/>
+        <p14:creationId xmlns:p14="http://schemas.microsoft.com/office/powerpoint/2010/main" val="1480594345"/>
       </p:ext>
     </p:extLst>
   </p:cSld>
@@ -1516,7 +1536,7 @@
             <a:fld id="{4E6EFC2C-8905-46F0-B443-CE905B76BA01}" type="datetime1">
               <a:rPr lang="en-US" smtClean="0"/>
               <a:pPr/>
-              <a:t>3/25/2021</a:t>
+              <a:t>4/8/2021</a:t>
             </a:fld>
             <a:endParaRPr lang="en-US" dirty="0"/>
           </a:p>
@@ -1568,7 +1588,7 @@
     </p:spTree>
     <p:extLst>
       <p:ext uri="{BB962C8B-B14F-4D97-AF65-F5344CB8AC3E}">
-        <p14:creationId xmlns:p14="http://schemas.microsoft.com/office/powerpoint/2010/main" xmlns="" val="3158836233"/>
+        <p14:creationId xmlns:p14="http://schemas.microsoft.com/office/powerpoint/2010/main" val="3158836233"/>
       </p:ext>
     </p:extLst>
   </p:cSld>
@@ -2055,7 +2075,7 @@
             <a:fld id="{D9079DC3-C9B5-499E-9140-0DC28B7074E2}" type="datetime1">
               <a:rPr lang="en-US" smtClean="0"/>
               <a:pPr/>
-              <a:t>3/25/2021</a:t>
+              <a:t>4/8/2021</a:t>
             </a:fld>
             <a:endParaRPr lang="en-US" dirty="0"/>
           </a:p>
@@ -2107,7 +2127,7 @@
     </p:spTree>
     <p:extLst>
       <p:ext uri="{BB962C8B-B14F-4D97-AF65-F5344CB8AC3E}">
-        <p14:creationId xmlns:p14="http://schemas.microsoft.com/office/powerpoint/2010/main" xmlns="" val="2387406900"/>
+        <p14:creationId xmlns:p14="http://schemas.microsoft.com/office/powerpoint/2010/main" val="2387406900"/>
       </p:ext>
     </p:extLst>
   </p:cSld>
@@ -2139,7 +2159,7 @@
           <p:cNvPr id="2" name="Picture 1" descr="Slate-V2-HD-3colPhotoInset.png">
             <a:extLst>
               <a:ext uri="{FF2B5EF4-FFF2-40B4-BE49-F238E27FC236}">
-                <a16:creationId xmlns:a16="http://schemas.microsoft.com/office/drawing/2014/main" xmlns="" id="{7E87C569-D426-4615-ADA7-B370EA98340A}"/>
+                <a16:creationId xmlns:a16="http://schemas.microsoft.com/office/drawing/2014/main" id="{7E87C569-D426-4615-ADA7-B370EA98340A}"/>
               </a:ext>
             </a:extLst>
           </p:cNvPr>
@@ -2152,7 +2172,7 @@
           <a:blip r:embed="rId2">
             <a:extLst>
               <a:ext uri="{28A0092B-C50C-407E-A947-70E740481C1C}">
-                <a14:useLocalDpi xmlns:a14="http://schemas.microsoft.com/office/drawing/2010/main" xmlns="" val="0"/>
+                <a14:useLocalDpi xmlns:a14="http://schemas.microsoft.com/office/drawing/2010/main" val="0"/>
               </a:ext>
             </a:extLst>
           </a:blip>
@@ -2175,7 +2195,7 @@
           <p:cNvPr id="36" name="Picture 35" descr="Slate-V2-HD-3colPhotoInset.png">
             <a:extLst>
               <a:ext uri="{FF2B5EF4-FFF2-40B4-BE49-F238E27FC236}">
-                <a16:creationId xmlns:a16="http://schemas.microsoft.com/office/drawing/2014/main" xmlns="" id="{7B353ED4-7AD0-46C9-88ED-1A16B1433AF7}"/>
+                <a16:creationId xmlns:a16="http://schemas.microsoft.com/office/drawing/2014/main" id="{7B353ED4-7AD0-46C9-88ED-1A16B1433AF7}"/>
               </a:ext>
             </a:extLst>
           </p:cNvPr>
@@ -2188,7 +2208,7 @@
           <a:blip r:embed="rId2">
             <a:extLst>
               <a:ext uri="{28A0092B-C50C-407E-A947-70E740481C1C}">
-                <a14:useLocalDpi xmlns:a14="http://schemas.microsoft.com/office/drawing/2010/main" xmlns="" val="0"/>
+                <a14:useLocalDpi xmlns:a14="http://schemas.microsoft.com/office/drawing/2010/main" val="0"/>
               </a:ext>
             </a:extLst>
           </a:blip>
@@ -2211,7 +2231,7 @@
           <p:cNvPr id="37" name="Picture 36" descr="Slate-V2-HD-3colPhotoInset.png">
             <a:extLst>
               <a:ext uri="{FF2B5EF4-FFF2-40B4-BE49-F238E27FC236}">
-                <a16:creationId xmlns:a16="http://schemas.microsoft.com/office/drawing/2014/main" xmlns="" id="{F561D985-AD57-459A-B3A6-EBF296039766}"/>
+                <a16:creationId xmlns:a16="http://schemas.microsoft.com/office/drawing/2014/main" id="{F561D985-AD57-459A-B3A6-EBF296039766}"/>
               </a:ext>
             </a:extLst>
           </p:cNvPr>
@@ -2224,7 +2244,7 @@
           <a:blip r:embed="rId2">
             <a:extLst>
               <a:ext uri="{28A0092B-C50C-407E-A947-70E740481C1C}">
-                <a14:useLocalDpi xmlns:a14="http://schemas.microsoft.com/office/drawing/2010/main" xmlns="" val="0"/>
+                <a14:useLocalDpi xmlns:a14="http://schemas.microsoft.com/office/drawing/2010/main" val="0"/>
               </a:ext>
             </a:extLst>
           </a:blip>
@@ -2939,7 +2959,7 @@
             <a:fld id="{30BB33EA-E472-4D22-9C03-A9C14AA21CED}" type="datetime1">
               <a:rPr lang="en-US" smtClean="0"/>
               <a:pPr/>
-              <a:t>3/25/2021</a:t>
+              <a:t>4/8/2021</a:t>
             </a:fld>
             <a:endParaRPr lang="en-US" dirty="0"/>
           </a:p>
@@ -2991,7 +3011,7 @@
     </p:spTree>
     <p:extLst>
       <p:ext uri="{BB962C8B-B14F-4D97-AF65-F5344CB8AC3E}">
-        <p14:creationId xmlns:p14="http://schemas.microsoft.com/office/powerpoint/2010/main" xmlns="" val="1462302683"/>
+        <p14:creationId xmlns:p14="http://schemas.microsoft.com/office/powerpoint/2010/main" val="1462302683"/>
       </p:ext>
     </p:extLst>
   </p:cSld>
@@ -3111,7 +3131,7 @@
             <a:fld id="{217E833E-1B6D-415F-AD29-75AE8C43BD0D}" type="datetime1">
               <a:rPr lang="en-US" smtClean="0"/>
               <a:pPr/>
-              <a:t>3/25/2021</a:t>
+              <a:t>4/8/2021</a:t>
             </a:fld>
             <a:endParaRPr lang="en-US" dirty="0"/>
           </a:p>
@@ -3163,7 +3183,7 @@
     </p:spTree>
     <p:extLst>
       <p:ext uri="{BB962C8B-B14F-4D97-AF65-F5344CB8AC3E}">
-        <p14:creationId xmlns:p14="http://schemas.microsoft.com/office/powerpoint/2010/main" xmlns="" val="4094158688"/>
+        <p14:creationId xmlns:p14="http://schemas.microsoft.com/office/powerpoint/2010/main" val="4094158688"/>
       </p:ext>
     </p:extLst>
   </p:cSld>
@@ -3297,7 +3317,7 @@
             <a:fld id="{8452596F-08A7-4B70-989A-F2B1CF31E66B}" type="datetime1">
               <a:rPr lang="en-US" smtClean="0"/>
               <a:pPr/>
-              <a:t>3/25/2021</a:t>
+              <a:t>4/8/2021</a:t>
             </a:fld>
             <a:endParaRPr lang="en-US" dirty="0"/>
           </a:p>
@@ -3349,7 +3369,7 @@
     </p:spTree>
     <p:extLst>
       <p:ext uri="{BB962C8B-B14F-4D97-AF65-F5344CB8AC3E}">
-        <p14:creationId xmlns:p14="http://schemas.microsoft.com/office/powerpoint/2010/main" xmlns="" val="1534527743"/>
+        <p14:creationId xmlns:p14="http://schemas.microsoft.com/office/powerpoint/2010/main" val="1534527743"/>
       </p:ext>
     </p:extLst>
   </p:cSld>
@@ -3469,7 +3489,7 @@
             <a:fld id="{73C55A3C-5767-4844-A0A3-83778C2E5409}" type="datetime1">
               <a:rPr lang="en-US" smtClean="0"/>
               <a:pPr/>
-              <a:t>3/25/2021</a:t>
+              <a:t>4/8/2021</a:t>
             </a:fld>
             <a:endParaRPr lang="en-US" dirty="0"/>
           </a:p>
@@ -3521,7 +3541,7 @@
     </p:spTree>
     <p:extLst>
       <p:ext uri="{BB962C8B-B14F-4D97-AF65-F5344CB8AC3E}">
-        <p14:creationId xmlns:p14="http://schemas.microsoft.com/office/powerpoint/2010/main" xmlns="" val="2785865172"/>
+        <p14:creationId xmlns:p14="http://schemas.microsoft.com/office/powerpoint/2010/main" val="2785865172"/>
       </p:ext>
     </p:extLst>
   </p:cSld>
@@ -3715,7 +3735,7 @@
             <a:fld id="{CAE507A8-A5CF-4D38-AB86-7EDDA87A85D4}" type="datetime1">
               <a:rPr lang="en-US" smtClean="0"/>
               <a:pPr/>
-              <a:t>3/25/2021</a:t>
+              <a:t>4/8/2021</a:t>
             </a:fld>
             <a:endParaRPr lang="en-US" dirty="0"/>
           </a:p>
@@ -3767,7 +3787,7 @@
     </p:spTree>
     <p:extLst>
       <p:ext uri="{BB962C8B-B14F-4D97-AF65-F5344CB8AC3E}">
-        <p14:creationId xmlns:p14="http://schemas.microsoft.com/office/powerpoint/2010/main" xmlns="" val="1226486879"/>
+        <p14:creationId xmlns:p14="http://schemas.microsoft.com/office/powerpoint/2010/main" val="1226486879"/>
       </p:ext>
     </p:extLst>
   </p:cSld>
@@ -3958,7 +3978,7 @@
             <a:fld id="{BDFCD27C-8599-43EF-BA1D-14DDC1946E06}" type="datetime1">
               <a:rPr lang="en-US" smtClean="0"/>
               <a:pPr/>
-              <a:t>3/25/2021</a:t>
+              <a:t>4/8/2021</a:t>
             </a:fld>
             <a:endParaRPr lang="en-US" dirty="0"/>
           </a:p>
@@ -4010,7 +4030,7 @@
     </p:spTree>
     <p:extLst>
       <p:ext uri="{BB962C8B-B14F-4D97-AF65-F5344CB8AC3E}">
-        <p14:creationId xmlns:p14="http://schemas.microsoft.com/office/powerpoint/2010/main" xmlns="" val="3175175660"/>
+        <p14:creationId xmlns:p14="http://schemas.microsoft.com/office/powerpoint/2010/main" val="3175175660"/>
       </p:ext>
     </p:extLst>
   </p:cSld>
@@ -4042,7 +4062,7 @@
           <p:cNvPr id="20" name="Picture 19" descr="Slate-V2-HD-compPhotoInset.png">
             <a:extLst>
               <a:ext uri="{FF2B5EF4-FFF2-40B4-BE49-F238E27FC236}">
-                <a16:creationId xmlns:a16="http://schemas.microsoft.com/office/drawing/2014/main" xmlns="" id="{37B721FF-D609-4D98-9D19-CF75AA8A54FC}"/>
+                <a16:creationId xmlns:a16="http://schemas.microsoft.com/office/drawing/2014/main" id="{37B721FF-D609-4D98-9D19-CF75AA8A54FC}"/>
               </a:ext>
             </a:extLst>
           </p:cNvPr>
@@ -4055,7 +4075,7 @@
           <a:blip r:embed="rId2">
             <a:extLst>
               <a:ext uri="{28A0092B-C50C-407E-A947-70E740481C1C}">
-                <a14:useLocalDpi xmlns:a14="http://schemas.microsoft.com/office/drawing/2010/main" xmlns="" val="0"/>
+                <a14:useLocalDpi xmlns:a14="http://schemas.microsoft.com/office/drawing/2010/main" val="0"/>
               </a:ext>
             </a:extLst>
           </a:blip>
@@ -4078,7 +4098,7 @@
           <p:cNvPr id="21" name="Picture 20" descr="Slate-V2-HD-compPhotoInset.png">
             <a:extLst>
               <a:ext uri="{FF2B5EF4-FFF2-40B4-BE49-F238E27FC236}">
-                <a16:creationId xmlns:a16="http://schemas.microsoft.com/office/drawing/2014/main" xmlns="" id="{073936BD-C868-433F-8E84-D6DD8E640E3E}"/>
+                <a16:creationId xmlns:a16="http://schemas.microsoft.com/office/drawing/2014/main" id="{073936BD-C868-433F-8E84-D6DD8E640E3E}"/>
               </a:ext>
             </a:extLst>
           </p:cNvPr>
@@ -4091,7 +4111,7 @@
           <a:blip r:embed="rId2">
             <a:extLst>
               <a:ext uri="{28A0092B-C50C-407E-A947-70E740481C1C}">
-                <a14:useLocalDpi xmlns:a14="http://schemas.microsoft.com/office/drawing/2010/main" xmlns="" val="0"/>
+                <a14:useLocalDpi xmlns:a14="http://schemas.microsoft.com/office/drawing/2010/main" val="0"/>
               </a:ext>
             </a:extLst>
           </a:blip>
@@ -4443,7 +4463,7 @@
             <a:fld id="{49343D99-809A-49C0-96E5-4250D0B498EE}" type="datetime1">
               <a:rPr lang="en-US" smtClean="0"/>
               <a:pPr/>
-              <a:t>3/25/2021</a:t>
+              <a:t>4/8/2021</a:t>
             </a:fld>
             <a:endParaRPr lang="en-US" dirty="0"/>
           </a:p>
@@ -4495,7 +4515,7 @@
     </p:spTree>
     <p:extLst>
       <p:ext uri="{BB962C8B-B14F-4D97-AF65-F5344CB8AC3E}">
-        <p14:creationId xmlns:p14="http://schemas.microsoft.com/office/powerpoint/2010/main" xmlns="" val="2608887001"/>
+        <p14:creationId xmlns:p14="http://schemas.microsoft.com/office/powerpoint/2010/main" val="2608887001"/>
       </p:ext>
     </p:extLst>
   </p:cSld>
@@ -4563,7 +4583,7 @@
             <a:fld id="{A143DE9B-B678-4EFB-BB7D-A4370204A0B0}" type="datetime1">
               <a:rPr lang="en-US" smtClean="0"/>
               <a:pPr/>
-              <a:t>3/25/2021</a:t>
+              <a:t>4/8/2021</a:t>
             </a:fld>
             <a:endParaRPr lang="en-US" dirty="0"/>
           </a:p>
@@ -4615,7 +4635,7 @@
     </p:spTree>
     <p:extLst>
       <p:ext uri="{BB962C8B-B14F-4D97-AF65-F5344CB8AC3E}">
-        <p14:creationId xmlns:p14="http://schemas.microsoft.com/office/powerpoint/2010/main" xmlns="" val="2164888601"/>
+        <p14:creationId xmlns:p14="http://schemas.microsoft.com/office/powerpoint/2010/main" val="2164888601"/>
       </p:ext>
     </p:extLst>
   </p:cSld>
@@ -4660,7 +4680,7 @@
             <a:fld id="{E68812DA-F765-4142-A6A3-A8ED7235E082}" type="datetime1">
               <a:rPr lang="en-US" smtClean="0"/>
               <a:pPr/>
-              <a:t>3/25/2021</a:t>
+              <a:t>4/8/2021</a:t>
             </a:fld>
             <a:endParaRPr lang="en-US" dirty="0"/>
           </a:p>
@@ -4712,7 +4732,7 @@
     </p:spTree>
     <p:extLst>
       <p:ext uri="{BB962C8B-B14F-4D97-AF65-F5344CB8AC3E}">
-        <p14:creationId xmlns:p14="http://schemas.microsoft.com/office/powerpoint/2010/main" xmlns="" val="765916630"/>
+        <p14:creationId xmlns:p14="http://schemas.microsoft.com/office/powerpoint/2010/main" val="765916630"/>
       </p:ext>
     </p:extLst>
   </p:cSld>
@@ -4917,7 +4937,7 @@
             <a:fld id="{3E0277FD-7DE6-41D4-930D-AC99F5AFE54E}" type="datetime1">
               <a:rPr lang="en-US" smtClean="0"/>
               <a:pPr/>
-              <a:t>3/25/2021</a:t>
+              <a:t>4/8/2021</a:t>
             </a:fld>
             <a:endParaRPr lang="en-US" dirty="0"/>
           </a:p>
@@ -4969,7 +4989,7 @@
     </p:spTree>
     <p:extLst>
       <p:ext uri="{BB962C8B-B14F-4D97-AF65-F5344CB8AC3E}">
-        <p14:creationId xmlns:p14="http://schemas.microsoft.com/office/powerpoint/2010/main" xmlns="" val="596479147"/>
+        <p14:creationId xmlns:p14="http://schemas.microsoft.com/office/powerpoint/2010/main" val="596479147"/>
       </p:ext>
     </p:extLst>
   </p:cSld>
@@ -5001,7 +5021,7 @@
           <p:cNvPr id="22" name="Picture 21" descr="Slate-V2-HD-vertPhotoInset.png">
             <a:extLst>
               <a:ext uri="{FF2B5EF4-FFF2-40B4-BE49-F238E27FC236}">
-                <a16:creationId xmlns:a16="http://schemas.microsoft.com/office/drawing/2014/main" xmlns="" id="{4D06E496-ACBA-4063-B4A1-C5C484EE5A77}"/>
+                <a16:creationId xmlns:a16="http://schemas.microsoft.com/office/drawing/2014/main" id="{4D06E496-ACBA-4063-B4A1-C5C484EE5A77}"/>
               </a:ext>
             </a:extLst>
           </p:cNvPr>
@@ -5014,7 +5034,7 @@
           <a:blip r:embed="rId2">
             <a:extLst>
               <a:ext uri="{28A0092B-C50C-407E-A947-70E740481C1C}">
-                <a14:useLocalDpi xmlns:a14="http://schemas.microsoft.com/office/drawing/2010/main" xmlns="" val="0"/>
+                <a14:useLocalDpi xmlns:a14="http://schemas.microsoft.com/office/drawing/2010/main" val="0"/>
               </a:ext>
             </a:extLst>
           </a:blip>
@@ -5225,7 +5245,7 @@
             <a:fld id="{9EA15526-7079-4B7B-987C-1B5FAE11A0FF}" type="datetime1">
               <a:rPr lang="en-US" smtClean="0"/>
               <a:pPr/>
-              <a:t>3/25/2021</a:t>
+              <a:t>4/8/2021</a:t>
             </a:fld>
             <a:endParaRPr lang="en-US" dirty="0"/>
           </a:p>
@@ -5278,7 +5298,7 @@
     </p:spTree>
     <p:extLst>
       <p:ext uri="{BB962C8B-B14F-4D97-AF65-F5344CB8AC3E}">
-        <p14:creationId xmlns:p14="http://schemas.microsoft.com/office/powerpoint/2010/main" xmlns="" val="1426378702"/>
+        <p14:creationId xmlns:p14="http://schemas.microsoft.com/office/powerpoint/2010/main" val="1426378702"/>
       </p:ext>
     </p:extLst>
   </p:cSld>
@@ -5462,7 +5482,7 @@
             <a:fld id="{073ED0CC-082F-4160-86E5-0D6041F12778}" type="datetime1">
               <a:rPr lang="en-US" smtClean="0"/>
               <a:pPr/>
-              <a:t>3/25/2021</a:t>
+              <a:t>4/8/2021</a:t>
             </a:fld>
             <a:endParaRPr lang="en-US" dirty="0"/>
           </a:p>
@@ -5564,7 +5584,7 @@
     </p:spTree>
     <p:extLst>
       <p:ext uri="{BB962C8B-B14F-4D97-AF65-F5344CB8AC3E}">
-        <p14:creationId xmlns:p14="http://schemas.microsoft.com/office/powerpoint/2010/main" xmlns="" val="1069802776"/>
+        <p14:creationId xmlns:p14="http://schemas.microsoft.com/office/powerpoint/2010/main" val="1069802776"/>
       </p:ext>
     </p:extLst>
   </p:cSld>
@@ -6168,7 +6188,7 @@
           <p:cNvPr id="5" name="Picture 4" descr="A picture containing cup, coffee, food, beverage&#10;&#10;Description automatically generated">
             <a:extLst>
               <a:ext uri="{FF2B5EF4-FFF2-40B4-BE49-F238E27FC236}">
-                <a16:creationId xmlns:a16="http://schemas.microsoft.com/office/drawing/2014/main" xmlns="" id="{91BC5572-FC33-4C1C-8DEE-C2CF75A75641}"/>
+                <a16:creationId xmlns:a16="http://schemas.microsoft.com/office/drawing/2014/main" id="{91BC5572-FC33-4C1C-8DEE-C2CF75A75641}"/>
               </a:ext>
             </a:extLst>
           </p:cNvPr>
@@ -6182,7 +6202,7 @@
             <a:alphaModFix amt="35000"/>
             <a:extLst>
               <a:ext uri="{28A0092B-C50C-407E-A947-70E740481C1C}">
-                <a14:useLocalDpi xmlns:a14="http://schemas.microsoft.com/office/drawing/2010/main" xmlns="" val="0"/>
+                <a14:useLocalDpi xmlns:a14="http://schemas.microsoft.com/office/drawing/2010/main" val="0"/>
               </a:ext>
             </a:extLst>
           </a:blip>
@@ -6204,7 +6224,7 @@
           <p:cNvPr id="2" name="Title 1">
             <a:extLst>
               <a:ext uri="{FF2B5EF4-FFF2-40B4-BE49-F238E27FC236}">
-                <a16:creationId xmlns:a16="http://schemas.microsoft.com/office/drawing/2014/main" xmlns="" id="{0D1F047C-C727-42A7-85C5-68C5AA1B1A93}"/>
+                <a16:creationId xmlns:a16="http://schemas.microsoft.com/office/drawing/2014/main" id="{0D1F047C-C727-42A7-85C5-68C5AA1B1A93}"/>
               </a:ext>
             </a:extLst>
           </p:cNvPr>
@@ -6239,7 +6259,7 @@
           <p:cNvPr id="3" name="Subtitle 2">
             <a:extLst>
               <a:ext uri="{FF2B5EF4-FFF2-40B4-BE49-F238E27FC236}">
-                <a16:creationId xmlns:a16="http://schemas.microsoft.com/office/drawing/2014/main" xmlns="" id="{DB93FB3F-A8D4-46D3-A1C6-C79C64563729}"/>
+                <a16:creationId xmlns:a16="http://schemas.microsoft.com/office/drawing/2014/main" id="{DB93FB3F-A8D4-46D3-A1C6-C79C64563729}"/>
               </a:ext>
             </a:extLst>
           </p:cNvPr>
@@ -6272,7 +6292,7 @@
     </p:spTree>
     <p:extLst>
       <p:ext uri="{BB962C8B-B14F-4D97-AF65-F5344CB8AC3E}">
-        <p14:creationId xmlns:p14="http://schemas.microsoft.com/office/powerpoint/2010/main" xmlns="" val="633738316"/>
+        <p14:creationId xmlns:p14="http://schemas.microsoft.com/office/powerpoint/2010/main" val="633738316"/>
       </p:ext>
     </p:extLst>
   </p:cSld>
@@ -6304,7 +6324,7 @@
           <p:cNvPr id="2" name="Title 1">
             <a:extLst>
               <a:ext uri="{FF2B5EF4-FFF2-40B4-BE49-F238E27FC236}">
-                <a16:creationId xmlns:a16="http://schemas.microsoft.com/office/drawing/2014/main" xmlns="" id="{36AFE36C-17C6-4686-896D-F89A7C633E12}"/>
+                <a16:creationId xmlns:a16="http://schemas.microsoft.com/office/drawing/2014/main" id="{36AFE36C-17C6-4686-896D-F89A7C633E12}"/>
               </a:ext>
             </a:extLst>
           </p:cNvPr>
@@ -6335,7 +6355,7 @@
           <p:cNvPr id="4" name="Table 4">
             <a:extLst>
               <a:ext uri="{FF2B5EF4-FFF2-40B4-BE49-F238E27FC236}">
-                <a16:creationId xmlns:a16="http://schemas.microsoft.com/office/drawing/2014/main" xmlns="" id="{8338BB71-8843-4743-8B87-58B20D4C4A6F}"/>
+                <a16:creationId xmlns:a16="http://schemas.microsoft.com/office/drawing/2014/main" id="{8338BB71-8843-4743-8B87-58B20D4C4A6F}"/>
               </a:ext>
             </a:extLst>
           </p:cNvPr>
@@ -6346,7 +6366,7 @@
             <p:ph idx="1"/>
             <p:extLst>
               <p:ext uri="{D42A27DB-BD31-4B8C-83A1-F6EECF244321}">
-                <p14:modId xmlns:p14="http://schemas.microsoft.com/office/powerpoint/2010/main" xmlns="" val="1056110357"/>
+                <p14:modId xmlns:p14="http://schemas.microsoft.com/office/powerpoint/2010/main" val="1056110357"/>
               </p:ext>
             </p:extLst>
           </p:nvPr>
@@ -6365,21 +6385,21 @@
                 <a:gridCol w="2785403">
                   <a:extLst>
                     <a:ext uri="{9D8B030D-6E8A-4147-A177-3AD203B41FA5}">
-                      <a16:colId xmlns:a16="http://schemas.microsoft.com/office/drawing/2014/main" xmlns="" val="2977297550"/>
+                      <a16:colId xmlns:a16="http://schemas.microsoft.com/office/drawing/2014/main" val="2977297550"/>
                     </a:ext>
                   </a:extLst>
                 </a:gridCol>
                 <a:gridCol w="3010486">
                   <a:extLst>
                     <a:ext uri="{9D8B030D-6E8A-4147-A177-3AD203B41FA5}">
-                      <a16:colId xmlns:a16="http://schemas.microsoft.com/office/drawing/2014/main" xmlns="" val="1906464382"/>
+                      <a16:colId xmlns:a16="http://schemas.microsoft.com/office/drawing/2014/main" val="1906464382"/>
                     </a:ext>
                   </a:extLst>
                 </a:gridCol>
                 <a:gridCol w="4557268">
                   <a:extLst>
                     <a:ext uri="{9D8B030D-6E8A-4147-A177-3AD203B41FA5}">
-                      <a16:colId xmlns:a16="http://schemas.microsoft.com/office/drawing/2014/main" xmlns="" val="565535634"/>
+                      <a16:colId xmlns:a16="http://schemas.microsoft.com/office/drawing/2014/main" val="565535634"/>
                     </a:ext>
                   </a:extLst>
                 </a:gridCol>
@@ -6415,7 +6435,7 @@
                     <a:lstStyle/>
                     <a:p>
                       <a:r>
-                        <a:rPr lang="en-GB" b="0" dirty="0" smtClean="0"/>
+                        <a:rPr lang="en-GB" b="0" dirty="0"/>
                         <a:t>Interpreted</a:t>
                       </a:r>
                       <a:endParaRPr lang="en-MT" b="0" dirty="0"/>
@@ -6425,7 +6445,7 @@
                 </a:tc>
                 <a:extLst>
                   <a:ext uri="{0D108BD9-81ED-4DB2-BD59-A6C34878D82A}">
-                    <a16:rowId xmlns:a16="http://schemas.microsoft.com/office/drawing/2014/main" xmlns="" val="3447666898"/>
+                    <a16:rowId xmlns:a16="http://schemas.microsoft.com/office/drawing/2014/main" val="3447666898"/>
                   </a:ext>
                 </a:extLst>
               </a:tr>
@@ -6465,11 +6485,11 @@
                         <a:buChar char="•"/>
                       </a:pPr>
                       <a:r>
-                        <a:rPr lang="en-GB" dirty="0" smtClean="0"/>
+                        <a:rPr lang="en-GB" dirty="0"/>
                         <a:t>Hybrid mobile</a:t>
                       </a:r>
                       <a:r>
-                        <a:rPr lang="en-GB" baseline="0" dirty="0" smtClean="0"/>
+                        <a:rPr lang="en-GB" baseline="0" dirty="0"/>
                         <a:t> applications development, assisting HTML alongside CSS and mobile-first frameworks such as Ionic/Bootstrap. </a:t>
                       </a:r>
                     </a:p>
@@ -6479,7 +6499,7 @@
                         <a:buChar char="•"/>
                       </a:pPr>
                       <a:r>
-                        <a:rPr lang="en-GB" baseline="0" dirty="0" smtClean="0"/>
+                        <a:rPr lang="en-GB" baseline="0" dirty="0"/>
                         <a:t>Online game development</a:t>
                       </a:r>
                     </a:p>
@@ -6489,7 +6509,7 @@
                         <a:buChar char="•"/>
                       </a:pPr>
                       <a:r>
-                        <a:rPr lang="en-GB" baseline="0" dirty="0" smtClean="0"/>
+                        <a:rPr lang="en-GB" baseline="0" dirty="0"/>
                         <a:t>Developing desktop applications alongside HTML and CSS.</a:t>
                       </a:r>
                     </a:p>
@@ -6499,7 +6519,7 @@
                         <a:buChar char="•"/>
                       </a:pPr>
                       <a:r>
-                        <a:rPr lang="en-GB" baseline="0" dirty="0" smtClean="0"/>
+                        <a:rPr lang="en-GB" baseline="0" dirty="0"/>
                         <a:t>Modifying/adding/removing HTML elements.</a:t>
                       </a:r>
                     </a:p>
@@ -6508,7 +6528,7 @@
                 </a:tc>
                 <a:extLst>
                   <a:ext uri="{0D108BD9-81ED-4DB2-BD59-A6C34878D82A}">
-                    <a16:rowId xmlns:a16="http://schemas.microsoft.com/office/drawing/2014/main" xmlns="" val="221003645"/>
+                    <a16:rowId xmlns:a16="http://schemas.microsoft.com/office/drawing/2014/main" val="221003645"/>
                   </a:ext>
                 </a:extLst>
               </a:tr>
@@ -6544,15 +6564,15 @@
                     <a:lstStyle/>
                     <a:p>
                       <a:r>
-                        <a:rPr lang="en-GB" dirty="0" smtClean="0"/>
+                        <a:rPr lang="en-GB" dirty="0"/>
                         <a:t>Brendan</a:t>
                       </a:r>
                       <a:r>
-                        <a:rPr lang="en-GB" baseline="0" dirty="0" smtClean="0"/>
+                        <a:rPr lang="en-GB" baseline="0" dirty="0"/>
                         <a:t> </a:t>
                       </a:r>
                       <a:r>
-                        <a:rPr lang="en-GB" baseline="0" dirty="0" err="1" smtClean="0"/>
+                        <a:rPr lang="en-GB" baseline="0" dirty="0" err="1"/>
                         <a:t>Eich</a:t>
                       </a:r>
                       <a:endParaRPr lang="en-MT" dirty="0"/>
@@ -6562,7 +6582,7 @@
                 </a:tc>
                 <a:extLst>
                   <a:ext uri="{0D108BD9-81ED-4DB2-BD59-A6C34878D82A}">
-                    <a16:rowId xmlns:a16="http://schemas.microsoft.com/office/drawing/2014/main" xmlns="" val="792754675"/>
+                    <a16:rowId xmlns:a16="http://schemas.microsoft.com/office/drawing/2014/main" val="792754675"/>
                   </a:ext>
                 </a:extLst>
               </a:tr>
@@ -6608,7 +6628,7 @@
                 </a:tc>
                 <a:extLst>
                   <a:ext uri="{0D108BD9-81ED-4DB2-BD59-A6C34878D82A}">
-                    <a16:rowId xmlns:a16="http://schemas.microsoft.com/office/drawing/2014/main" xmlns="" val="3790524959"/>
+                    <a16:rowId xmlns:a16="http://schemas.microsoft.com/office/drawing/2014/main" val="3790524959"/>
                   </a:ext>
                 </a:extLst>
               </a:tr>
@@ -6621,7 +6641,7 @@
           <p:cNvPr id="3076" name="Picture 4" descr="Javascript Logo PNG Transparent &amp; SVG Vector - Freebie Supply">
             <a:extLst>
               <a:ext uri="{FF2B5EF4-FFF2-40B4-BE49-F238E27FC236}">
-                <a16:creationId xmlns:a16="http://schemas.microsoft.com/office/drawing/2014/main" xmlns="" id="{97EC9761-E1D0-4F8A-8B19-38C40ED50E3E}"/>
+                <a16:creationId xmlns:a16="http://schemas.microsoft.com/office/drawing/2014/main" id="{97EC9761-E1D0-4F8A-8B19-38C40ED50E3E}"/>
               </a:ext>
             </a:extLst>
           </p:cNvPr>
@@ -6634,7 +6654,7 @@
           <a:blip r:embed="rId2" cstate="print">
             <a:extLst>
               <a:ext uri="{28A0092B-C50C-407E-A947-70E740481C1C}">
-                <a14:useLocalDpi xmlns:a14="http://schemas.microsoft.com/office/drawing/2010/main" xmlns="" val="0"/>
+                <a14:useLocalDpi xmlns:a14="http://schemas.microsoft.com/office/drawing/2010/main" val="0"/>
               </a:ext>
             </a:extLst>
           </a:blip>
@@ -6654,7 +6674,7 @@
           <a:noFill/>
           <a:extLst>
             <a:ext uri="{909E8E84-426E-40DD-AFC4-6F175D3DCCD1}">
-              <a14:hiddenFill xmlns:a14="http://schemas.microsoft.com/office/drawing/2010/main" xmlns="">
+              <a14:hiddenFill xmlns:a14="http://schemas.microsoft.com/office/drawing/2010/main">
                 <a:solidFill>
                   <a:srgbClr val="FFFFFF"/>
                 </a:solidFill>
@@ -6666,7 +6686,7 @@
     </p:spTree>
     <p:extLst>
       <p:ext uri="{BB962C8B-B14F-4D97-AF65-F5344CB8AC3E}">
-        <p14:creationId xmlns:p14="http://schemas.microsoft.com/office/powerpoint/2010/main" xmlns="" val="3120296696"/>
+        <p14:creationId xmlns:p14="http://schemas.microsoft.com/office/powerpoint/2010/main" val="3120296696"/>
       </p:ext>
     </p:extLst>
   </p:cSld>
@@ -6698,7 +6718,7 @@
           <p:cNvPr id="2" name="Title 1">
             <a:extLst>
               <a:ext uri="{FF2B5EF4-FFF2-40B4-BE49-F238E27FC236}">
-                <a16:creationId xmlns:a16="http://schemas.microsoft.com/office/drawing/2014/main" xmlns="" id="{36AFE36C-17C6-4686-896D-F89A7C633E12}"/>
+                <a16:creationId xmlns:a16="http://schemas.microsoft.com/office/drawing/2014/main" id="{36AFE36C-17C6-4686-896D-F89A7C633E12}"/>
               </a:ext>
             </a:extLst>
           </p:cNvPr>
@@ -6717,12 +6737,8 @@
           <a:lstStyle/>
           <a:p>
             <a:r>
-              <a:rPr lang="en-GB" dirty="0" smtClean="0"/>
-              <a:t>Python </a:t>
-            </a:r>
-            <a:r>
               <a:rPr lang="en-GB" dirty="0"/>
-              <a:t>- Examples of programming languages</a:t>
+              <a:t>Python - Examples of programming languages</a:t>
             </a:r>
             <a:endParaRPr lang="en-MT" dirty="0"/>
           </a:p>
@@ -6733,7 +6749,7 @@
           <p:cNvPr id="4" name="Table 4">
             <a:extLst>
               <a:ext uri="{FF2B5EF4-FFF2-40B4-BE49-F238E27FC236}">
-                <a16:creationId xmlns:a16="http://schemas.microsoft.com/office/drawing/2014/main" xmlns="" id="{8338BB71-8843-4743-8B87-58B20D4C4A6F}"/>
+                <a16:creationId xmlns:a16="http://schemas.microsoft.com/office/drawing/2014/main" id="{8338BB71-8843-4743-8B87-58B20D4C4A6F}"/>
               </a:ext>
             </a:extLst>
           </p:cNvPr>
@@ -6744,7 +6760,7 @@
             <p:ph idx="1"/>
             <p:extLst>
               <p:ext uri="{D42A27DB-BD31-4B8C-83A1-F6EECF244321}">
-                <p14:modId xmlns:p14="http://schemas.microsoft.com/office/powerpoint/2010/main" xmlns="" val="1056110357"/>
+                <p14:modId xmlns:p14="http://schemas.microsoft.com/office/powerpoint/2010/main" val="1056110357"/>
               </p:ext>
             </p:extLst>
           </p:nvPr>
@@ -6763,21 +6779,21 @@
                 <a:gridCol w="2785403">
                   <a:extLst>
                     <a:ext uri="{9D8B030D-6E8A-4147-A177-3AD203B41FA5}">
-                      <a16:colId xmlns:a16="http://schemas.microsoft.com/office/drawing/2014/main" xmlns="" val="2977297550"/>
+                      <a16:colId xmlns:a16="http://schemas.microsoft.com/office/drawing/2014/main" val="2977297550"/>
                     </a:ext>
                   </a:extLst>
                 </a:gridCol>
                 <a:gridCol w="3010486">
                   <a:extLst>
                     <a:ext uri="{9D8B030D-6E8A-4147-A177-3AD203B41FA5}">
-                      <a16:colId xmlns:a16="http://schemas.microsoft.com/office/drawing/2014/main" xmlns="" val="1906464382"/>
+                      <a16:colId xmlns:a16="http://schemas.microsoft.com/office/drawing/2014/main" val="1906464382"/>
                     </a:ext>
                   </a:extLst>
                 </a:gridCol>
                 <a:gridCol w="4557268">
                   <a:extLst>
                     <a:ext uri="{9D8B030D-6E8A-4147-A177-3AD203B41FA5}">
-                      <a16:colId xmlns:a16="http://schemas.microsoft.com/office/drawing/2014/main" xmlns="" val="565535634"/>
+                      <a16:colId xmlns:a16="http://schemas.microsoft.com/office/drawing/2014/main" val="565535634"/>
                     </a:ext>
                   </a:extLst>
                 </a:gridCol>
@@ -6813,7 +6829,7 @@
                     <a:lstStyle/>
                     <a:p>
                       <a:r>
-                        <a:rPr lang="en-GB" b="0" dirty="0" smtClean="0"/>
+                        <a:rPr lang="en-GB" b="0" dirty="0"/>
                         <a:t>Interpreted</a:t>
                       </a:r>
                       <a:endParaRPr lang="en-MT" b="0" dirty="0"/>
@@ -6823,7 +6839,7 @@
                 </a:tc>
                 <a:extLst>
                   <a:ext uri="{0D108BD9-81ED-4DB2-BD59-A6C34878D82A}">
-                    <a16:rowId xmlns:a16="http://schemas.microsoft.com/office/drawing/2014/main" xmlns="" val="3447666898"/>
+                    <a16:rowId xmlns:a16="http://schemas.microsoft.com/office/drawing/2014/main" val="3447666898"/>
                   </a:ext>
                 </a:extLst>
               </a:tr>
@@ -6863,7 +6879,7 @@
                         <a:buChar char="•"/>
                       </a:pPr>
                       <a:r>
-                        <a:rPr lang="en-GB" baseline="0" dirty="0" smtClean="0"/>
+                        <a:rPr lang="en-GB" baseline="0" dirty="0"/>
                         <a:t>Task automation</a:t>
                       </a:r>
                     </a:p>
@@ -6873,7 +6889,7 @@
                         <a:buChar char="•"/>
                       </a:pPr>
                       <a:r>
-                        <a:rPr lang="en-GB" baseline="0" dirty="0" smtClean="0"/>
+                        <a:rPr lang="en-GB" baseline="0" dirty="0"/>
                         <a:t>Web-scraping via Beautiful Soup</a:t>
                       </a:r>
                     </a:p>
@@ -6883,7 +6899,7 @@
                         <a:buChar char="•"/>
                       </a:pPr>
                       <a:r>
-                        <a:rPr lang="en-GB" baseline="0" dirty="0" smtClean="0"/>
+                        <a:rPr lang="en-GB" baseline="0" dirty="0"/>
                         <a:t>Web development using Flask</a:t>
                       </a:r>
                     </a:p>
@@ -6893,7 +6909,7 @@
                         <a:buChar char="•"/>
                       </a:pPr>
                       <a:r>
-                        <a:rPr lang="en-GB" baseline="0" dirty="0" smtClean="0"/>
+                        <a:rPr lang="en-GB" baseline="0" dirty="0"/>
                         <a:t>Machine learning</a:t>
                       </a:r>
                     </a:p>
@@ -6903,7 +6919,7 @@
                         <a:buChar char="•"/>
                       </a:pPr>
                       <a:r>
-                        <a:rPr lang="en-GB" baseline="0" dirty="0" smtClean="0"/>
+                        <a:rPr lang="en-GB" baseline="0" dirty="0"/>
                         <a:t>Scientific and mathematical computing</a:t>
                       </a:r>
                     </a:p>
@@ -6913,21 +6929,21 @@
                         <a:buChar char="•"/>
                       </a:pPr>
                       <a:r>
-                        <a:rPr lang="en-GB" baseline="0" dirty="0" smtClean="0"/>
+                        <a:rPr lang="en-GB" baseline="0" dirty="0"/>
                         <a:t>Embedded systems via Raspberry Pi/</a:t>
                       </a:r>
                       <a:r>
-                        <a:rPr lang="en-GB" baseline="0" dirty="0" err="1" smtClean="0"/>
+                        <a:rPr lang="en-GB" baseline="0" dirty="0" err="1"/>
                         <a:t>Arduino</a:t>
                       </a:r>
-                      <a:endParaRPr lang="en-GB" baseline="0" dirty="0" smtClean="0"/>
+                      <a:endParaRPr lang="en-GB" baseline="0" dirty="0"/>
                     </a:p>
                   </a:txBody>
                   <a:tcPr anchor="ctr"/>
                 </a:tc>
                 <a:extLst>
                   <a:ext uri="{0D108BD9-81ED-4DB2-BD59-A6C34878D82A}">
-                    <a16:rowId xmlns:a16="http://schemas.microsoft.com/office/drawing/2014/main" xmlns="" val="221003645"/>
+                    <a16:rowId xmlns:a16="http://schemas.microsoft.com/office/drawing/2014/main" val="221003645"/>
                   </a:ext>
                 </a:extLst>
               </a:tr>
@@ -6963,7 +6979,7 @@
                     <a:lstStyle/>
                     <a:p>
                       <a:r>
-                        <a:rPr lang="en-US" sz="1800" b="0" i="0" kern="1200" dirty="0" smtClean="0">
+                        <a:rPr lang="en-US" sz="1800" b="0" i="0" kern="1200" dirty="0">
                           <a:solidFill>
                             <a:schemeClr val="dk1"/>
                           </a:solidFill>
@@ -6974,7 +6990,7 @@
                         <a:t>Guido van </a:t>
                       </a:r>
                       <a:r>
-                        <a:rPr lang="en-US" sz="1800" b="0" i="0" kern="1200" dirty="0" err="1" smtClean="0">
+                        <a:rPr lang="en-US" sz="1800" b="0" i="0" kern="1200" dirty="0" err="1">
                           <a:solidFill>
                             <a:schemeClr val="dk1"/>
                           </a:solidFill>
@@ -6991,7 +7007,7 @@
                 </a:tc>
                 <a:extLst>
                   <a:ext uri="{0D108BD9-81ED-4DB2-BD59-A6C34878D82A}">
-                    <a16:rowId xmlns:a16="http://schemas.microsoft.com/office/drawing/2014/main" xmlns="" val="792754675"/>
+                    <a16:rowId xmlns:a16="http://schemas.microsoft.com/office/drawing/2014/main" val="792754675"/>
                   </a:ext>
                 </a:extLst>
               </a:tr>
@@ -7027,17 +7043,17 @@
                     <a:lstStyle/>
                     <a:p>
                       <a:r>
-                        <a:rPr lang="en-GB" dirty="0" smtClean="0"/>
+                        <a:rPr lang="en-GB" dirty="0"/>
                         <a:t>20 February</a:t>
                       </a:r>
                       <a:r>
-                        <a:rPr lang="en-GB" baseline="0" dirty="0" smtClean="0"/>
+                        <a:rPr lang="en-GB" baseline="0" dirty="0"/>
                         <a:t> 1991 </a:t>
                       </a:r>
                     </a:p>
                     <a:p>
                       <a:r>
-                        <a:rPr lang="en-GB" sz="1600" baseline="0" dirty="0" smtClean="0"/>
+                        <a:rPr lang="en-GB" sz="1600" baseline="0" dirty="0"/>
                         <a:t>(development first started in December 1989)</a:t>
                       </a:r>
                       <a:endParaRPr lang="en-MT" dirty="0"/>
@@ -7047,7 +7063,7 @@
                 </a:tc>
                 <a:extLst>
                   <a:ext uri="{0D108BD9-81ED-4DB2-BD59-A6C34878D82A}">
-                    <a16:rowId xmlns:a16="http://schemas.microsoft.com/office/drawing/2014/main" xmlns="" val="3790524959"/>
+                    <a16:rowId xmlns:a16="http://schemas.microsoft.com/office/drawing/2014/main" val="3790524959"/>
                   </a:ext>
                 </a:extLst>
               </a:tr>
@@ -7084,7 +7100,7 @@
     </p:spTree>
     <p:extLst>
       <p:ext uri="{BB962C8B-B14F-4D97-AF65-F5344CB8AC3E}">
-        <p14:creationId xmlns:p14="http://schemas.microsoft.com/office/powerpoint/2010/main" xmlns="" val="3120296696"/>
+        <p14:creationId xmlns:p14="http://schemas.microsoft.com/office/powerpoint/2010/main" val="3120296696"/>
       </p:ext>
     </p:extLst>
   </p:cSld>
@@ -7116,7 +7132,7 @@
           <p:cNvPr id="2" name="Title 1">
             <a:extLst>
               <a:ext uri="{FF2B5EF4-FFF2-40B4-BE49-F238E27FC236}">
-                <a16:creationId xmlns:a16="http://schemas.microsoft.com/office/drawing/2014/main" xmlns="" id="{36AFE36C-17C6-4686-896D-F89A7C633E12}"/>
+                <a16:creationId xmlns:a16="http://schemas.microsoft.com/office/drawing/2014/main" id="{36AFE36C-17C6-4686-896D-F89A7C633E12}"/>
               </a:ext>
             </a:extLst>
           </p:cNvPr>
@@ -7135,12 +7151,8 @@
           <a:lstStyle/>
           <a:p>
             <a:r>
-              <a:rPr lang="en-GB" dirty="0" smtClean="0"/>
-              <a:t>Java </a:t>
-            </a:r>
-            <a:r>
               <a:rPr lang="en-GB" dirty="0"/>
-              <a:t>- Examples of programming languages</a:t>
+              <a:t>Java - Examples of programming languages</a:t>
             </a:r>
             <a:endParaRPr lang="en-MT" dirty="0"/>
           </a:p>
@@ -7151,7 +7163,7 @@
           <p:cNvPr id="4" name="Table 4">
             <a:extLst>
               <a:ext uri="{FF2B5EF4-FFF2-40B4-BE49-F238E27FC236}">
-                <a16:creationId xmlns:a16="http://schemas.microsoft.com/office/drawing/2014/main" xmlns="" id="{8338BB71-8843-4743-8B87-58B20D4C4A6F}"/>
+                <a16:creationId xmlns:a16="http://schemas.microsoft.com/office/drawing/2014/main" id="{8338BB71-8843-4743-8B87-58B20D4C4A6F}"/>
               </a:ext>
             </a:extLst>
           </p:cNvPr>
@@ -7162,7 +7174,7 @@
             <p:ph idx="1"/>
             <p:extLst>
               <p:ext uri="{D42A27DB-BD31-4B8C-83A1-F6EECF244321}">
-                <p14:modId xmlns:p14="http://schemas.microsoft.com/office/powerpoint/2010/main" xmlns="" val="1056110357"/>
+                <p14:modId xmlns:p14="http://schemas.microsoft.com/office/powerpoint/2010/main" val="1056110357"/>
               </p:ext>
             </p:extLst>
           </p:nvPr>
@@ -7181,21 +7193,21 @@
                 <a:gridCol w="2785403">
                   <a:extLst>
                     <a:ext uri="{9D8B030D-6E8A-4147-A177-3AD203B41FA5}">
-                      <a16:colId xmlns:a16="http://schemas.microsoft.com/office/drawing/2014/main" xmlns="" val="2977297550"/>
+                      <a16:colId xmlns:a16="http://schemas.microsoft.com/office/drawing/2014/main" val="2977297550"/>
                     </a:ext>
                   </a:extLst>
                 </a:gridCol>
                 <a:gridCol w="3010486">
                   <a:extLst>
                     <a:ext uri="{9D8B030D-6E8A-4147-A177-3AD203B41FA5}">
-                      <a16:colId xmlns:a16="http://schemas.microsoft.com/office/drawing/2014/main" xmlns="" val="1906464382"/>
+                      <a16:colId xmlns:a16="http://schemas.microsoft.com/office/drawing/2014/main" val="1906464382"/>
                     </a:ext>
                   </a:extLst>
                 </a:gridCol>
                 <a:gridCol w="4557268">
                   <a:extLst>
                     <a:ext uri="{9D8B030D-6E8A-4147-A177-3AD203B41FA5}">
-                      <a16:colId xmlns:a16="http://schemas.microsoft.com/office/drawing/2014/main" xmlns="" val="565535634"/>
+                      <a16:colId xmlns:a16="http://schemas.microsoft.com/office/drawing/2014/main" val="565535634"/>
                     </a:ext>
                   </a:extLst>
                 </a:gridCol>
@@ -7231,11 +7243,11 @@
                     <a:lstStyle/>
                     <a:p>
                       <a:r>
-                        <a:rPr lang="en-GB" b="0" dirty="0" smtClean="0"/>
+                        <a:rPr lang="en-GB" b="0" dirty="0"/>
                         <a:t>Both</a:t>
                       </a:r>
                       <a:r>
-                        <a:rPr lang="en-GB" b="0" baseline="0" dirty="0" smtClean="0"/>
+                        <a:rPr lang="en-GB" b="0" baseline="0" dirty="0"/>
                         <a:t> (.java source code is compiled to binary (0’s and 1’s) and then the Java Virtual Machine, an interpreter, is required to execute the binary)</a:t>
                       </a:r>
                       <a:endParaRPr lang="en-MT" b="0" dirty="0"/>
@@ -7245,7 +7257,7 @@
                 </a:tc>
                 <a:extLst>
                   <a:ext uri="{0D108BD9-81ED-4DB2-BD59-A6C34878D82A}">
-                    <a16:rowId xmlns:a16="http://schemas.microsoft.com/office/drawing/2014/main" xmlns="" val="3447666898"/>
+                    <a16:rowId xmlns:a16="http://schemas.microsoft.com/office/drawing/2014/main" val="3447666898"/>
                   </a:ext>
                 </a:extLst>
               </a:tr>
@@ -7285,15 +7297,15 @@
                         <a:buChar char="•"/>
                       </a:pPr>
                       <a:r>
-                        <a:rPr lang="en-GB" baseline="0" dirty="0" smtClean="0"/>
+                        <a:rPr lang="en-GB" baseline="0" dirty="0"/>
                         <a:t>Native mobile/tablet applications development via Android Studio, although </a:t>
                       </a:r>
                       <a:r>
-                        <a:rPr lang="en-GB" baseline="0" dirty="0" err="1" smtClean="0"/>
+                        <a:rPr lang="en-GB" baseline="0" dirty="0" err="1"/>
                         <a:t>Kotlin</a:t>
                       </a:r>
                       <a:r>
-                        <a:rPr lang="en-GB" baseline="0" dirty="0" smtClean="0"/>
+                        <a:rPr lang="en-GB" baseline="0" dirty="0"/>
                         <a:t> is more preferred nowadays for Android development.</a:t>
                       </a:r>
                     </a:p>
@@ -7303,7 +7315,7 @@
                         <a:buChar char="•"/>
                       </a:pPr>
                       <a:r>
-                        <a:rPr lang="en-GB" baseline="0" dirty="0" smtClean="0"/>
+                        <a:rPr lang="en-GB" baseline="0" dirty="0"/>
                         <a:t>Web scraping via Selenium</a:t>
                       </a:r>
                     </a:p>
@@ -7313,7 +7325,7 @@
                         <a:buChar char="•"/>
                       </a:pPr>
                       <a:r>
-                        <a:rPr lang="en-GB" baseline="0" dirty="0" smtClean="0"/>
+                        <a:rPr lang="en-GB" baseline="0" dirty="0"/>
                         <a:t>Web development via JSP</a:t>
                       </a:r>
                     </a:p>
@@ -7323,7 +7335,7 @@
                         <a:buChar char="•"/>
                       </a:pPr>
                       <a:r>
-                        <a:rPr lang="en-GB" baseline="0" dirty="0" smtClean="0"/>
+                        <a:rPr lang="en-GB" baseline="0" dirty="0"/>
                         <a:t>Developing GUI applications with a look and feel of the Windows operating system.</a:t>
                       </a:r>
                     </a:p>
@@ -7333,7 +7345,7 @@
                         <a:buChar char="•"/>
                       </a:pPr>
                       <a:r>
-                        <a:rPr lang="en-GB" baseline="0" dirty="0" smtClean="0"/>
+                        <a:rPr lang="en-GB" baseline="0" dirty="0"/>
                         <a:t>Game development</a:t>
                       </a:r>
                     </a:p>
@@ -7342,7 +7354,7 @@
                 </a:tc>
                 <a:extLst>
                   <a:ext uri="{0D108BD9-81ED-4DB2-BD59-A6C34878D82A}">
-                    <a16:rowId xmlns:a16="http://schemas.microsoft.com/office/drawing/2014/main" xmlns="" val="221003645"/>
+                    <a16:rowId xmlns:a16="http://schemas.microsoft.com/office/drawing/2014/main" val="221003645"/>
                   </a:ext>
                 </a:extLst>
               </a:tr>
@@ -7378,7 +7390,7 @@
                     <a:lstStyle/>
                     <a:p>
                       <a:r>
-                        <a:rPr lang="en-US" sz="1800" b="0" i="0" kern="1200" dirty="0" smtClean="0">
+                        <a:rPr lang="en-US" sz="1800" b="0" i="0" kern="1200" dirty="0">
                           <a:solidFill>
                             <a:schemeClr val="dk1"/>
                           </a:solidFill>
@@ -7395,7 +7407,7 @@
                 </a:tc>
                 <a:extLst>
                   <a:ext uri="{0D108BD9-81ED-4DB2-BD59-A6C34878D82A}">
-                    <a16:rowId xmlns:a16="http://schemas.microsoft.com/office/drawing/2014/main" xmlns="" val="792754675"/>
+                    <a16:rowId xmlns:a16="http://schemas.microsoft.com/office/drawing/2014/main" val="792754675"/>
                   </a:ext>
                 </a:extLst>
               </a:tr>
@@ -7431,18 +7443,18 @@
                     <a:lstStyle/>
                     <a:p>
                       <a:r>
-                        <a:rPr lang="en-GB" dirty="0" smtClean="0"/>
+                        <a:rPr lang="en-GB" dirty="0"/>
                         <a:t>23 May 1995</a:t>
                       </a:r>
-                      <a:endParaRPr lang="en-GB" baseline="0" dirty="0" smtClean="0"/>
+                      <a:endParaRPr lang="en-GB" baseline="0" dirty="0"/>
                     </a:p>
                     <a:p>
                       <a:r>
-                        <a:rPr lang="en-GB" sz="1600" baseline="0" dirty="0" smtClean="0"/>
+                        <a:rPr lang="en-GB" sz="1600" baseline="0" dirty="0"/>
                         <a:t>(development first started </a:t>
                       </a:r>
                       <a:r>
-                        <a:rPr lang="en-GB" sz="1600" baseline="0" smtClean="0"/>
+                        <a:rPr lang="en-GB" sz="1600" baseline="0"/>
                         <a:t>in June 1991)</a:t>
                       </a:r>
                       <a:endParaRPr lang="en-MT" dirty="0"/>
@@ -7452,7 +7464,7 @@
                 </a:tc>
                 <a:extLst>
                   <a:ext uri="{0D108BD9-81ED-4DB2-BD59-A6C34878D82A}">
-                    <a16:rowId xmlns:a16="http://schemas.microsoft.com/office/drawing/2014/main" xmlns="" val="3790524959"/>
+                    <a16:rowId xmlns:a16="http://schemas.microsoft.com/office/drawing/2014/main" val="3790524959"/>
                   </a:ext>
                 </a:extLst>
               </a:tr>
@@ -7489,7 +7501,7 @@
     </p:spTree>
     <p:extLst>
       <p:ext uri="{BB962C8B-B14F-4D97-AF65-F5344CB8AC3E}">
-        <p14:creationId xmlns:p14="http://schemas.microsoft.com/office/powerpoint/2010/main" xmlns="" val="3120296696"/>
+        <p14:creationId xmlns:p14="http://schemas.microsoft.com/office/powerpoint/2010/main" val="3120296696"/>
       </p:ext>
     </p:extLst>
   </p:cSld>
@@ -7521,7 +7533,7 @@
           <p:cNvPr id="2" name="Title 1">
             <a:extLst>
               <a:ext uri="{FF2B5EF4-FFF2-40B4-BE49-F238E27FC236}">
-                <a16:creationId xmlns:a16="http://schemas.microsoft.com/office/drawing/2014/main" xmlns="" id="{36AFE36C-17C6-4686-896D-F89A7C633E12}"/>
+                <a16:creationId xmlns:a16="http://schemas.microsoft.com/office/drawing/2014/main" id="{36AFE36C-17C6-4686-896D-F89A7C633E12}"/>
               </a:ext>
             </a:extLst>
           </p:cNvPr>
@@ -7540,12 +7552,8 @@
           <a:lstStyle/>
           <a:p>
             <a:r>
-              <a:rPr lang="en-GB" dirty="0" smtClean="0"/>
-              <a:t>PHP </a:t>
-            </a:r>
-            <a:r>
               <a:rPr lang="en-GB" dirty="0"/>
-              <a:t>- Examples of programming languages</a:t>
+              <a:t>PHP - Examples of programming languages</a:t>
             </a:r>
             <a:endParaRPr lang="en-MT" dirty="0"/>
           </a:p>
@@ -7556,7 +7564,7 @@
           <p:cNvPr id="4" name="Table 4">
             <a:extLst>
               <a:ext uri="{FF2B5EF4-FFF2-40B4-BE49-F238E27FC236}">
-                <a16:creationId xmlns:a16="http://schemas.microsoft.com/office/drawing/2014/main" xmlns="" id="{8338BB71-8843-4743-8B87-58B20D4C4A6F}"/>
+                <a16:creationId xmlns:a16="http://schemas.microsoft.com/office/drawing/2014/main" id="{8338BB71-8843-4743-8B87-58B20D4C4A6F}"/>
               </a:ext>
             </a:extLst>
           </p:cNvPr>
@@ -7567,7 +7575,7 @@
             <p:ph idx="1"/>
             <p:extLst>
               <p:ext uri="{D42A27DB-BD31-4B8C-83A1-F6EECF244321}">
-                <p14:modId xmlns:p14="http://schemas.microsoft.com/office/powerpoint/2010/main" xmlns="" val="1056110357"/>
+                <p14:modId xmlns:p14="http://schemas.microsoft.com/office/powerpoint/2010/main" val="1056110357"/>
               </p:ext>
             </p:extLst>
           </p:nvPr>
@@ -7586,21 +7594,21 @@
                 <a:gridCol w="2785403">
                   <a:extLst>
                     <a:ext uri="{9D8B030D-6E8A-4147-A177-3AD203B41FA5}">
-                      <a16:colId xmlns:a16="http://schemas.microsoft.com/office/drawing/2014/main" xmlns="" val="2977297550"/>
+                      <a16:colId xmlns:a16="http://schemas.microsoft.com/office/drawing/2014/main" val="2977297550"/>
                     </a:ext>
                   </a:extLst>
                 </a:gridCol>
                 <a:gridCol w="3010486">
                   <a:extLst>
                     <a:ext uri="{9D8B030D-6E8A-4147-A177-3AD203B41FA5}">
-                      <a16:colId xmlns:a16="http://schemas.microsoft.com/office/drawing/2014/main" xmlns="" val="1906464382"/>
+                      <a16:colId xmlns:a16="http://schemas.microsoft.com/office/drawing/2014/main" val="1906464382"/>
                     </a:ext>
                   </a:extLst>
                 </a:gridCol>
                 <a:gridCol w="4557268">
                   <a:extLst>
                     <a:ext uri="{9D8B030D-6E8A-4147-A177-3AD203B41FA5}">
-                      <a16:colId xmlns:a16="http://schemas.microsoft.com/office/drawing/2014/main" xmlns="" val="565535634"/>
+                      <a16:colId xmlns:a16="http://schemas.microsoft.com/office/drawing/2014/main" val="565535634"/>
                     </a:ext>
                   </a:extLst>
                 </a:gridCol>
@@ -7636,7 +7644,7 @@
                     <a:lstStyle/>
                     <a:p>
                       <a:r>
-                        <a:rPr lang="en-GB" b="0" dirty="0" smtClean="0"/>
+                        <a:rPr lang="en-GB" b="0" dirty="0"/>
                         <a:t>Interpreted</a:t>
                       </a:r>
                       <a:endParaRPr lang="en-MT" b="0" dirty="0"/>
@@ -7646,7 +7654,7 @@
                 </a:tc>
                 <a:extLst>
                   <a:ext uri="{0D108BD9-81ED-4DB2-BD59-A6C34878D82A}">
-                    <a16:rowId xmlns:a16="http://schemas.microsoft.com/office/drawing/2014/main" xmlns="" val="3447666898"/>
+                    <a16:rowId xmlns:a16="http://schemas.microsoft.com/office/drawing/2014/main" val="3447666898"/>
                   </a:ext>
                 </a:extLst>
               </a:tr>
@@ -7686,15 +7694,15 @@
                         <a:buChar char="•"/>
                       </a:pPr>
                       <a:r>
-                        <a:rPr lang="en-GB" baseline="0" dirty="0" smtClean="0"/>
+                        <a:rPr lang="en-GB" baseline="0" dirty="0"/>
                         <a:t>Development of Content Management Systems such as </a:t>
                       </a:r>
                       <a:r>
-                        <a:rPr lang="en-GB" baseline="0" dirty="0" err="1" smtClean="0"/>
+                        <a:rPr lang="en-GB" baseline="0" dirty="0" err="1"/>
                         <a:t>WordPress</a:t>
                       </a:r>
                       <a:r>
-                        <a:rPr lang="en-GB" baseline="0" dirty="0" smtClean="0"/>
+                        <a:rPr lang="en-GB" baseline="0" dirty="0"/>
                         <a:t>.</a:t>
                       </a:r>
                     </a:p>
@@ -7704,15 +7712,15 @@
                         <a:buChar char="•"/>
                       </a:pPr>
                       <a:r>
-                        <a:rPr lang="en-GB" baseline="0" dirty="0" smtClean="0"/>
+                        <a:rPr lang="en-GB" baseline="0" dirty="0"/>
                         <a:t>Interacting with forms (sending data via email automatically), as well as databases via </a:t>
                       </a:r>
                       <a:r>
-                        <a:rPr lang="en-GB" baseline="0" dirty="0" err="1" smtClean="0"/>
+                        <a:rPr lang="en-GB" baseline="0" dirty="0" err="1"/>
                         <a:t>MySQL</a:t>
                       </a:r>
                       <a:r>
-                        <a:rPr lang="en-GB" baseline="0" dirty="0" smtClean="0"/>
+                        <a:rPr lang="en-GB" baseline="0" dirty="0"/>
                         <a:t> and the native file system.</a:t>
                       </a:r>
                     </a:p>
@@ -7722,7 +7730,7 @@
                         <a:buChar char="•"/>
                       </a:pPr>
                       <a:r>
-                        <a:rPr lang="en-GB" baseline="0" dirty="0" smtClean="0"/>
+                        <a:rPr lang="en-GB" baseline="0" dirty="0"/>
                         <a:t>Accessing cookie variables and setting cookies programmatically.</a:t>
                       </a:r>
                     </a:p>
@@ -7732,7 +7740,7 @@
                         <a:buChar char="•"/>
                       </a:pPr>
                       <a:r>
-                        <a:rPr lang="en-GB" baseline="0" dirty="0" smtClean="0"/>
+                        <a:rPr lang="en-GB" baseline="0" dirty="0"/>
                         <a:t>Handling user authentication.</a:t>
                       </a:r>
                     </a:p>
@@ -7741,7 +7749,7 @@
                 </a:tc>
                 <a:extLst>
                   <a:ext uri="{0D108BD9-81ED-4DB2-BD59-A6C34878D82A}">
-                    <a16:rowId xmlns:a16="http://schemas.microsoft.com/office/drawing/2014/main" xmlns="" val="221003645"/>
+                    <a16:rowId xmlns:a16="http://schemas.microsoft.com/office/drawing/2014/main" val="221003645"/>
                   </a:ext>
                 </a:extLst>
               </a:tr>
@@ -7777,7 +7785,7 @@
                     <a:lstStyle/>
                     <a:p>
                       <a:r>
-                        <a:rPr lang="en-US" sz="1800" b="0" i="0" kern="1200" dirty="0" err="1" smtClean="0">
+                        <a:rPr lang="en-US" sz="1800" b="0" i="0" kern="1200" dirty="0" err="1">
                           <a:solidFill>
                             <a:schemeClr val="dk1"/>
                           </a:solidFill>
@@ -7788,7 +7796,7 @@
                         <a:t>Rasmus</a:t>
                       </a:r>
                       <a:r>
-                        <a:rPr lang="en-US" sz="1800" b="0" i="0" kern="1200" dirty="0" smtClean="0">
+                        <a:rPr lang="en-US" sz="1800" b="0" i="0" kern="1200" dirty="0">
                           <a:solidFill>
                             <a:schemeClr val="dk1"/>
                           </a:solidFill>
@@ -7799,7 +7807,7 @@
                         <a:t> </a:t>
                       </a:r>
                       <a:r>
-                        <a:rPr lang="en-US" sz="1800" b="0" i="0" kern="1200" dirty="0" err="1" smtClean="0">
+                        <a:rPr lang="en-US" sz="1800" b="0" i="0" kern="1200" dirty="0" err="1">
                           <a:solidFill>
                             <a:schemeClr val="dk1"/>
                           </a:solidFill>
@@ -7816,7 +7824,7 @@
                 </a:tc>
                 <a:extLst>
                   <a:ext uri="{0D108BD9-81ED-4DB2-BD59-A6C34878D82A}">
-                    <a16:rowId xmlns:a16="http://schemas.microsoft.com/office/drawing/2014/main" xmlns="" val="792754675"/>
+                    <a16:rowId xmlns:a16="http://schemas.microsoft.com/office/drawing/2014/main" val="792754675"/>
                   </a:ext>
                 </a:extLst>
               </a:tr>
@@ -7852,13 +7860,13 @@
                     <a:lstStyle/>
                     <a:p>
                       <a:r>
-                        <a:rPr lang="en-GB" baseline="0" dirty="0" smtClean="0"/>
+                        <a:rPr lang="en-GB" baseline="0" dirty="0"/>
                         <a:t>1995</a:t>
                       </a:r>
                     </a:p>
                     <a:p>
                       <a:r>
-                        <a:rPr lang="en-GB" sz="1600" baseline="0" dirty="0" smtClean="0"/>
+                        <a:rPr lang="en-GB" sz="1600" baseline="0" dirty="0"/>
                         <a:t>(development first started in 1994)</a:t>
                       </a:r>
                       <a:endParaRPr lang="en-MT" dirty="0"/>
@@ -7868,7 +7876,7 @@
                 </a:tc>
                 <a:extLst>
                   <a:ext uri="{0D108BD9-81ED-4DB2-BD59-A6C34878D82A}">
-                    <a16:rowId xmlns:a16="http://schemas.microsoft.com/office/drawing/2014/main" xmlns="" val="3790524959"/>
+                    <a16:rowId xmlns:a16="http://schemas.microsoft.com/office/drawing/2014/main" val="3790524959"/>
                   </a:ext>
                 </a:extLst>
               </a:tr>
@@ -7905,7 +7913,7 @@
     </p:spTree>
     <p:extLst>
       <p:ext uri="{BB962C8B-B14F-4D97-AF65-F5344CB8AC3E}">
-        <p14:creationId xmlns:p14="http://schemas.microsoft.com/office/powerpoint/2010/main" xmlns="" val="3120296696"/>
+        <p14:creationId xmlns:p14="http://schemas.microsoft.com/office/powerpoint/2010/main" val="3120296696"/>
       </p:ext>
     </p:extLst>
   </p:cSld>
@@ -7947,6 +7955,27 @@
           <a:bodyPr/>
           <a:lstStyle/>
           <a:p>
+            <a:r>
+              <a:rPr lang="en-US">
+                <a:ln>
+                  <a:solidFill>
+                    <a:prstClr val="black">
+                      <a:lumMod val="75000"/>
+                      <a:lumOff val="25000"/>
+                      <a:alpha val="10000"/>
+                    </a:prstClr>
+                  </a:solidFill>
+                </a:ln>
+                <a:effectLst>
+                  <a:outerShdw blurRad="9525" dist="25400" dir="14640000" algn="tl" rotWithShape="0">
+                    <a:prstClr val="black">
+                      <a:alpha val="30000"/>
+                    </a:prstClr>
+                  </a:outerShdw>
+                </a:effectLst>
+              </a:rPr>
+              <a:t>Getting started</a:t>
+            </a:r>
             <a:endParaRPr lang="en-US"/>
           </a:p>
         </p:txBody>
@@ -7966,11 +7995,352 @@
           <a:bodyPr/>
           <a:lstStyle/>
           <a:p>
-            <a:endParaRPr lang="en-US" dirty="0"/>
+            <a:pPr marL="37465" indent="0" algn="just">
+              <a:buNone/>
+            </a:pPr>
+            <a:r>
+              <a:rPr lang="en-US" dirty="0">
+                <a:ln>
+                  <a:solidFill>
+                    <a:prstClr val="black">
+                      <a:lumMod val="75000"/>
+                      <a:lumOff val="25000"/>
+                      <a:alpha val="10000"/>
+                    </a:prstClr>
+                  </a:solidFill>
+                </a:ln>
+                <a:effectLst>
+                  <a:outerShdw blurRad="9525" dist="25400" dir="14640000" algn="tl" rotWithShape="0">
+                    <a:prstClr val="black">
+                      <a:alpha val="30000"/>
+                    </a:prstClr>
+                  </a:outerShdw>
+                </a:effectLst>
+              </a:rPr>
+              <a:t>Please launch your preferred text editor (such as Brackets, Atom or Visual Studio Code). From my end, I will be henceforth using Visual Studio Code. To see how to </a:t>
+            </a:r>
+            <a:r>
+              <a:rPr lang="en-US">
+                <a:ln>
+                  <a:solidFill>
+                    <a:prstClr val="black">
+                      <a:lumMod val="75000"/>
+                      <a:lumOff val="25000"/>
+                      <a:alpha val="10000"/>
+                    </a:prstClr>
+                  </a:solidFill>
+                </a:ln>
+                <a:effectLst>
+                  <a:outerShdw blurRad="9525" dist="25400" dir="14640000" algn="tl" rotWithShape="0">
+                    <a:prstClr val="black">
+                      <a:alpha val="30000"/>
+                    </a:prstClr>
+                  </a:outerShdw>
+                </a:effectLst>
+              </a:rPr>
+              <a:t>install a text editor, please refer to the previous session. You need not run the text editor with administrator privileges.</a:t>
+            </a:r>
+            <a:endParaRPr lang="en-US"/>
+          </a:p>
+          <a:p>
+            <a:pPr marL="37465" indent="0" algn="just">
+              <a:buNone/>
+            </a:pPr>
+            <a:r>
+              <a:rPr lang="en-US">
+                <a:ln>
+                  <a:solidFill>
+                    <a:prstClr val="black">
+                      <a:lumMod val="75000"/>
+                      <a:lumOff val="25000"/>
+                      <a:alpha val="10000"/>
+                    </a:prstClr>
+                  </a:solidFill>
+                </a:ln>
+                <a:effectLst>
+                  <a:outerShdw blurRad="9525" dist="25400" dir="14640000" algn="tl" rotWithShape="0">
+                    <a:prstClr val="black">
+                      <a:alpha val="30000"/>
+                    </a:prstClr>
+                  </a:outerShdw>
+                </a:effectLst>
+              </a:rPr>
+              <a:t>Support for Brackets is phasing out; thus support (software updates and new </a:t>
+            </a:r>
+            <a:r>
+              <a:rPr lang="en-US" dirty="0">
+                <a:ln>
+                  <a:solidFill>
+                    <a:prstClr val="black">
+                      <a:lumMod val="75000"/>
+                      <a:lumOff val="25000"/>
+                      <a:alpha val="10000"/>
+                    </a:prstClr>
+                  </a:solidFill>
+                </a:ln>
+                <a:effectLst>
+                  <a:outerShdw blurRad="9525" dist="25400" dir="14640000" algn="tl" rotWithShape="0">
+                    <a:prstClr val="black">
+                      <a:alpha val="30000"/>
+                    </a:prstClr>
+                  </a:outerShdw>
+                </a:effectLst>
+              </a:rPr>
+              <a:t>features) will no longer be available after 1st September 2021. I thus recommend you switch to Visual Studio Code or Atom. I prefer Visual Studio Code to the latter as extensions such as autosave and Emmet (speeding up the workflow pertaining to HTML and CSS) are built-in. We only needed to set up Live Server.</a:t>
+            </a:r>
           </a:p>
         </p:txBody>
       </p:sp>
     </p:spTree>
+  </p:cSld>
+  <p:clrMapOvr>
+    <a:masterClrMapping/>
+  </p:clrMapOvr>
+</p:sld>
+</file>
+
+<file path=ppt/slides/slide15.xml><?xml version="1.0" encoding="utf-8"?>
+<p:sld xmlns:a="http://schemas.openxmlformats.org/drawingml/2006/main" xmlns:r="http://schemas.openxmlformats.org/officeDocument/2006/relationships" xmlns:p="http://schemas.openxmlformats.org/presentationml/2006/main">
+  <p:cSld>
+    <p:spTree>
+      <p:nvGrpSpPr>
+        <p:cNvPr id="1" name=""/>
+        <p:cNvGrpSpPr/>
+        <p:nvPr/>
+      </p:nvGrpSpPr>
+      <p:grpSpPr>
+        <a:xfrm>
+          <a:off x="0" y="0"/>
+          <a:ext cx="0" cy="0"/>
+          <a:chOff x="0" y="0"/>
+          <a:chExt cx="0" cy="0"/>
+        </a:xfrm>
+      </p:grpSpPr>
+      <p:sp>
+        <p:nvSpPr>
+          <p:cNvPr id="2" name="Title 1">
+            <a:extLst>
+              <a:ext uri="{FF2B5EF4-FFF2-40B4-BE49-F238E27FC236}">
+                <a16:creationId xmlns:a16="http://schemas.microsoft.com/office/drawing/2014/main" id="{7081C03D-FEC3-4D57-9054-E7BC36CB4204}"/>
+              </a:ext>
+            </a:extLst>
+          </p:cNvPr>
+          <p:cNvSpPr>
+            <a:spLocks noGrp="1"/>
+          </p:cNvSpPr>
+          <p:nvPr>
+            <p:ph type="title"/>
+          </p:nvPr>
+        </p:nvSpPr>
+        <p:spPr/>
+        <p:txBody>
+          <a:bodyPr/>
+          <a:lstStyle/>
+          <a:p>
+            <a:r>
+              <a:rPr lang="en-US">
+                <a:ln>
+                  <a:solidFill>
+                    <a:prstClr val="black">
+                      <a:lumMod val="75000"/>
+                      <a:lumOff val="25000"/>
+                      <a:alpha val="10000"/>
+                    </a:prstClr>
+                  </a:solidFill>
+                </a:ln>
+                <a:effectLst>
+                  <a:outerShdw blurRad="9525" dist="25400" dir="14640000" algn="tl" rotWithShape="0">
+                    <a:prstClr val="black">
+                      <a:alpha val="30000"/>
+                    </a:prstClr>
+                  </a:outerShdw>
+                </a:effectLst>
+              </a:rPr>
+              <a:t>Creating our first HTML project</a:t>
+            </a:r>
+            <a:endParaRPr lang="en-US"/>
+          </a:p>
+        </p:txBody>
+      </p:sp>
+      <p:pic>
+        <p:nvPicPr>
+          <p:cNvPr id="5" name="Picture 5">
+            <a:extLst>
+              <a:ext uri="{FF2B5EF4-FFF2-40B4-BE49-F238E27FC236}">
+                <a16:creationId xmlns:a16="http://schemas.microsoft.com/office/drawing/2014/main" id="{4A066C1F-EB84-4031-93B8-80F7352F8B26}"/>
+              </a:ext>
+            </a:extLst>
+          </p:cNvPr>
+          <p:cNvPicPr>
+            <a:picLocks noGrp="1" noChangeAspect="1"/>
+          </p:cNvPicPr>
+          <p:nvPr>
+            <p:ph sz="half" idx="1"/>
+          </p:nvPr>
+        </p:nvPicPr>
+        <p:blipFill rotWithShape="1">
+          <a:blip r:embed="rId2"/>
+          <a:srcRect b="1276"/>
+          <a:stretch/>
+        </p:blipFill>
+        <p:spPr>
+          <a:xfrm>
+            <a:off x="913795" y="2077309"/>
+            <a:ext cx="5753311" cy="3094261"/>
+          </a:xfrm>
+        </p:spPr>
+      </p:pic>
+      <p:sp>
+        <p:nvSpPr>
+          <p:cNvPr id="4" name="Content Placeholder 3">
+            <a:extLst>
+              <a:ext uri="{FF2B5EF4-FFF2-40B4-BE49-F238E27FC236}">
+                <a16:creationId xmlns:a16="http://schemas.microsoft.com/office/drawing/2014/main" id="{82CB7478-9FFE-4E3D-BD5D-3B4B8F0BA986}"/>
+              </a:ext>
+            </a:extLst>
+          </p:cNvPr>
+          <p:cNvSpPr>
+            <a:spLocks noGrp="1"/>
+          </p:cNvSpPr>
+          <p:nvPr>
+            <p:ph sz="half" idx="2"/>
+          </p:nvPr>
+        </p:nvSpPr>
+        <p:spPr>
+          <a:xfrm>
+            <a:off x="6858951" y="2076451"/>
+            <a:ext cx="4397401" cy="3095997"/>
+          </a:xfrm>
+        </p:spPr>
+        <p:txBody>
+          <a:bodyPr>
+            <a:normAutofit fontScale="85000" lnSpcReduction="10000"/>
+          </a:bodyPr>
+          <a:lstStyle/>
+          <a:p>
+            <a:pPr marL="37465" indent="0" algn="just">
+              <a:buNone/>
+            </a:pPr>
+            <a:r>
+              <a:rPr lang="en-US" dirty="0">
+                <a:ln>
+                  <a:solidFill>
+                    <a:prstClr val="black">
+                      <a:lumMod val="75000"/>
+                      <a:lumOff val="25000"/>
+                      <a:alpha val="10000"/>
+                    </a:prstClr>
+                  </a:solidFill>
+                </a:ln>
+                <a:effectLst>
+                  <a:outerShdw blurRad="9525" dist="25400" dir="14640000" algn="tl" rotWithShape="0">
+                    <a:prstClr val="black">
+                      <a:alpha val="30000"/>
+                    </a:prstClr>
+                  </a:outerShdw>
+                </a:effectLst>
+              </a:rPr>
+              <a:t>Expand the first button from the sidebar, then press Open Folder. Alternatively, you may select File from the menu strip, then press Open Folder. You may also use the following key combination: Ctrl+K Ctrl+O (Press Ctrl together with the </a:t>
+            </a:r>
+            <a:r>
+              <a:rPr lang="en-US">
+                <a:ln>
+                  <a:solidFill>
+                    <a:prstClr val="black">
+                      <a:lumMod val="75000"/>
+                      <a:lumOff val="25000"/>
+                      <a:alpha val="10000"/>
+                    </a:prstClr>
+                  </a:solidFill>
+                </a:ln>
+                <a:effectLst>
+                  <a:outerShdw blurRad="9525" dist="25400" dir="14640000" algn="tl" rotWithShape="0">
+                    <a:prstClr val="black">
+                      <a:alpha val="30000"/>
+                    </a:prstClr>
+                  </a:outerShdw>
+                </a:effectLst>
+              </a:rPr>
+              <a:t>K and O simultaneously).</a:t>
+            </a:r>
+            <a:endParaRPr lang="en-US"/>
+          </a:p>
+          <a:p>
+            <a:pPr marL="37465" indent="0" algn="just">
+              <a:buNone/>
+            </a:pPr>
+            <a:r>
+              <a:rPr lang="en-US" sz="1600" dirty="0">
+                <a:ln>
+                  <a:solidFill>
+                    <a:prstClr val="black">
+                      <a:lumMod val="75000"/>
+                      <a:lumOff val="25000"/>
+                      <a:alpha val="10000"/>
+                    </a:prstClr>
+                  </a:solidFill>
+                </a:ln>
+                <a:effectLst>
+                  <a:outerShdw blurRad="9525" dist="25400" dir="14640000" algn="tl" rotWithShape="0">
+                    <a:prstClr val="black">
+                      <a:alpha val="30000"/>
+                    </a:prstClr>
+                  </a:outerShdw>
+                </a:effectLst>
+              </a:rPr>
+              <a:t>If you disabled the option to show the Welcome page on startup, then your layout of Visual Studio Code will look like the screenshot on the </a:t>
+            </a:r>
+            <a:r>
+              <a:rPr lang="en-US" sz="1600">
+                <a:ln>
+                  <a:solidFill>
+                    <a:prstClr val="black">
+                      <a:lumMod val="75000"/>
+                      <a:lumOff val="25000"/>
+                      <a:alpha val="10000"/>
+                    </a:prstClr>
+                  </a:solidFill>
+                </a:ln>
+                <a:effectLst>
+                  <a:outerShdw blurRad="9525" dist="25400" dir="14640000" algn="tl" rotWithShape="0">
+                    <a:prstClr val="black">
+                      <a:alpha val="30000"/>
+                    </a:prstClr>
+                  </a:outerShdw>
+                </a:effectLst>
+              </a:rPr>
+              <a:t>left-hand</a:t>
+            </a:r>
+            <a:r>
+              <a:rPr lang="en-US" sz="1600" dirty="0">
+                <a:ln>
+                  <a:solidFill>
+                    <a:prstClr val="black">
+                      <a:lumMod val="75000"/>
+                      <a:lumOff val="25000"/>
+                      <a:alpha val="10000"/>
+                    </a:prstClr>
+                  </a:solidFill>
+                </a:ln>
+                <a:effectLst>
+                  <a:outerShdw blurRad="9525" dist="25400" dir="14640000" algn="tl" rotWithShape="0">
+                    <a:prstClr val="black">
+                      <a:alpha val="30000"/>
+                    </a:prstClr>
+                  </a:outerShdw>
+                </a:effectLst>
+              </a:rPr>
+              <a:t> side.</a:t>
+            </a:r>
+          </a:p>
+        </p:txBody>
+      </p:sp>
+    </p:spTree>
+    <p:extLst>
+      <p:ext uri="{BB962C8B-B14F-4D97-AF65-F5344CB8AC3E}">
+        <p14:creationId xmlns:p14="http://schemas.microsoft.com/office/powerpoint/2010/main" val="1053671365"/>
+      </p:ext>
+    </p:extLst>
   </p:cSld>
   <p:clrMapOvr>
     <a:masterClrMapping/>
@@ -8023,7 +8393,7 @@
           <p:cNvPr id="2" name="Title 1">
             <a:extLst>
               <a:ext uri="{FF2B5EF4-FFF2-40B4-BE49-F238E27FC236}">
-                <a16:creationId xmlns:a16="http://schemas.microsoft.com/office/drawing/2014/main" xmlns="" id="{9D6A748D-BEEC-43A4-BFF3-B31C0275A5D9}"/>
+                <a16:creationId xmlns:a16="http://schemas.microsoft.com/office/drawing/2014/main" id="{9D6A748D-BEEC-43A4-BFF3-B31C0275A5D9}"/>
               </a:ext>
             </a:extLst>
           </p:cNvPr>
@@ -8058,7 +8428,7 @@
           <p:cNvPr id="1028" name="Picture 4" descr="See the source image">
             <a:extLst>
               <a:ext uri="{FF2B5EF4-FFF2-40B4-BE49-F238E27FC236}">
-                <a16:creationId xmlns:a16="http://schemas.microsoft.com/office/drawing/2014/main" xmlns="" id="{AAAD645A-4FF5-4E7B-9DAF-C5C3BD71A431}"/>
+                <a16:creationId xmlns:a16="http://schemas.microsoft.com/office/drawing/2014/main" id="{AAAD645A-4FF5-4E7B-9DAF-C5C3BD71A431}"/>
               </a:ext>
             </a:extLst>
           </p:cNvPr>
@@ -8071,7 +8441,7 @@
           <a:blip r:embed="rId3">
             <a:extLst>
               <a:ext uri="{28A0092B-C50C-407E-A947-70E740481C1C}">
-                <a14:useLocalDpi xmlns:a14="http://schemas.microsoft.com/office/drawing/2010/main" xmlns="" val="0"/>
+                <a14:useLocalDpi xmlns:a14="http://schemas.microsoft.com/office/drawing/2010/main" val="0"/>
               </a:ext>
             </a:extLst>
           </a:blip>
@@ -8103,7 +8473,7 @@
     </p:spTree>
     <p:extLst>
       <p:ext uri="{BB962C8B-B14F-4D97-AF65-F5344CB8AC3E}">
-        <p14:creationId xmlns:p14="http://schemas.microsoft.com/office/powerpoint/2010/main" xmlns="" val="2689089790"/>
+        <p14:creationId xmlns:p14="http://schemas.microsoft.com/office/powerpoint/2010/main" val="2689089790"/>
       </p:ext>
     </p:extLst>
   </p:cSld>
@@ -8135,7 +8505,7 @@
           <p:cNvPr id="2" name="Title 1">
             <a:extLst>
               <a:ext uri="{FF2B5EF4-FFF2-40B4-BE49-F238E27FC236}">
-                <a16:creationId xmlns:a16="http://schemas.microsoft.com/office/drawing/2014/main" xmlns="" id="{42311324-F288-40E8-9538-6F18604F7721}"/>
+                <a16:creationId xmlns:a16="http://schemas.microsoft.com/office/drawing/2014/main" id="{42311324-F288-40E8-9538-6F18604F7721}"/>
               </a:ext>
             </a:extLst>
           </p:cNvPr>
@@ -8152,7 +8522,7 @@
           <a:lstStyle/>
           <a:p>
             <a:r>
-              <a:rPr lang="en-US" dirty="0" smtClean="0"/>
+              <a:rPr lang="en-US" dirty="0"/>
               <a:t>HTML</a:t>
             </a:r>
             <a:endParaRPr lang="en-MT" dirty="0"/>
@@ -8164,7 +8534,7 @@
           <p:cNvPr id="3" name="Content Placeholder 2">
             <a:extLst>
               <a:ext uri="{FF2B5EF4-FFF2-40B4-BE49-F238E27FC236}">
-                <a16:creationId xmlns:a16="http://schemas.microsoft.com/office/drawing/2014/main" xmlns="" id="{8327F3BE-2C78-46C3-AB0A-2494636B74A4}"/>
+                <a16:creationId xmlns:a16="http://schemas.microsoft.com/office/drawing/2014/main" id="{8327F3BE-2C78-46C3-AB0A-2494636B74A4}"/>
               </a:ext>
             </a:extLst>
           </p:cNvPr>
@@ -8181,7 +8551,7 @@
           <a:lstStyle/>
           <a:p>
             <a:r>
-              <a:rPr lang="en-US" dirty="0" smtClean="0">
+              <a:rPr lang="en-US" dirty="0">
                 <a:effectLst>
                   <a:outerShdw blurRad="38100" dist="38100" dir="2700000" algn="tl">
                     <a:srgbClr val="000000">
@@ -8194,7 +8564,7 @@
               <a:t>HTML</a:t>
             </a:r>
             <a:r>
-              <a:rPr lang="en-US" dirty="0" smtClean="0">
+              <a:rPr lang="en-US" dirty="0">
                 <a:effectLst>
                   <a:outerShdw blurRad="38100" dist="38100" dir="2700000" algn="tl">
                     <a:srgbClr val="000000">
@@ -8206,7 +8576,7 @@
               <a:t>, short for </a:t>
             </a:r>
             <a:r>
-              <a:rPr lang="en-US" b="1" dirty="0" err="1" smtClean="0">
+              <a:rPr lang="en-US" b="1" dirty="0" err="1">
                 <a:effectLst>
                   <a:outerShdw blurRad="38100" dist="38100" dir="2700000" algn="tl">
                     <a:srgbClr val="000000">
@@ -8218,7 +8588,7 @@
               <a:t>H</a:t>
             </a:r>
             <a:r>
-              <a:rPr lang="en-US" dirty="0" err="1" smtClean="0">
+              <a:rPr lang="en-US" dirty="0" err="1">
                 <a:effectLst>
                   <a:outerShdw blurRad="38100" dist="38100" dir="2700000" algn="tl">
                     <a:srgbClr val="000000">
@@ -8230,7 +8600,7 @@
               <a:t>yper</a:t>
             </a:r>
             <a:r>
-              <a:rPr lang="en-US" b="1" dirty="0" err="1" smtClean="0">
+              <a:rPr lang="en-US" b="1" dirty="0" err="1">
                 <a:effectLst>
                   <a:outerShdw blurRad="38100" dist="38100" dir="2700000" algn="tl">
                     <a:srgbClr val="000000">
@@ -8242,7 +8612,7 @@
               <a:t>T</a:t>
             </a:r>
             <a:r>
-              <a:rPr lang="en-US" dirty="0" err="1" smtClean="0">
+              <a:rPr lang="en-US" dirty="0" err="1">
                 <a:effectLst>
                   <a:outerShdw blurRad="38100" dist="38100" dir="2700000" algn="tl">
                     <a:srgbClr val="000000">
@@ -8254,7 +8624,7 @@
               <a:t>ext</a:t>
             </a:r>
             <a:r>
-              <a:rPr lang="en-US" dirty="0" smtClean="0">
+              <a:rPr lang="en-US" dirty="0">
                 <a:effectLst>
                   <a:outerShdw blurRad="38100" dist="38100" dir="2700000" algn="tl">
                     <a:srgbClr val="000000">
@@ -8266,7 +8636,7 @@
               <a:t> </a:t>
             </a:r>
             <a:r>
-              <a:rPr lang="en-US" b="1" dirty="0" smtClean="0">
+              <a:rPr lang="en-US" b="1" dirty="0">
                 <a:effectLst>
                   <a:outerShdw blurRad="38100" dist="38100" dir="2700000" algn="tl">
                     <a:srgbClr val="000000">
@@ -8278,7 +8648,7 @@
               <a:t>M</a:t>
             </a:r>
             <a:r>
-              <a:rPr lang="en-US" dirty="0" smtClean="0">
+              <a:rPr lang="en-US" dirty="0">
                 <a:effectLst>
                   <a:outerShdw blurRad="38100" dist="38100" dir="2700000" algn="tl">
                     <a:srgbClr val="000000">
@@ -8290,7 +8660,7 @@
               <a:t>arkup </a:t>
             </a:r>
             <a:r>
-              <a:rPr lang="en-US" b="1" dirty="0" smtClean="0">
+              <a:rPr lang="en-US" b="1" dirty="0">
                 <a:effectLst>
                   <a:outerShdw blurRad="38100" dist="38100" dir="2700000" algn="tl">
                     <a:srgbClr val="000000">
@@ -8302,7 +8672,7 @@
               <a:t>L</a:t>
             </a:r>
             <a:r>
-              <a:rPr lang="en-US" dirty="0" smtClean="0">
+              <a:rPr lang="en-US" dirty="0">
                 <a:effectLst>
                   <a:outerShdw blurRad="38100" dist="38100" dir="2700000" algn="tl">
                     <a:srgbClr val="000000">
@@ -8316,7 +8686,7 @@
           </a:p>
           <a:p>
             <a:r>
-              <a:rPr lang="en-US" dirty="0" smtClean="0">
+              <a:rPr lang="en-US" dirty="0">
                 <a:effectLst>
                   <a:outerShdw blurRad="38100" dist="38100" dir="2700000" algn="tl">
                     <a:srgbClr val="000000">
@@ -8330,7 +8700,7 @@
           </a:p>
           <a:p>
             <a:r>
-              <a:rPr lang="en-US" dirty="0" smtClean="0">
+              <a:rPr lang="en-US" dirty="0">
                 <a:effectLst>
                   <a:outerShdw blurRad="38100" dist="38100" dir="2700000" algn="tl">
                     <a:srgbClr val="000000">
@@ -8356,7 +8726,7 @@
     </p:spTree>
     <p:extLst>
       <p:ext uri="{BB962C8B-B14F-4D97-AF65-F5344CB8AC3E}">
-        <p14:creationId xmlns:p14="http://schemas.microsoft.com/office/powerpoint/2010/main" xmlns="" val="1752723345"/>
+        <p14:creationId xmlns:p14="http://schemas.microsoft.com/office/powerpoint/2010/main" val="1752723345"/>
       </p:ext>
     </p:extLst>
   </p:cSld>
@@ -8401,10 +8771,9 @@
           <a:lstStyle/>
           <a:p>
             <a:r>
-              <a:rPr lang="en-US" dirty="0" smtClean="0"/>
+              <a:rPr lang="en-US" dirty="0"/>
               <a:t>What is the World Wide Web/WWW/W3?</a:t>
             </a:r>
-            <a:endParaRPr lang="en-US" dirty="0"/>
           </a:p>
         </p:txBody>
       </p:sp>
@@ -8431,101 +8800,89 @@
           <a:lstStyle/>
           <a:p>
             <a:r>
-              <a:rPr lang="en-US" sz="1600" dirty="0" smtClean="0"/>
+              <a:rPr lang="en-US" sz="1600" dirty="0"/>
               <a:t>WWW refers to an information system in which documents and web resources are identified by a Uniform Resource Locator (better known as a URL such as </a:t>
             </a:r>
             <a:r>
-              <a:rPr lang="en-US" sz="1600" dirty="0" smtClean="0">
+              <a:rPr lang="en-US" sz="1600" dirty="0">
                 <a:hlinkClick r:id="rId2"/>
               </a:rPr>
-              <a:t>https</a:t>
-            </a:r>
-            <a:r>
-              <a:rPr lang="en-US" sz="1600" dirty="0" smtClean="0">
-                <a:hlinkClick r:id="rId2"/>
-              </a:rPr>
-              <a:t>://www.bing.com</a:t>
-            </a:r>
-            <a:r>
-              <a:rPr lang="en-US" sz="1600" dirty="0" smtClean="0">
-                <a:hlinkClick r:id="rId2"/>
-              </a:rPr>
-              <a:t>/</a:t>
-            </a:r>
-            <a:r>
-              <a:rPr lang="en-US" sz="1600" dirty="0" smtClean="0"/>
+              <a:t>https://www.bing.com/</a:t>
+            </a:r>
+            <a:r>
+              <a:rPr lang="en-US" sz="1600" dirty="0"/>
               <a:t>)</a:t>
             </a:r>
           </a:p>
           <a:p>
             <a:r>
-              <a:rPr lang="en-US" sz="1600" dirty="0" smtClean="0"/>
+              <a:rPr lang="en-US" sz="1600" dirty="0"/>
               <a:t>Web resources are subsequently transferred via HTTP (</a:t>
             </a:r>
             <a:r>
-              <a:rPr lang="en-US" sz="1600" b="1" dirty="0" err="1" smtClean="0"/>
+              <a:rPr lang="en-US" sz="1600" b="1" dirty="0" err="1"/>
               <a:t>H</a:t>
             </a:r>
             <a:r>
-              <a:rPr lang="en-US" sz="1600" dirty="0" err="1" smtClean="0"/>
+              <a:rPr lang="en-US" sz="1600" dirty="0" err="1"/>
               <a:t>yper</a:t>
             </a:r>
             <a:r>
-              <a:rPr lang="en-US" sz="1600" b="1" dirty="0" err="1" smtClean="0"/>
+              <a:rPr lang="en-US" sz="1600" b="1" dirty="0" err="1"/>
               <a:t>T</a:t>
             </a:r>
             <a:r>
-              <a:rPr lang="en-US" sz="1600" dirty="0" err="1" smtClean="0"/>
+              <a:rPr lang="en-US" sz="1600" dirty="0" err="1"/>
               <a:t>ext</a:t>
             </a:r>
             <a:r>
-              <a:rPr lang="en-US" sz="1600" dirty="0" smtClean="0"/>
+              <a:rPr lang="en-US" sz="1600" dirty="0"/>
               <a:t> </a:t>
             </a:r>
             <a:r>
-              <a:rPr lang="en-US" sz="1600" b="1" dirty="0" smtClean="0"/>
+              <a:rPr lang="en-US" sz="1600" b="1" dirty="0"/>
               <a:t>T</a:t>
             </a:r>
             <a:r>
-              <a:rPr lang="en-US" sz="1600" dirty="0" smtClean="0"/>
+              <a:rPr lang="en-US" sz="1600" dirty="0"/>
               <a:t>ransfer </a:t>
             </a:r>
             <a:r>
-              <a:rPr lang="en-US" sz="1600" b="1" dirty="0" smtClean="0"/>
+              <a:rPr lang="en-US" sz="1600" b="1" dirty="0"/>
               <a:t>P</a:t>
             </a:r>
             <a:r>
-              <a:rPr lang="en-US" sz="1600" dirty="0" smtClean="0"/>
+              <a:rPr lang="en-US" sz="1600" dirty="0"/>
               <a:t>rotocol) and can then be accessed via a web browser. Said resources are first published by a software known as web server.</a:t>
             </a:r>
           </a:p>
           <a:p>
             <a:r>
-              <a:rPr lang="en-US" sz="1600" dirty="0" smtClean="0"/>
+              <a:rPr lang="en-US" sz="1600" dirty="0"/>
               <a:t>This concept was invented on 12</a:t>
             </a:r>
             <a:r>
-              <a:rPr lang="en-US" sz="1600" baseline="30000" dirty="0" smtClean="0"/>
+              <a:rPr lang="en-US" sz="1600" baseline="30000" dirty="0"/>
               <a:t>th</a:t>
             </a:r>
             <a:r>
-              <a:rPr lang="en-US" sz="1600" dirty="0" smtClean="0"/>
+              <a:rPr lang="en-US" sz="1600" dirty="0"/>
               <a:t> March 1989 and has recently reached its 32</a:t>
             </a:r>
             <a:r>
-              <a:rPr lang="en-US" sz="1600" baseline="30000" dirty="0" smtClean="0"/>
+              <a:rPr lang="en-US" sz="1600" baseline="30000" dirty="0"/>
               <a:t>nd</a:t>
             </a:r>
             <a:r>
-              <a:rPr lang="en-US" sz="1600" dirty="0" smtClean="0"/>
+              <a:rPr lang="en-US" sz="1600" dirty="0"/>
               <a:t> year since its release. Berners-Lee also collaborated with Belgian computer scientist, Robert </a:t>
             </a:r>
             <a:r>
-              <a:rPr lang="en-US" sz="1600" dirty="0" err="1" smtClean="0"/>
+              <a:rPr lang="en-US" sz="1600" dirty="0" err="1"/>
               <a:t>Cailliau</a:t>
             </a:r>
             <a:r>
-              <a:rPr lang="en-US" sz="1600" dirty="0" smtClean="0"/>
+              <a:rPr lang="en-US" sz="1600" dirty="0"/>
               <a:t>.</a:t>
             </a:r>
           </a:p>
@@ -8565,13 +8922,6 @@
   <p:clrMapOvr>
     <a:masterClrMapping/>
   </p:clrMapOvr>
-  <p:timing>
-    <p:tnLst>
-      <p:par>
-        <p:cTn id="1" dur="indefinite" restart="never" nodeType="tmRoot"/>
-      </p:par>
-    </p:tnLst>
-  </p:timing>
 </p:sld>
 </file>
 
@@ -8608,10 +8958,9 @@
           <a:lstStyle/>
           <a:p>
             <a:r>
-              <a:rPr lang="en-US" dirty="0" smtClean="0"/>
+              <a:rPr lang="en-US" dirty="0"/>
               <a:t>When was the first web browser released?</a:t>
             </a:r>
-            <a:endParaRPr lang="en-US" dirty="0"/>
           </a:p>
         </p:txBody>
       </p:sp>
@@ -8631,58 +8980,57 @@
           <a:lstStyle/>
           <a:p>
             <a:r>
-              <a:rPr lang="en-US" dirty="0" smtClean="0"/>
+              <a:rPr lang="en-US" dirty="0"/>
               <a:t>The very first web browser, </a:t>
             </a:r>
             <a:r>
-              <a:rPr lang="en-US" dirty="0" err="1" smtClean="0"/>
+              <a:rPr lang="en-US" dirty="0" err="1"/>
               <a:t>WorldWideWeb</a:t>
             </a:r>
             <a:r>
-              <a:rPr lang="en-US" dirty="0" smtClean="0"/>
+              <a:rPr lang="en-US" dirty="0"/>
               <a:t> although it was subsequently renamed to Nexus to avoid confusion between WWW and the web browser, was released on 25</a:t>
             </a:r>
             <a:r>
-              <a:rPr lang="en-US" baseline="30000" dirty="0" smtClean="0"/>
+              <a:rPr lang="en-US" baseline="30000" dirty="0"/>
               <a:t>th</a:t>
             </a:r>
             <a:r>
-              <a:rPr lang="en-US" dirty="0" smtClean="0"/>
+              <a:rPr lang="en-US" dirty="0"/>
               <a:t> December 1990, after two months of development, by Tim Berners-Lee, whilst working for the European nuclear research entity CERN.</a:t>
             </a:r>
           </a:p>
           <a:p>
             <a:r>
-              <a:rPr lang="en-US" dirty="0" err="1" smtClean="0"/>
+              <a:rPr lang="en-US" dirty="0" err="1"/>
               <a:t>WorldWideWeb</a:t>
             </a:r>
             <a:r>
-              <a:rPr lang="en-US" dirty="0" smtClean="0"/>
+              <a:rPr lang="en-US" dirty="0"/>
               <a:t> was released to the public in August 1991.</a:t>
             </a:r>
           </a:p>
           <a:p>
             <a:r>
-              <a:rPr lang="en-US" dirty="0" smtClean="0"/>
+              <a:rPr lang="en-US" dirty="0"/>
               <a:t>It was discontinued in 1994, a few months after the final release 0.18 on 14</a:t>
             </a:r>
             <a:r>
-              <a:rPr lang="en-US" baseline="30000" dirty="0" smtClean="0"/>
+              <a:rPr lang="en-US" baseline="30000" dirty="0"/>
               <a:t>th</a:t>
             </a:r>
             <a:r>
-              <a:rPr lang="en-US" dirty="0" smtClean="0"/>
+              <a:rPr lang="en-US" dirty="0"/>
               <a:t> January 1994. The source code was publicly released on 30</a:t>
             </a:r>
             <a:r>
-              <a:rPr lang="en-US" baseline="30000" dirty="0" smtClean="0"/>
+              <a:rPr lang="en-US" baseline="30000" dirty="0"/>
               <a:t>th</a:t>
             </a:r>
             <a:r>
-              <a:rPr lang="en-US" dirty="0" smtClean="0"/>
+              <a:rPr lang="en-US" dirty="0"/>
               <a:t> April 1993.</a:t>
             </a:r>
-            <a:endParaRPr lang="en-US" dirty="0"/>
           </a:p>
         </p:txBody>
       </p:sp>
@@ -8727,14 +9075,13 @@
           <a:lstStyle/>
           <a:p>
             <a:r>
-              <a:rPr lang="en-US" dirty="0" err="1" smtClean="0"/>
+              <a:rPr lang="en-US" dirty="0" err="1"/>
               <a:t>WorldWideWeb</a:t>
             </a:r>
             <a:r>
-              <a:rPr lang="en-US" dirty="0" smtClean="0"/>
+              <a:rPr lang="en-US" dirty="0"/>
               <a:t>/Nexus pictured in 1994</a:t>
             </a:r>
-            <a:endParaRPr lang="en-US" dirty="0"/>
           </a:p>
         </p:txBody>
       </p:sp>
@@ -8766,13 +9113,6 @@
   <p:clrMapOvr>
     <a:masterClrMapping/>
   </p:clrMapOvr>
-  <p:timing>
-    <p:tnLst>
-      <p:par>
-        <p:cTn id="1" dur="indefinite" restart="never" nodeType="tmRoot"/>
-      </p:par>
-    </p:tnLst>
-  </p:timing>
 </p:sld>
 </file>
 
@@ -8798,7 +9138,7 @@
           <p:cNvPr id="2" name="Title 1">
             <a:extLst>
               <a:ext uri="{FF2B5EF4-FFF2-40B4-BE49-F238E27FC236}">
-                <a16:creationId xmlns:a16="http://schemas.microsoft.com/office/drawing/2014/main" xmlns="" id="{AD55911D-DF46-4E79-8A08-9B5D293FFC9C}"/>
+                <a16:creationId xmlns:a16="http://schemas.microsoft.com/office/drawing/2014/main" id="{AD55911D-DF46-4E79-8A08-9B5D293FFC9C}"/>
               </a:ext>
             </a:extLst>
           </p:cNvPr>
@@ -8827,7 +9167,7 @@
           <p:cNvPr id="6" name="Table 6">
             <a:extLst>
               <a:ext uri="{FF2B5EF4-FFF2-40B4-BE49-F238E27FC236}">
-                <a16:creationId xmlns:a16="http://schemas.microsoft.com/office/drawing/2014/main" xmlns="" id="{4F74DE83-E58F-432C-AE79-298183B224E6}"/>
+                <a16:creationId xmlns:a16="http://schemas.microsoft.com/office/drawing/2014/main" id="{4F74DE83-E58F-432C-AE79-298183B224E6}"/>
               </a:ext>
             </a:extLst>
           </p:cNvPr>
@@ -8838,7 +9178,7 @@
             <p:ph idx="1"/>
             <p:extLst>
               <p:ext uri="{D42A27DB-BD31-4B8C-83A1-F6EECF244321}">
-                <p14:modId xmlns:p14="http://schemas.microsoft.com/office/powerpoint/2010/main" xmlns="" val="1686340914"/>
+                <p14:modId xmlns:p14="http://schemas.microsoft.com/office/powerpoint/2010/main" val="1686340914"/>
               </p:ext>
             </p:extLst>
           </p:nvPr>
@@ -8857,14 +9197,14 @@
                 <a:gridCol w="5176837">
                   <a:extLst>
                     <a:ext uri="{9D8B030D-6E8A-4147-A177-3AD203B41FA5}">
-                      <a16:colId xmlns:a16="http://schemas.microsoft.com/office/drawing/2014/main" xmlns="" val="2019709806"/>
+                      <a16:colId xmlns:a16="http://schemas.microsoft.com/office/drawing/2014/main" val="2019709806"/>
                     </a:ext>
                   </a:extLst>
                 </a:gridCol>
                 <a:gridCol w="5176837">
                   <a:extLst>
                     <a:ext uri="{9D8B030D-6E8A-4147-A177-3AD203B41FA5}">
-                      <a16:colId xmlns:a16="http://schemas.microsoft.com/office/drawing/2014/main" xmlns="" val="1379652834"/>
+                      <a16:colId xmlns:a16="http://schemas.microsoft.com/office/drawing/2014/main" val="1379652834"/>
                     </a:ext>
                   </a:extLst>
                 </a:gridCol>
@@ -8900,7 +9240,7 @@
                 </a:tc>
                 <a:extLst>
                   <a:ext uri="{0D108BD9-81ED-4DB2-BD59-A6C34878D82A}">
-                    <a16:rowId xmlns:a16="http://schemas.microsoft.com/office/drawing/2014/main" xmlns="" val="2877460864"/>
+                    <a16:rowId xmlns:a16="http://schemas.microsoft.com/office/drawing/2014/main" val="2877460864"/>
                   </a:ext>
                 </a:extLst>
               </a:tr>
@@ -8935,7 +9275,7 @@
                 </a:tc>
                 <a:extLst>
                   <a:ext uri="{0D108BD9-81ED-4DB2-BD59-A6C34878D82A}">
-                    <a16:rowId xmlns:a16="http://schemas.microsoft.com/office/drawing/2014/main" xmlns="" val="2033030258"/>
+                    <a16:rowId xmlns:a16="http://schemas.microsoft.com/office/drawing/2014/main" val="2033030258"/>
                   </a:ext>
                 </a:extLst>
               </a:tr>
@@ -8970,7 +9310,7 @@
                 </a:tc>
                 <a:extLst>
                   <a:ext uri="{0D108BD9-81ED-4DB2-BD59-A6C34878D82A}">
-                    <a16:rowId xmlns:a16="http://schemas.microsoft.com/office/drawing/2014/main" xmlns="" val="296500758"/>
+                    <a16:rowId xmlns:a16="http://schemas.microsoft.com/office/drawing/2014/main" val="296500758"/>
                   </a:ext>
                 </a:extLst>
               </a:tr>
@@ -9007,7 +9347,7 @@
                 </a:tc>
                 <a:extLst>
                   <a:ext uri="{0D108BD9-81ED-4DB2-BD59-A6C34878D82A}">
-                    <a16:rowId xmlns:a16="http://schemas.microsoft.com/office/drawing/2014/main" xmlns="" val="2071053643"/>
+                    <a16:rowId xmlns:a16="http://schemas.microsoft.com/office/drawing/2014/main" val="2071053643"/>
                   </a:ext>
                 </a:extLst>
               </a:tr>
@@ -9020,7 +9360,7 @@
           <p:cNvPr id="7" name="TextBox 6">
             <a:extLst>
               <a:ext uri="{FF2B5EF4-FFF2-40B4-BE49-F238E27FC236}">
-                <a16:creationId xmlns:a16="http://schemas.microsoft.com/office/drawing/2014/main" xmlns="" id="{01426A6E-F687-4BC2-A3FD-66DF91C17443}"/>
+                <a16:creationId xmlns:a16="http://schemas.microsoft.com/office/drawing/2014/main" id="{01426A6E-F687-4BC2-A3FD-66DF91C17443}"/>
               </a:ext>
             </a:extLst>
           </p:cNvPr>
@@ -9129,20 +9469,13 @@
     </p:spTree>
     <p:extLst>
       <p:ext uri="{BB962C8B-B14F-4D97-AF65-F5344CB8AC3E}">
-        <p14:creationId xmlns:p14="http://schemas.microsoft.com/office/powerpoint/2010/main" xmlns="" val="2451703769"/>
+        <p14:creationId xmlns:p14="http://schemas.microsoft.com/office/powerpoint/2010/main" val="2451703769"/>
       </p:ext>
     </p:extLst>
   </p:cSld>
   <p:clrMapOvr>
     <a:masterClrMapping/>
   </p:clrMapOvr>
-  <p:timing>
-    <p:tnLst>
-      <p:par>
-        <p:cTn id="1" dur="indefinite" restart="never" nodeType="tmRoot"/>
-      </p:par>
-    </p:tnLst>
-  </p:timing>
 </p:sld>
 </file>
 
@@ -9168,7 +9501,7 @@
           <p:cNvPr id="2" name="Title 1">
             <a:extLst>
               <a:ext uri="{FF2B5EF4-FFF2-40B4-BE49-F238E27FC236}">
-                <a16:creationId xmlns:a16="http://schemas.microsoft.com/office/drawing/2014/main" xmlns="" id="{598ED202-CD41-4ED5-A091-31E214EE742C}"/>
+                <a16:creationId xmlns:a16="http://schemas.microsoft.com/office/drawing/2014/main" id="{598ED202-CD41-4ED5-A091-31E214EE742C}"/>
               </a:ext>
             </a:extLst>
           </p:cNvPr>
@@ -9205,7 +9538,7 @@
           <p:cNvPr id="3" name="Content Placeholder 2">
             <a:extLst>
               <a:ext uri="{FF2B5EF4-FFF2-40B4-BE49-F238E27FC236}">
-                <a16:creationId xmlns:a16="http://schemas.microsoft.com/office/drawing/2014/main" xmlns="" id="{34F20B3B-2E27-4D85-9AB5-1271CA328E3D}"/>
+                <a16:creationId xmlns:a16="http://schemas.microsoft.com/office/drawing/2014/main" id="{34F20B3B-2E27-4D85-9AB5-1271CA328E3D}"/>
               </a:ext>
             </a:extLst>
           </p:cNvPr>
@@ -9255,7 +9588,7 @@
     </p:spTree>
     <p:extLst>
       <p:ext uri="{BB962C8B-B14F-4D97-AF65-F5344CB8AC3E}">
-        <p14:creationId xmlns:p14="http://schemas.microsoft.com/office/powerpoint/2010/main" xmlns="" val="1166937009"/>
+        <p14:creationId xmlns:p14="http://schemas.microsoft.com/office/powerpoint/2010/main" val="1166937009"/>
       </p:ext>
     </p:extLst>
   </p:cSld>
@@ -9287,7 +9620,7 @@
           <p:cNvPr id="2" name="Title 1">
             <a:extLst>
               <a:ext uri="{FF2B5EF4-FFF2-40B4-BE49-F238E27FC236}">
-                <a16:creationId xmlns:a16="http://schemas.microsoft.com/office/drawing/2014/main" xmlns="" id="{36AFE36C-17C6-4686-896D-F89A7C633E12}"/>
+                <a16:creationId xmlns:a16="http://schemas.microsoft.com/office/drawing/2014/main" id="{36AFE36C-17C6-4686-896D-F89A7C633E12}"/>
               </a:ext>
             </a:extLst>
           </p:cNvPr>
@@ -9316,7 +9649,7 @@
           <p:cNvPr id="4" name="Table 4">
             <a:extLst>
               <a:ext uri="{FF2B5EF4-FFF2-40B4-BE49-F238E27FC236}">
-                <a16:creationId xmlns:a16="http://schemas.microsoft.com/office/drawing/2014/main" xmlns="" id="{8338BB71-8843-4743-8B87-58B20D4C4A6F}"/>
+                <a16:creationId xmlns:a16="http://schemas.microsoft.com/office/drawing/2014/main" id="{8338BB71-8843-4743-8B87-58B20D4C4A6F}"/>
               </a:ext>
             </a:extLst>
           </p:cNvPr>
@@ -9327,7 +9660,7 @@
             <p:ph idx="1"/>
             <p:extLst>
               <p:ext uri="{D42A27DB-BD31-4B8C-83A1-F6EECF244321}">
-                <p14:modId xmlns:p14="http://schemas.microsoft.com/office/powerpoint/2010/main" xmlns="" val="885222824"/>
+                <p14:modId xmlns:p14="http://schemas.microsoft.com/office/powerpoint/2010/main" val="885222824"/>
               </p:ext>
             </p:extLst>
           </p:nvPr>
@@ -9346,21 +9679,21 @@
                 <a:gridCol w="2785403">
                   <a:extLst>
                     <a:ext uri="{9D8B030D-6E8A-4147-A177-3AD203B41FA5}">
-                      <a16:colId xmlns:a16="http://schemas.microsoft.com/office/drawing/2014/main" xmlns="" val="2977297550"/>
+                      <a16:colId xmlns:a16="http://schemas.microsoft.com/office/drawing/2014/main" val="2977297550"/>
                     </a:ext>
                   </a:extLst>
                 </a:gridCol>
                 <a:gridCol w="3010486">
                   <a:extLst>
                     <a:ext uri="{9D8B030D-6E8A-4147-A177-3AD203B41FA5}">
-                      <a16:colId xmlns:a16="http://schemas.microsoft.com/office/drawing/2014/main" xmlns="" val="1906464382"/>
+                      <a16:colId xmlns:a16="http://schemas.microsoft.com/office/drawing/2014/main" val="1906464382"/>
                     </a:ext>
                   </a:extLst>
                 </a:gridCol>
                 <a:gridCol w="4557268">
                   <a:extLst>
                     <a:ext uri="{9D8B030D-6E8A-4147-A177-3AD203B41FA5}">
-                      <a16:colId xmlns:a16="http://schemas.microsoft.com/office/drawing/2014/main" xmlns="" val="565535634"/>
+                      <a16:colId xmlns:a16="http://schemas.microsoft.com/office/drawing/2014/main" val="565535634"/>
                     </a:ext>
                   </a:extLst>
                 </a:gridCol>
@@ -9406,7 +9739,7 @@
                 </a:tc>
                 <a:extLst>
                   <a:ext uri="{0D108BD9-81ED-4DB2-BD59-A6C34878D82A}">
-                    <a16:rowId xmlns:a16="http://schemas.microsoft.com/office/drawing/2014/main" xmlns="" val="3447666898"/>
+                    <a16:rowId xmlns:a16="http://schemas.microsoft.com/office/drawing/2014/main" val="3447666898"/>
                   </a:ext>
                 </a:extLst>
               </a:tr>
@@ -9491,7 +9824,7 @@
                 </a:tc>
                 <a:extLst>
                   <a:ext uri="{0D108BD9-81ED-4DB2-BD59-A6C34878D82A}">
-                    <a16:rowId xmlns:a16="http://schemas.microsoft.com/office/drawing/2014/main" xmlns="" val="221003645"/>
+                    <a16:rowId xmlns:a16="http://schemas.microsoft.com/office/drawing/2014/main" val="221003645"/>
                   </a:ext>
                 </a:extLst>
               </a:tr>
@@ -9537,7 +9870,7 @@
                 </a:tc>
                 <a:extLst>
                   <a:ext uri="{0D108BD9-81ED-4DB2-BD59-A6C34878D82A}">
-                    <a16:rowId xmlns:a16="http://schemas.microsoft.com/office/drawing/2014/main" xmlns="" val="792754675"/>
+                    <a16:rowId xmlns:a16="http://schemas.microsoft.com/office/drawing/2014/main" val="792754675"/>
                   </a:ext>
                 </a:extLst>
               </a:tr>
@@ -9583,7 +9916,7 @@
                 </a:tc>
                 <a:extLst>
                   <a:ext uri="{0D108BD9-81ED-4DB2-BD59-A6C34878D82A}">
-                    <a16:rowId xmlns:a16="http://schemas.microsoft.com/office/drawing/2014/main" xmlns="" val="3790524959"/>
+                    <a16:rowId xmlns:a16="http://schemas.microsoft.com/office/drawing/2014/main" val="3790524959"/>
                   </a:ext>
                 </a:extLst>
               </a:tr>
@@ -9596,7 +9929,7 @@
           <p:cNvPr id="2050" name="Picture 2" descr="See the source image">
             <a:extLst>
               <a:ext uri="{FF2B5EF4-FFF2-40B4-BE49-F238E27FC236}">
-                <a16:creationId xmlns:a16="http://schemas.microsoft.com/office/drawing/2014/main" xmlns="" id="{90886094-F37B-4454-A3CA-EFD470065265}"/>
+                <a16:creationId xmlns:a16="http://schemas.microsoft.com/office/drawing/2014/main" id="{90886094-F37B-4454-A3CA-EFD470065265}"/>
               </a:ext>
             </a:extLst>
           </p:cNvPr>
@@ -9609,7 +9942,7 @@
           <a:blip r:embed="rId2">
             <a:extLst>
               <a:ext uri="{28A0092B-C50C-407E-A947-70E740481C1C}">
-                <a14:useLocalDpi xmlns:a14="http://schemas.microsoft.com/office/drawing/2010/main" xmlns="" val="0"/>
+                <a14:useLocalDpi xmlns:a14="http://schemas.microsoft.com/office/drawing/2010/main" val="0"/>
               </a:ext>
             </a:extLst>
           </a:blip>
@@ -9629,7 +9962,7 @@
           <a:noFill/>
           <a:extLst>
             <a:ext uri="{909E8E84-426E-40DD-AFC4-6F175D3DCCD1}">
-              <a14:hiddenFill xmlns:a14="http://schemas.microsoft.com/office/drawing/2010/main" xmlns="">
+              <a14:hiddenFill xmlns:a14="http://schemas.microsoft.com/office/drawing/2010/main">
                 <a:solidFill>
                   <a:srgbClr val="FFFFFF"/>
                 </a:solidFill>
@@ -9641,7 +9974,7 @@
     </p:spTree>
     <p:extLst>
       <p:ext uri="{BB962C8B-B14F-4D97-AF65-F5344CB8AC3E}">
-        <p14:creationId xmlns:p14="http://schemas.microsoft.com/office/powerpoint/2010/main" xmlns="" val="164580881"/>
+        <p14:creationId xmlns:p14="http://schemas.microsoft.com/office/powerpoint/2010/main" val="164580881"/>
       </p:ext>
     </p:extLst>
   </p:cSld>
@@ -9827,7 +10160,7 @@
   <a:extraClrSchemeLst/>
   <a:extLst>
     <a:ext uri="{05A4C25C-085E-4340-85A3-A5531E510DB2}">
-      <thm15:themeFamily xmlns:thm15="http://schemas.microsoft.com/office/thememl/2012/main" xmlns="" name="THREE.pptx" id="{E781C72B-3D65-4B8D-9071-33B66AF0EF30}" vid="{3A5A58F2-9BE1-435C-B12D-88FD9BF70179}"/>
+      <thm15:themeFamily xmlns:thm15="http://schemas.microsoft.com/office/thememl/2012/main" name="THREE.pptx" id="{E781C72B-3D65-4B8D-9071-33B66AF0EF30}" vid="{3A5A58F2-9BE1-435C-B12D-88FD9BF70179}"/>
     </a:ext>
   </a:extLst>
 </a:theme>

</xml_diff>